<commit_message>
Incorporate changes from Monday's meeting
</commit_message>
<xml_diff>
--- a/Publications/2013France/BeasleyBga2013-NlsyLinks.pptx
+++ b/Publications/2013France/BeasleyBga2013-NlsyLinks.pptx
@@ -5,7 +5,7 @@
     <p:sldMasterId id="2147483648" r:id="rId1"/>
   </p:sldMasterIdLst>
   <p:notesMasterIdLst>
-    <p:notesMasterId r:id="rId27"/>
+    <p:notesMasterId r:id="rId28"/>
   </p:notesMasterIdLst>
   <p:sldIdLst>
     <p:sldId id="256" r:id="rId2"/>
@@ -27,12 +27,13 @@
     <p:sldId id="275" r:id="rId18"/>
     <p:sldId id="278" r:id="rId19"/>
     <p:sldId id="277" r:id="rId20"/>
-    <p:sldId id="279" r:id="rId21"/>
-    <p:sldId id="280" r:id="rId22"/>
-    <p:sldId id="281" r:id="rId23"/>
-    <p:sldId id="285" r:id="rId24"/>
-    <p:sldId id="284" r:id="rId25"/>
-    <p:sldId id="282" r:id="rId26"/>
+    <p:sldId id="286" r:id="rId21"/>
+    <p:sldId id="279" r:id="rId22"/>
+    <p:sldId id="280" r:id="rId23"/>
+    <p:sldId id="281" r:id="rId24"/>
+    <p:sldId id="285" r:id="rId25"/>
+    <p:sldId id="284" r:id="rId26"/>
+    <p:sldId id="282" r:id="rId27"/>
   </p:sldIdLst>
   <p:sldSz cx="9144000" cy="6858000" type="screen4x3"/>
   <p:notesSz cx="6858000" cy="9144000"/>
@@ -216,7 +217,7 @@
           <a:p>
             <a:fld id="{6BE767AE-DD8E-4EA5-A843-143952EC906E}" type="datetimeFigureOut">
               <a:rPr lang="en-US" smtClean="0"/>
-              <a:t>6/16/2013</a:t>
+              <a:t>6/19/2013</a:t>
             </a:fld>
             <a:endParaRPr lang="en-US"/>
           </a:p>
@@ -530,11 +531,7 @@
           <a:p>
             <a:r>
               <a:rPr lang="en-US" dirty="0" smtClean="0"/>
-              <a:t>Here is </a:t>
-            </a:r>
-            <a:r>
-              <a:rPr lang="en-US" dirty="0" smtClean="0"/>
-              <a:t>the timeline of</a:t>
+              <a:t>Here is the timeline of</a:t>
             </a:r>
             <a:r>
               <a:rPr lang="en-US" baseline="0" dirty="0" smtClean="0"/>
@@ -542,47 +539,11 @@
             </a:r>
             <a:r>
               <a:rPr lang="en-US" dirty="0" smtClean="0"/>
-              <a:t> </a:t>
-            </a:r>
-            <a:r>
-              <a:rPr lang="en-US" dirty="0" smtClean="0"/>
-              <a:t>original</a:t>
+              <a:t> original</a:t>
             </a:r>
             <a:r>
               <a:rPr lang="en-US" baseline="0" dirty="0" smtClean="0"/>
-              <a:t> cohort of the Nlsy79.  Their DOB range </a:t>
-            </a:r>
-            <a:r>
-              <a:rPr lang="en-US" baseline="0" dirty="0" smtClean="0"/>
-              <a:t>is about ten years.  </a:t>
-            </a:r>
-            <a:r>
-              <a:rPr lang="en-US" baseline="0" dirty="0" smtClean="0"/>
-              <a:t>As expected with a sample this large, the females started having children around age 15, in 1970.  The official survey began in 1979.  </a:t>
-            </a:r>
-            <a:r>
-              <a:rPr lang="en-US" baseline="0" dirty="0" smtClean="0"/>
-              <a:t>Yet we have data </a:t>
-            </a:r>
-            <a:r>
-              <a:rPr lang="en-US" baseline="0" dirty="0" smtClean="0"/>
-              <a:t>on this cohort </a:t>
-            </a:r>
-            <a:r>
-              <a:rPr lang="en-US" baseline="0" dirty="0" smtClean="0"/>
-              <a:t>that precedes 1979</a:t>
-            </a:r>
-            <a:r>
-              <a:rPr lang="en-US" baseline="0" dirty="0" smtClean="0"/>
-              <a:t>, because there are many retrospective questions </a:t>
-            </a:r>
-            <a:r>
-              <a:rPr lang="en-US" baseline="0" dirty="0" smtClean="0"/>
-              <a:t>asked of both the </a:t>
-            </a:r>
-            <a:r>
-              <a:rPr lang="en-US" baseline="0" dirty="0" smtClean="0"/>
-              <a:t>subjects, and their parents.</a:t>
+              <a:t> cohort of the Nlsy79.  Their DOB range is about ten years.  As expected with a sample this large, the females started having children around age 15, in 1970.  The official survey began in 1979.  Yet we have data on this cohort that precedes 1979, because there are many retrospective questions asked of both the subjects, and their parents.</a:t>
             </a:r>
             <a:endParaRPr lang="en-US" dirty="0"/>
           </a:p>
@@ -670,28 +631,28 @@
           <a:p>
             <a:r>
               <a:rPr lang="en-US" dirty="0" smtClean="0"/>
-              <a:t>To reiterate, the kinship links will work in </a:t>
-            </a:r>
-            <a:r>
-              <a:rPr lang="en-US" smtClean="0"/>
-              <a:t>any software, even</a:t>
-            </a:r>
-            <a:r>
-              <a:rPr lang="en-US" baseline="0" smtClean="0"/>
-              <a:t> </a:t>
+              <a:t>Everything we accomplished going from</a:t>
             </a:r>
             <a:r>
               <a:rPr lang="en-US" baseline="0" dirty="0" smtClean="0"/>
-              <a:t>if your not using our package or R</a:t>
+              <a:t> a raw CSV extract to the SEM results took </a:t>
+            </a:r>
+            <a:r>
+              <a:rPr lang="en-US" dirty="0" smtClean="0"/>
+              <a:t>14 lines of code.</a:t>
             </a:r>
           </a:p>
           <a:p>
-            <a:endParaRPr lang="en-US" baseline="0" dirty="0" smtClean="0"/>
+            <a:endParaRPr lang="en-US" dirty="0" smtClean="0"/>
           </a:p>
           <a:p>
             <a:r>
+              <a:rPr lang="en-US" dirty="0" smtClean="0"/>
+              <a:t>Typically</a:t>
+            </a:r>
+            <a:r>
               <a:rPr lang="en-US" baseline="0" dirty="0" smtClean="0"/>
-              <a:t>And our package has features that should help beyond BG and the NLSY.</a:t>
+              <a:t> Step #6 requires more manipulation, but no more than if you weren’t using the package.</a:t>
             </a:r>
             <a:endParaRPr lang="en-US" dirty="0"/>
           </a:p>
@@ -714,7 +675,208 @@
           <a:p>
             <a:fld id="{4E5251ED-AE1B-4A28-97D1-0CEAFB13BD92}" type="slidenum">
               <a:rPr lang="en-US" smtClean="0"/>
+              <a:t>23</a:t>
+            </a:fld>
+            <a:endParaRPr lang="en-US"/>
+          </a:p>
+        </p:txBody>
+      </p:sp>
+    </p:spTree>
+    <p:extLst>
+      <p:ext uri="{BB962C8B-B14F-4D97-AF65-F5344CB8AC3E}">
+        <p14:creationId xmlns:p14="http://schemas.microsoft.com/office/powerpoint/2010/main" val="1162963929"/>
+      </p:ext>
+    </p:extLst>
+  </p:cSld>
+  <p:clrMapOvr>
+    <a:masterClrMapping/>
+  </p:clrMapOvr>
+</p:notes>
+</file>
+
+<file path=ppt/notesSlides/notesSlide11.xml><?xml version="1.0" encoding="utf-8"?>
+<p:notes xmlns:a="http://schemas.openxmlformats.org/drawingml/2006/main" xmlns:r="http://schemas.openxmlformats.org/officeDocument/2006/relationships" xmlns:p="http://schemas.openxmlformats.org/presentationml/2006/main">
+  <p:cSld>
+    <p:spTree>
+      <p:nvGrpSpPr>
+        <p:cNvPr id="1" name=""/>
+        <p:cNvGrpSpPr/>
+        <p:nvPr/>
+      </p:nvGrpSpPr>
+      <p:grpSpPr>
+        <a:xfrm>
+          <a:off x="0" y="0"/>
+          <a:ext cx="0" cy="0"/>
+          <a:chOff x="0" y="0"/>
+          <a:chExt cx="0" cy="0"/>
+        </a:xfrm>
+      </p:grpSpPr>
+      <p:sp>
+        <p:nvSpPr>
+          <p:cNvPr id="2" name="Slide Image Placeholder 1"/>
+          <p:cNvSpPr>
+            <a:spLocks noGrp="1" noRot="1" noChangeAspect="1"/>
+          </p:cNvSpPr>
+          <p:nvPr>
+            <p:ph type="sldImg"/>
+          </p:nvPr>
+        </p:nvSpPr>
+        <p:spPr/>
+      </p:sp>
+      <p:sp>
+        <p:nvSpPr>
+          <p:cNvPr id="3" name="Notes Placeholder 2"/>
+          <p:cNvSpPr>
+            <a:spLocks noGrp="1"/>
+          </p:cNvSpPr>
+          <p:nvPr>
+            <p:ph type="body" idx="1"/>
+          </p:nvPr>
+        </p:nvSpPr>
+        <p:spPr/>
+        <p:txBody>
+          <a:bodyPr/>
+          <a:lstStyle/>
+          <a:p>
+            <a:r>
+              <a:rPr lang="en-US" dirty="0" smtClean="0"/>
+              <a:t>Finally, we have online forums intended</a:t>
+            </a:r>
+            <a:r>
+              <a:rPr lang="en-US" baseline="0" dirty="0" smtClean="0"/>
+              <a:t> for kinship users, regardless if you use R.</a:t>
+            </a:r>
+            <a:endParaRPr lang="en-US" dirty="0" smtClean="0"/>
+          </a:p>
+        </p:txBody>
+      </p:sp>
+      <p:sp>
+        <p:nvSpPr>
+          <p:cNvPr id="4" name="Slide Number Placeholder 3"/>
+          <p:cNvSpPr>
+            <a:spLocks noGrp="1"/>
+          </p:cNvSpPr>
+          <p:nvPr>
+            <p:ph type="sldNum" sz="quarter" idx="10"/>
+          </p:nvPr>
+        </p:nvSpPr>
+        <p:spPr/>
+        <p:txBody>
+          <a:bodyPr/>
+          <a:lstStyle/>
+          <a:p>
+            <a:fld id="{4E5251ED-AE1B-4A28-97D1-0CEAFB13BD92}" type="slidenum">
+              <a:rPr lang="en-US" smtClean="0"/>
               <a:t>24</a:t>
+            </a:fld>
+            <a:endParaRPr lang="en-US"/>
+          </a:p>
+        </p:txBody>
+      </p:sp>
+    </p:spTree>
+    <p:extLst>
+      <p:ext uri="{BB962C8B-B14F-4D97-AF65-F5344CB8AC3E}">
+        <p14:creationId xmlns:p14="http://schemas.microsoft.com/office/powerpoint/2010/main" val="60804661"/>
+      </p:ext>
+    </p:extLst>
+  </p:cSld>
+  <p:clrMapOvr>
+    <a:masterClrMapping/>
+  </p:clrMapOvr>
+</p:notes>
+</file>
+
+<file path=ppt/notesSlides/notesSlide12.xml><?xml version="1.0" encoding="utf-8"?>
+<p:notes xmlns:a="http://schemas.openxmlformats.org/drawingml/2006/main" xmlns:r="http://schemas.openxmlformats.org/officeDocument/2006/relationships" xmlns:p="http://schemas.openxmlformats.org/presentationml/2006/main">
+  <p:cSld>
+    <p:spTree>
+      <p:nvGrpSpPr>
+        <p:cNvPr id="1" name=""/>
+        <p:cNvGrpSpPr/>
+        <p:nvPr/>
+      </p:nvGrpSpPr>
+      <p:grpSpPr>
+        <a:xfrm>
+          <a:off x="0" y="0"/>
+          <a:ext cx="0" cy="0"/>
+          <a:chOff x="0" y="0"/>
+          <a:chExt cx="0" cy="0"/>
+        </a:xfrm>
+      </p:grpSpPr>
+      <p:sp>
+        <p:nvSpPr>
+          <p:cNvPr id="2" name="Slide Image Placeholder 1"/>
+          <p:cNvSpPr>
+            <a:spLocks noGrp="1" noRot="1" noChangeAspect="1"/>
+          </p:cNvSpPr>
+          <p:nvPr>
+            <p:ph type="sldImg"/>
+          </p:nvPr>
+        </p:nvSpPr>
+        <p:spPr/>
+      </p:sp>
+      <p:sp>
+        <p:nvSpPr>
+          <p:cNvPr id="3" name="Notes Placeholder 2"/>
+          <p:cNvSpPr>
+            <a:spLocks noGrp="1"/>
+          </p:cNvSpPr>
+          <p:nvPr>
+            <p:ph type="body" idx="1"/>
+          </p:nvPr>
+        </p:nvSpPr>
+        <p:spPr/>
+        <p:txBody>
+          <a:bodyPr/>
+          <a:lstStyle/>
+          <a:p>
+            <a:r>
+              <a:rPr lang="en-US" dirty="0" smtClean="0"/>
+              <a:t>To reiterate, the kinship links will work in </a:t>
+            </a:r>
+            <a:r>
+              <a:rPr lang="en-US" smtClean="0"/>
+              <a:t>any software, even</a:t>
+            </a:r>
+            <a:r>
+              <a:rPr lang="en-US" baseline="0" smtClean="0"/>
+              <a:t> </a:t>
+            </a:r>
+            <a:r>
+              <a:rPr lang="en-US" baseline="0" dirty="0" smtClean="0"/>
+              <a:t>if your not using our package or R</a:t>
+            </a:r>
+          </a:p>
+          <a:p>
+            <a:endParaRPr lang="en-US" baseline="0" dirty="0" smtClean="0"/>
+          </a:p>
+          <a:p>
+            <a:r>
+              <a:rPr lang="en-US" baseline="0" dirty="0" smtClean="0"/>
+              <a:t>And our package has features that should help beyond BG and the NLSY.</a:t>
+            </a:r>
+            <a:endParaRPr lang="en-US" dirty="0"/>
+          </a:p>
+        </p:txBody>
+      </p:sp>
+      <p:sp>
+        <p:nvSpPr>
+          <p:cNvPr id="4" name="Slide Number Placeholder 3"/>
+          <p:cNvSpPr>
+            <a:spLocks noGrp="1"/>
+          </p:cNvSpPr>
+          <p:nvPr>
+            <p:ph type="sldNum" sz="quarter" idx="10"/>
+          </p:nvPr>
+        </p:nvSpPr>
+        <p:spPr/>
+        <p:txBody>
+          <a:bodyPr/>
+          <a:lstStyle/>
+          <a:p>
+            <a:fld id="{4E5251ED-AE1B-4A28-97D1-0CEAFB13BD92}" type="slidenum">
+              <a:rPr lang="en-US" smtClean="0"/>
+              <a:t>25</a:t>
             </a:fld>
             <a:endParaRPr lang="en-US"/>
           </a:p>
@@ -1085,7 +1247,7 @@
           <a:p>
             <a:r>
               <a:rPr lang="en-US" dirty="0" smtClean="0"/>
-              <a:t>21.1 to 1</a:t>
+              <a:t>The NIH has paid us to assemble and distribute the links.</a:t>
             </a:r>
             <a:endParaRPr lang="en-US" dirty="0"/>
           </a:p>
@@ -1108,7 +1270,7 @@
           <a:p>
             <a:fld id="{8E033FF7-26C7-4400-AE75-2D780AD6CC98}" type="slidenum">
               <a:rPr lang="en-US" smtClean="0"/>
-              <a:t>17</a:t>
+              <a:t>15</a:t>
             </a:fld>
             <a:endParaRPr lang="en-US"/>
           </a:p>
@@ -1117,7 +1279,7 @@
     </p:spTree>
     <p:extLst>
       <p:ext uri="{BB962C8B-B14F-4D97-AF65-F5344CB8AC3E}">
-        <p14:creationId xmlns:p14="http://schemas.microsoft.com/office/powerpoint/2010/main" val="1237308579"/>
+        <p14:creationId xmlns:p14="http://schemas.microsoft.com/office/powerpoint/2010/main" val="723304417"/>
       </p:ext>
     </p:extLst>
   </p:cSld>
@@ -1173,36 +1335,7 @@
           <a:p>
             <a:r>
               <a:rPr lang="en-US" dirty="0" smtClean="0"/>
-              <a:t>This revised</a:t>
-            </a:r>
-            <a:r>
-              <a:rPr lang="en-US" baseline="0" dirty="0" smtClean="0"/>
-              <a:t> diagram </a:t>
-            </a:r>
-            <a:r>
-              <a:rPr lang="en-US" dirty="0" smtClean="0"/>
-              <a:t>illustrates the importance</a:t>
-            </a:r>
-            <a:r>
-              <a:rPr lang="en-US" baseline="0" dirty="0" smtClean="0"/>
-              <a:t> of the implicit items.  The </a:t>
-            </a:r>
-            <a:r>
-              <a:rPr lang="en-US" baseline="0" dirty="0" err="1" smtClean="0"/>
-              <a:t>explicits</a:t>
-            </a:r>
-            <a:r>
-              <a:rPr lang="en-US" baseline="0" dirty="0" smtClean="0"/>
-              <a:t> weren’t asked until 2006, and based on lags in the subject ages, explicit links will still be administered and filling in holes beyond 2022.</a:t>
-            </a:r>
-          </a:p>
-          <a:p>
-            <a:endParaRPr lang="en-US" baseline="0" dirty="0" smtClean="0"/>
-          </a:p>
-          <a:p>
-            <a:r>
-              <a:rPr lang="en-US" baseline="0" dirty="0" smtClean="0"/>
-              <a:t>Meanwhile, there have been decades of attrition and death.  Implicit items (which have been asked since 1979) are the best way to get to the families before they’re unreachable.  Getting to Gen1 subjects is especially important, because you could be interested in their responses when the were young.  And because linking two Gen1 Housemates opens up cousin links and aunt/niece links.</a:t>
+              <a:t>21.1 to 1</a:t>
             </a:r>
             <a:endParaRPr lang="en-US" dirty="0"/>
           </a:p>
@@ -1225,7 +1358,7 @@
           <a:p>
             <a:fld id="{8E033FF7-26C7-4400-AE75-2D780AD6CC98}" type="slidenum">
               <a:rPr lang="en-US" smtClean="0"/>
-              <a:t>18</a:t>
+              <a:t>17</a:t>
             </a:fld>
             <a:endParaRPr lang="en-US"/>
           </a:p>
@@ -1234,7 +1367,7 @@
     </p:spTree>
     <p:extLst>
       <p:ext uri="{BB962C8B-B14F-4D97-AF65-F5344CB8AC3E}">
-        <p14:creationId xmlns:p14="http://schemas.microsoft.com/office/powerpoint/2010/main" val="3295027548"/>
+        <p14:creationId xmlns:p14="http://schemas.microsoft.com/office/powerpoint/2010/main" val="1237308579"/>
       </p:ext>
     </p:extLst>
   </p:cSld>
@@ -1290,7 +1423,36 @@
           <a:p>
             <a:r>
               <a:rPr lang="en-US" dirty="0" smtClean="0"/>
-              <a:t>22.7 to 1</a:t>
+              <a:t>This revised</a:t>
+            </a:r>
+            <a:r>
+              <a:rPr lang="en-US" baseline="0" dirty="0" smtClean="0"/>
+              <a:t> diagram </a:t>
+            </a:r>
+            <a:r>
+              <a:rPr lang="en-US" dirty="0" smtClean="0"/>
+              <a:t>illustrates the importance</a:t>
+            </a:r>
+            <a:r>
+              <a:rPr lang="en-US" baseline="0" dirty="0" smtClean="0"/>
+              <a:t> of the implicit items.  The </a:t>
+            </a:r>
+            <a:r>
+              <a:rPr lang="en-US" baseline="0" dirty="0" err="1" smtClean="0"/>
+              <a:t>explicits</a:t>
+            </a:r>
+            <a:r>
+              <a:rPr lang="en-US" baseline="0" dirty="0" smtClean="0"/>
+              <a:t> weren’t asked until 2006, and based on lags in the subject ages, explicit links will still be administered and filling in holes beyond 2022.</a:t>
+            </a:r>
+          </a:p>
+          <a:p>
+            <a:endParaRPr lang="en-US" baseline="0" dirty="0" smtClean="0"/>
+          </a:p>
+          <a:p>
+            <a:r>
+              <a:rPr lang="en-US" baseline="0" dirty="0" smtClean="0"/>
+              <a:t>Meanwhile, there have been decades of attrition and death.  Implicit items (which have been asked since 1979) are the best way to get to the families before they’re unreachable.  Getting to Gen1 subjects is especially important, because you could be interested in their responses when the were young.  And because linking two Gen1 Housemates opens up cousin links and aunt/niece links.</a:t>
             </a:r>
             <a:endParaRPr lang="en-US" dirty="0"/>
           </a:p>
@@ -1313,7 +1475,7 @@
           <a:p>
             <a:fld id="{8E033FF7-26C7-4400-AE75-2D780AD6CC98}" type="slidenum">
               <a:rPr lang="en-US" smtClean="0"/>
-              <a:t>19</a:t>
+              <a:t>18</a:t>
             </a:fld>
             <a:endParaRPr lang="en-US"/>
           </a:p>
@@ -1322,7 +1484,7 @@
     </p:spTree>
     <p:extLst>
       <p:ext uri="{BB962C8B-B14F-4D97-AF65-F5344CB8AC3E}">
-        <p14:creationId xmlns:p14="http://schemas.microsoft.com/office/powerpoint/2010/main" val="4023782990"/>
+        <p14:creationId xmlns:p14="http://schemas.microsoft.com/office/powerpoint/2010/main" val="3295027548"/>
       </p:ext>
     </p:extLst>
   </p:cSld>
@@ -1378,28 +1540,7 @@
           <a:p>
             <a:r>
               <a:rPr lang="en-US" dirty="0" smtClean="0"/>
-              <a:t>Everything we accomplished going from</a:t>
-            </a:r>
-            <a:r>
-              <a:rPr lang="en-US" baseline="0" dirty="0" smtClean="0"/>
-              <a:t> a raw CSV extract to the SEM results took </a:t>
-            </a:r>
-            <a:r>
-              <a:rPr lang="en-US" dirty="0" smtClean="0"/>
-              <a:t>14 lines of code.</a:t>
-            </a:r>
-          </a:p>
-          <a:p>
-            <a:endParaRPr lang="en-US" dirty="0" smtClean="0"/>
-          </a:p>
-          <a:p>
-            <a:r>
-              <a:rPr lang="en-US" dirty="0" smtClean="0"/>
-              <a:t>Typically</a:t>
-            </a:r>
-            <a:r>
-              <a:rPr lang="en-US" baseline="0" dirty="0" smtClean="0"/>
-              <a:t> Step #6 requires more manipulation, but no more than if you weren’t using the package.</a:t>
+              <a:t>22.7 to 1</a:t>
             </a:r>
             <a:endParaRPr lang="en-US" dirty="0"/>
           </a:p>
@@ -1420,9 +1561,9 @@
           <a:bodyPr/>
           <a:lstStyle/>
           <a:p>
-            <a:fld id="{4E5251ED-AE1B-4A28-97D1-0CEAFB13BD92}" type="slidenum">
+            <a:fld id="{8E033FF7-26C7-4400-AE75-2D780AD6CC98}" type="slidenum">
               <a:rPr lang="en-US" smtClean="0"/>
-              <a:t>22</a:t>
+              <a:t>19</a:t>
             </a:fld>
             <a:endParaRPr lang="en-US"/>
           </a:p>
@@ -1431,7 +1572,7 @@
     </p:spTree>
     <p:extLst>
       <p:ext uri="{BB962C8B-B14F-4D97-AF65-F5344CB8AC3E}">
-        <p14:creationId xmlns:p14="http://schemas.microsoft.com/office/powerpoint/2010/main" val="1162963929"/>
+        <p14:creationId xmlns:p14="http://schemas.microsoft.com/office/powerpoint/2010/main" val="4023782990"/>
       </p:ext>
     </p:extLst>
   </p:cSld>
@@ -1487,13 +1628,9 @@
           <a:p>
             <a:r>
               <a:rPr lang="en-US" dirty="0" smtClean="0"/>
-              <a:t>Finally, we have online forums intended</a:t>
-            </a:r>
-            <a:r>
-              <a:rPr lang="en-US" baseline="0" dirty="0" smtClean="0"/>
-              <a:t> for kinship users, regardless if you use R.</a:t>
-            </a:r>
-            <a:endParaRPr lang="en-US" dirty="0" smtClean="0"/>
+              <a:t>22.7 to 1</a:t>
+            </a:r>
+            <a:endParaRPr lang="en-US" dirty="0"/>
           </a:p>
         </p:txBody>
       </p:sp>
@@ -1512,9 +1649,9 @@
           <a:bodyPr/>
           <a:lstStyle/>
           <a:p>
-            <a:fld id="{4E5251ED-AE1B-4A28-97D1-0CEAFB13BD92}" type="slidenum">
+            <a:fld id="{8E033FF7-26C7-4400-AE75-2D780AD6CC98}" type="slidenum">
               <a:rPr lang="en-US" smtClean="0"/>
-              <a:t>23</a:t>
+              <a:t>20</a:t>
             </a:fld>
             <a:endParaRPr lang="en-US"/>
           </a:p>
@@ -1523,7 +1660,7 @@
     </p:spTree>
     <p:extLst>
       <p:ext uri="{BB962C8B-B14F-4D97-AF65-F5344CB8AC3E}">
-        <p14:creationId xmlns:p14="http://schemas.microsoft.com/office/powerpoint/2010/main" val="60804661"/>
+        <p14:creationId xmlns:p14="http://schemas.microsoft.com/office/powerpoint/2010/main" val="4023782990"/>
       </p:ext>
     </p:extLst>
   </p:cSld>
@@ -1715,7 +1852,7 @@
             <a:fld id="{1D8BD707-D9CF-40AE-B4C6-C98DA3205C09}" type="datetimeFigureOut">
               <a:rPr lang="en-US" smtClean="0"/>
               <a:pPr/>
-              <a:t>6/16/2013</a:t>
+              <a:t>6/19/2013</a:t>
             </a:fld>
             <a:endParaRPr lang="en-US"/>
           </a:p>
@@ -1882,7 +2019,7 @@
             <a:fld id="{1D8BD707-D9CF-40AE-B4C6-C98DA3205C09}" type="datetimeFigureOut">
               <a:rPr lang="en-US" smtClean="0"/>
               <a:pPr/>
-              <a:t>6/16/2013</a:t>
+              <a:t>6/19/2013</a:t>
             </a:fld>
             <a:endParaRPr lang="en-US"/>
           </a:p>
@@ -2059,7 +2196,7 @@
             <a:fld id="{1D8BD707-D9CF-40AE-B4C6-C98DA3205C09}" type="datetimeFigureOut">
               <a:rPr lang="en-US" smtClean="0"/>
               <a:pPr/>
-              <a:t>6/16/2013</a:t>
+              <a:t>6/19/2013</a:t>
             </a:fld>
             <a:endParaRPr lang="en-US"/>
           </a:p>
@@ -2226,7 +2363,7 @@
             <a:fld id="{1D8BD707-D9CF-40AE-B4C6-C98DA3205C09}" type="datetimeFigureOut">
               <a:rPr lang="en-US" smtClean="0"/>
               <a:pPr/>
-              <a:t>6/16/2013</a:t>
+              <a:t>6/19/2013</a:t>
             </a:fld>
             <a:endParaRPr lang="en-US"/>
           </a:p>
@@ -2469,7 +2606,7 @@
             <a:fld id="{1D8BD707-D9CF-40AE-B4C6-C98DA3205C09}" type="datetimeFigureOut">
               <a:rPr lang="en-US" smtClean="0"/>
               <a:pPr/>
-              <a:t>6/16/2013</a:t>
+              <a:t>6/19/2013</a:t>
             </a:fld>
             <a:endParaRPr lang="en-US"/>
           </a:p>
@@ -2754,7 +2891,7 @@
             <a:fld id="{1D8BD707-D9CF-40AE-B4C6-C98DA3205C09}" type="datetimeFigureOut">
               <a:rPr lang="en-US" smtClean="0"/>
               <a:pPr/>
-              <a:t>6/16/2013</a:t>
+              <a:t>6/19/2013</a:t>
             </a:fld>
             <a:endParaRPr lang="en-US"/>
           </a:p>
@@ -3173,7 +3310,7 @@
             <a:fld id="{1D8BD707-D9CF-40AE-B4C6-C98DA3205C09}" type="datetimeFigureOut">
               <a:rPr lang="en-US" smtClean="0"/>
               <a:pPr/>
-              <a:t>6/16/2013</a:t>
+              <a:t>6/19/2013</a:t>
             </a:fld>
             <a:endParaRPr lang="en-US"/>
           </a:p>
@@ -3288,7 +3425,7 @@
             <a:fld id="{1D8BD707-D9CF-40AE-B4C6-C98DA3205C09}" type="datetimeFigureOut">
               <a:rPr lang="en-US" smtClean="0"/>
               <a:pPr/>
-              <a:t>6/16/2013</a:t>
+              <a:t>6/19/2013</a:t>
             </a:fld>
             <a:endParaRPr lang="en-US"/>
           </a:p>
@@ -3380,7 +3517,7 @@
             <a:fld id="{1D8BD707-D9CF-40AE-B4C6-C98DA3205C09}" type="datetimeFigureOut">
               <a:rPr lang="en-US" smtClean="0"/>
               <a:pPr/>
-              <a:t>6/16/2013</a:t>
+              <a:t>6/19/2013</a:t>
             </a:fld>
             <a:endParaRPr lang="en-US"/>
           </a:p>
@@ -3654,7 +3791,7 @@
             <a:fld id="{1D8BD707-D9CF-40AE-B4C6-C98DA3205C09}" type="datetimeFigureOut">
               <a:rPr lang="en-US" smtClean="0"/>
               <a:pPr/>
-              <a:t>6/16/2013</a:t>
+              <a:t>6/19/2013</a:t>
             </a:fld>
             <a:endParaRPr lang="en-US"/>
           </a:p>
@@ -3904,7 +4041,7 @@
             <a:fld id="{1D8BD707-D9CF-40AE-B4C6-C98DA3205C09}" type="datetimeFigureOut">
               <a:rPr lang="en-US" smtClean="0"/>
               <a:pPr/>
-              <a:t>6/16/2013</a:t>
+              <a:t>6/19/2013</a:t>
             </a:fld>
             <a:endParaRPr lang="en-US"/>
           </a:p>
@@ -4114,7 +4251,7 @@
             <a:fld id="{1D8BD707-D9CF-40AE-B4C6-C98DA3205C09}" type="datetimeFigureOut">
               <a:rPr lang="en-US" smtClean="0"/>
               <a:pPr/>
-              <a:t>6/16/2013</a:t>
+              <a:t>6/19/2013</a:t>
             </a:fld>
             <a:endParaRPr lang="en-US"/>
           </a:p>
@@ -7315,13 +7452,8 @@
             </a:pPr>
             <a:r>
               <a:rPr lang="en-US" sz="2400" dirty="0" smtClean="0"/>
-              <a:t>No </a:t>
-            </a:r>
-            <a:r>
-              <a:rPr lang="en-US" sz="2400" dirty="0" smtClean="0"/>
-              <a:t>Gen1</a:t>
-            </a:r>
-            <a:endParaRPr lang="en-US" sz="2400" dirty="0" smtClean="0"/>
+              <a:t>No Gen1</a:t>
+            </a:r>
           </a:p>
           <a:p>
             <a:pPr marL="285750" indent="-285750">
@@ -10122,13 +10254,8 @@
             </a:pPr>
             <a:r>
               <a:rPr lang="en-US" sz="2400" dirty="0" smtClean="0"/>
-              <a:t>No </a:t>
-            </a:r>
-            <a:r>
-              <a:rPr lang="en-US" sz="2400" dirty="0" smtClean="0"/>
-              <a:t>Gen2</a:t>
-            </a:r>
-            <a:endParaRPr lang="en-US" sz="2400" dirty="0" smtClean="0"/>
+              <a:t>No Gen2</a:t>
+            </a:r>
           </a:p>
           <a:p>
             <a:pPr marL="285750" indent="-285750">
@@ -12933,13 +13060,8 @@
             </a:pPr>
             <a:r>
               <a:rPr lang="en-US" sz="2400" dirty="0" smtClean="0"/>
-              <a:t>No </a:t>
-            </a:r>
-            <a:r>
-              <a:rPr lang="en-US" sz="2400" dirty="0" smtClean="0"/>
-              <a:t>Gen1</a:t>
-            </a:r>
-            <a:endParaRPr lang="en-US" sz="2400" dirty="0" smtClean="0"/>
+              <a:t>No Gen1</a:t>
+            </a:r>
           </a:p>
           <a:p>
             <a:pPr marL="285750" indent="-285750">
@@ -16713,11 +16835,7 @@
             </a:r>
             <a:r>
               <a:rPr lang="en-US" dirty="0" smtClean="0"/>
-              <a:t>describing what you need to do</a:t>
-            </a:r>
-            <a:r>
-              <a:rPr lang="en-US" dirty="0" smtClean="0"/>
-              <a:t>.</a:t>
+              <a:t>describing what you need to do.</a:t>
             </a:r>
           </a:p>
           <a:p>
@@ -16786,11 +16904,7 @@
           <a:p>
             <a:r>
               <a:rPr lang="en-US" dirty="0" smtClean="0"/>
-              <a:t>Incorporates “</a:t>
-            </a:r>
-            <a:r>
-              <a:rPr lang="en-US" dirty="0" smtClean="0"/>
-              <a:t>Implicit” information</a:t>
+              <a:t>Incorporates “Implicit” information</a:t>
             </a:r>
             <a:br>
               <a:rPr lang="en-US" dirty="0" smtClean="0"/>
@@ -17000,11 +17114,7 @@
             </a:r>
             <a:r>
               <a:rPr lang="en-US" dirty="0" smtClean="0"/>
-              <a:t>ROC </a:t>
-            </a:r>
-            <a:r>
-              <a:rPr lang="en-US" dirty="0" smtClean="0"/>
-              <a:t>paths</a:t>
+              <a:t>ROC paths</a:t>
             </a:r>
             <a:endParaRPr lang="en-US" dirty="0"/>
           </a:p>
@@ -17148,7 +17258,6 @@
               <a:rPr lang="en-US" dirty="0"/>
               <a:t>paths</a:t>
             </a:r>
-            <a:endParaRPr lang="en-US" dirty="0"/>
           </a:p>
         </p:txBody>
       </p:sp>
@@ -17591,56 +17700,52 @@
           <a:p>
             <a:r>
               <a:rPr lang="en-US" sz="3600" dirty="0" smtClean="0"/>
-              <a:t>Timeline of NLSY Cohorts</a:t>
-            </a:r>
-          </a:p>
-          <a:p>
-            <a:r>
-              <a:rPr lang="en-US" sz="3600" dirty="0" smtClean="0"/>
-              <a:t>Linking subjects within a cohort</a:t>
-            </a:r>
-          </a:p>
-          <a:p>
-            <a:r>
-              <a:rPr lang="en-US" sz="3600" dirty="0" smtClean="0"/>
-              <a:t>Linking subjects across </a:t>
+              <a:t>Timeline of NLSY </a:t>
             </a:r>
             <a:r>
               <a:rPr lang="en-US" sz="3600" dirty="0" smtClean="0"/>
               <a:t>cohorts</a:t>
-            </a:r>
-          </a:p>
-          <a:p>
-            <a:r>
-              <a:rPr lang="en-US" sz="3600" dirty="0" smtClean="0"/>
-              <a:t>Construction of Links</a:t>
             </a:r>
             <a:endParaRPr lang="en-US" sz="3600" dirty="0" smtClean="0"/>
           </a:p>
           <a:p>
             <a:r>
               <a:rPr lang="en-US" sz="3600" dirty="0" smtClean="0"/>
-              <a:t>Products of Linking</a:t>
+              <a:t>Linking subjects within a cohort</a:t>
+            </a:r>
+          </a:p>
+          <a:p>
+            <a:r>
+              <a:rPr lang="en-US" sz="3600" dirty="0" smtClean="0"/>
+              <a:t>Linking subjects across cohorts</a:t>
+            </a:r>
+          </a:p>
+          <a:p>
+            <a:r>
+              <a:rPr lang="en-US" sz="3600" dirty="0" smtClean="0"/>
+              <a:t>Construction of </a:t>
+            </a:r>
+            <a:r>
+              <a:rPr lang="en-US" sz="3600" dirty="0" smtClean="0"/>
+              <a:t>links</a:t>
+            </a:r>
+            <a:endParaRPr lang="en-US" sz="3600" dirty="0" smtClean="0"/>
+          </a:p>
+          <a:p>
+            <a:r>
+              <a:rPr lang="en-US" sz="3600" dirty="0" smtClean="0"/>
+              <a:t>NlsyLinks:</a:t>
+            </a:r>
+            <a:r>
+              <a:rPr lang="en-US" sz="3600" dirty="0" smtClean="0"/>
+              <a:t/>
             </a:r>
             <a:br>
               <a:rPr lang="en-US" sz="3600" dirty="0" smtClean="0"/>
             </a:br>
             <a:r>
               <a:rPr lang="en-US" sz="2800" dirty="0" smtClean="0"/>
-              <a:t>(past, present, &amp; future)</a:t>
-            </a:r>
-          </a:p>
-          <a:p>
-            <a:r>
-              <a:rPr lang="en-US" sz="3600" dirty="0" smtClean="0"/>
-              <a:t>NlsyLinks</a:t>
-            </a:r>
-            <a:br>
-              <a:rPr lang="en-US" sz="3600" dirty="0" smtClean="0"/>
-            </a:br>
-            <a:r>
-              <a:rPr lang="en-US" sz="2800" dirty="0" smtClean="0"/>
-              <a:t>Utilities </a:t>
+              <a:t>Online utilities </a:t>
             </a:r>
             <a:r>
               <a:rPr lang="en-US" sz="2800" dirty="0"/>
@@ -17714,12 +17819,110 @@
           <a:lstStyle/>
           <a:p>
             <a:r>
+              <a:rPr lang="en-US" sz="4000" dirty="0" smtClean="0"/>
+              <a:t>Agreement of 2004 and 2013 Gen2 Links</a:t>
+            </a:r>
+            <a:endParaRPr lang="en-US" sz="4000" dirty="0"/>
+          </a:p>
+        </p:txBody>
+      </p:sp>
+      <p:sp>
+        <p:nvSpPr>
+          <p:cNvPr id="3" name="Content Placeholder 2"/>
+          <p:cNvSpPr>
+            <a:spLocks noGrp="1"/>
+          </p:cNvSpPr>
+          <p:nvPr>
+            <p:ph idx="1"/>
+          </p:nvPr>
+        </p:nvSpPr>
+        <p:spPr/>
+        <p:txBody>
+          <a:bodyPr/>
+          <a:lstStyle/>
+          <a:p>
+            <a:pPr marL="0" indent="0">
+              <a:buNone/>
+            </a:pPr>
+            <a:r>
+              <a:rPr lang="en-US" smtClean="0"/>
+              <a:t>TODO: Show </a:t>
+            </a:r>
+            <a:r>
               <a:rPr lang="en-US" dirty="0" smtClean="0"/>
-              <a:t>Future Challenge: Find </a:t>
-            </a:r>
+              <a:t>how many more links 2013 has than 2004.</a:t>
+            </a:r>
+            <a:endParaRPr lang="en-US" dirty="0"/>
+          </a:p>
+        </p:txBody>
+      </p:sp>
+    </p:spTree>
+    <p:extLst>
+      <p:ext uri="{BB962C8B-B14F-4D97-AF65-F5344CB8AC3E}">
+        <p14:creationId xmlns:p14="http://schemas.microsoft.com/office/powerpoint/2010/main" val="288309604"/>
+      </p:ext>
+    </p:extLst>
+  </p:cSld>
+  <p:clrMapOvr>
+    <a:masterClrMapping/>
+  </p:clrMapOvr>
+  <p:timing>
+    <p:tnLst>
+      <p:par>
+        <p:cTn id="1" dur="indefinite" restart="never" nodeType="tmRoot"/>
+      </p:par>
+    </p:tnLst>
+  </p:timing>
+</p:sld>
+</file>
+
+<file path=ppt/slides/slide21.xml><?xml version="1.0" encoding="utf-8"?>
+<p:sld xmlns:a="http://schemas.openxmlformats.org/drawingml/2006/main" xmlns:r="http://schemas.openxmlformats.org/officeDocument/2006/relationships" xmlns:p="http://schemas.openxmlformats.org/presentationml/2006/main">
+  <p:cSld>
+    <p:spTree>
+      <p:nvGrpSpPr>
+        <p:cNvPr id="1" name=""/>
+        <p:cNvGrpSpPr/>
+        <p:nvPr/>
+      </p:nvGrpSpPr>
+      <p:grpSpPr>
+        <a:xfrm>
+          <a:off x="0" y="0"/>
+          <a:ext cx="0" cy="0"/>
+          <a:chOff x="0" y="0"/>
+          <a:chExt cx="0" cy="0"/>
+        </a:xfrm>
+      </p:grpSpPr>
+      <p:sp>
+        <p:nvSpPr>
+          <p:cNvPr id="2" name="Title 1"/>
+          <p:cNvSpPr>
+            <a:spLocks noGrp="1"/>
+          </p:cNvSpPr>
+          <p:nvPr>
+            <p:ph type="title"/>
+          </p:nvPr>
+        </p:nvSpPr>
+        <p:spPr>
+          <a:xfrm>
+            <a:off x="76200" y="46038"/>
+            <a:ext cx="8991600" cy="715962"/>
+          </a:xfrm>
+          <a:solidFill>
+            <a:schemeClr val="bg1">
+              <a:lumMod val="75000"/>
+            </a:schemeClr>
+          </a:solidFill>
+        </p:spPr>
+        <p:txBody>
+          <a:bodyPr>
+            <a:noAutofit/>
+          </a:bodyPr>
+          <a:lstStyle/>
+          <a:p>
             <a:r>
               <a:rPr lang="en-US" dirty="0" smtClean="0"/>
-              <a:t>Other Links</a:t>
+              <a:t>Future Challenge: Find Other Links</a:t>
             </a:r>
             <a:endParaRPr lang="en-US" dirty="0"/>
           </a:p>
@@ -17749,29 +17952,38 @@
           <a:p>
             <a:r>
               <a:rPr lang="en-US" sz="2800" dirty="0" smtClean="0"/>
-              <a:t>Connecting within the Nlsy79 is only one extension</a:t>
-            </a:r>
+              <a:t>Connecting within the Nlsy79 is only one </a:t>
+            </a:r>
+            <a:r>
+              <a:rPr lang="en-US" sz="2800" dirty="0" smtClean="0"/>
+              <a:t>extension;</a:t>
+            </a:r>
+            <a:br>
+              <a:rPr lang="en-US" sz="2800" dirty="0" smtClean="0"/>
+            </a:br>
+            <a:r>
+              <a:rPr lang="en-US" sz="2800" dirty="0" smtClean="0"/>
+              <a:t>connecting the Nlsy79 and Nlsy97 is another candidate</a:t>
+            </a:r>
+            <a:endParaRPr lang="en-US" sz="2800" dirty="0" smtClean="0"/>
           </a:p>
           <a:p>
-            <a:r>
-              <a:rPr lang="en-US" sz="2800" dirty="0" smtClean="0"/>
-              <a:t>The Nlsy97 has 9,000 subjects born during the peak of the Nlsy79 Gen2’s births</a:t>
-            </a:r>
+            <a:endParaRPr lang="en-US" sz="2800" dirty="0" smtClean="0"/>
           </a:p>
           <a:p>
             <a:r>
               <a:rPr lang="en-US" sz="2800" dirty="0" smtClean="0"/>
-              <a:t>Using information about the ‘97 parents, we plan to identify “phantom mothers” and create ‘79 &amp; ’97 links of </a:t>
-            </a:r>
-            <a:r>
-              <a:rPr lang="en-US" sz="2800" i="1" dirty="0" smtClean="0"/>
-              <a:t>R</a:t>
+              <a:t>The </a:t>
             </a:r>
             <a:r>
               <a:rPr lang="en-US" sz="2800" dirty="0" smtClean="0"/>
-              <a:t>=0</a:t>
-            </a:r>
-            <a:endParaRPr lang="en-US" sz="2800" dirty="0"/>
+              <a:t>Nlsy97 has 9,000 subjects born during the peak of the Nlsy79 Gen2’s </a:t>
+            </a:r>
+            <a:r>
+              <a:rPr lang="en-US" sz="2800" dirty="0" smtClean="0"/>
+              <a:t>births</a:t>
+            </a:r>
+            <a:endParaRPr lang="en-US" sz="2800" dirty="0" smtClean="0"/>
           </a:p>
         </p:txBody>
       </p:sp>
@@ -17859,7 +18071,7 @@
 </p:sld>
 </file>
 
-<file path=ppt/slides/slide21.xml><?xml version="1.0" encoding="utf-8"?>
+<file path=ppt/slides/slide22.xml><?xml version="1.0" encoding="utf-8"?>
 <p:sld xmlns:a="http://schemas.openxmlformats.org/drawingml/2006/main" xmlns:r="http://schemas.openxmlformats.org/officeDocument/2006/relationships" xmlns:p="http://schemas.openxmlformats.org/presentationml/2006/main">
   <p:cSld>
     <p:spTree>
@@ -17938,12 +18150,12 @@
           <a:lstStyle/>
           <a:p>
             <a:r>
-              <a:rPr lang="en-US" dirty="0" err="1" smtClean="0"/>
-              <a:t>Datsets</a:t>
-            </a:r>
-            <a:r>
               <a:rPr lang="en-US" dirty="0" smtClean="0"/>
-              <a:t> that specify the </a:t>
+              <a:t>Datasets </a:t>
+            </a:r>
+            <a:r>
+              <a:rPr lang="en-US" dirty="0" smtClean="0"/>
+              <a:t>that specify the </a:t>
             </a:r>
             <a:r>
               <a:rPr lang="en-US" i="1" dirty="0" smtClean="0"/>
@@ -18603,7 +18815,7 @@
 </p:sld>
 </file>
 
-<file path=ppt/slides/slide22.xml><?xml version="1.0" encoding="utf-8"?>
+<file path=ppt/slides/slide23.xml><?xml version="1.0" encoding="utf-8"?>
 <p:sld xmlns:a="http://schemas.openxmlformats.org/drawingml/2006/main" xmlns:r="http://schemas.openxmlformats.org/officeDocument/2006/relationships" xmlns:p="http://schemas.openxmlformats.org/presentationml/2006/main">
   <p:cSld>
     <p:spTree>
@@ -20125,393 +20337,6 @@
     <p:extLst>
       <p:ext uri="{BB962C8B-B14F-4D97-AF65-F5344CB8AC3E}">
         <p14:creationId xmlns:p14="http://schemas.microsoft.com/office/powerpoint/2010/main" val="3156999607"/>
-      </p:ext>
-    </p:extLst>
-  </p:cSld>
-  <p:clrMapOvr>
-    <a:masterClrMapping/>
-  </p:clrMapOvr>
-  <p:timing>
-    <p:tnLst>
-      <p:par>
-        <p:cTn id="1" dur="indefinite" restart="never" nodeType="tmRoot"/>
-      </p:par>
-    </p:tnLst>
-  </p:timing>
-</p:sld>
-</file>
-
-<file path=ppt/slides/slide23.xml><?xml version="1.0" encoding="utf-8"?>
-<p:sld xmlns:a="http://schemas.openxmlformats.org/drawingml/2006/main" xmlns:r="http://schemas.openxmlformats.org/officeDocument/2006/relationships" xmlns:p="http://schemas.openxmlformats.org/presentationml/2006/main">
-  <p:cSld>
-    <p:spTree>
-      <p:nvGrpSpPr>
-        <p:cNvPr id="1" name=""/>
-        <p:cNvGrpSpPr/>
-        <p:nvPr/>
-      </p:nvGrpSpPr>
-      <p:grpSpPr>
-        <a:xfrm>
-          <a:off x="0" y="0"/>
-          <a:ext cx="0" cy="0"/>
-          <a:chOff x="0" y="0"/>
-          <a:chExt cx="0" cy="0"/>
-        </a:xfrm>
-      </p:grpSpPr>
-      <p:sp>
-        <p:nvSpPr>
-          <p:cNvPr id="2" name="Title 1"/>
-          <p:cNvSpPr>
-            <a:spLocks noGrp="1"/>
-          </p:cNvSpPr>
-          <p:nvPr>
-            <p:ph type="title"/>
-          </p:nvPr>
-        </p:nvSpPr>
-        <p:spPr>
-          <a:xfrm>
-            <a:off x="457200" y="0"/>
-            <a:ext cx="8229600" cy="609600"/>
-          </a:xfrm>
-        </p:spPr>
-        <p:txBody>
-          <a:bodyPr>
-            <a:normAutofit fontScale="90000"/>
-          </a:bodyPr>
-          <a:lstStyle/>
-          <a:p>
-            <a:r>
-              <a:rPr lang="en-US" dirty="0" smtClean="0">
-                <a:solidFill>
-                  <a:schemeClr val="bg1">
-                    <a:lumMod val="50000"/>
-                  </a:schemeClr>
-                </a:solidFill>
-              </a:rPr>
-              <a:t>Support Staff</a:t>
-            </a:r>
-            <a:endParaRPr lang="en-US" dirty="0">
-              <a:solidFill>
-                <a:schemeClr val="bg1">
-                  <a:lumMod val="50000"/>
-                </a:schemeClr>
-              </a:solidFill>
-            </a:endParaRPr>
-          </a:p>
-        </p:txBody>
-      </p:sp>
-      <p:sp>
-        <p:nvSpPr>
-          <p:cNvPr id="3" name="Content Placeholder 2"/>
-          <p:cNvSpPr>
-            <a:spLocks noGrp="1"/>
-          </p:cNvSpPr>
-          <p:nvPr>
-            <p:ph idx="1"/>
-          </p:nvPr>
-        </p:nvSpPr>
-        <p:spPr>
-          <a:xfrm>
-            <a:off x="152400" y="762000"/>
-            <a:ext cx="8991600" cy="6019800"/>
-          </a:xfrm>
-        </p:spPr>
-        <p:txBody>
-          <a:bodyPr>
-            <a:normAutofit/>
-          </a:bodyPr>
-          <a:lstStyle/>
-          <a:p>
-            <a:pPr marL="457200" indent="-457200">
-              <a:buNone/>
-            </a:pPr>
-            <a:r>
-              <a:rPr lang="en-US" b="1" dirty="0" smtClean="0"/>
-              <a:t>User forums on R-Forge</a:t>
-            </a:r>
-            <a:r>
-              <a:rPr lang="en-US" dirty="0" smtClean="0"/>
-              <a:t/>
-            </a:r>
-            <a:br>
-              <a:rPr lang="en-US" dirty="0" smtClean="0"/>
-            </a:br>
-            <a:r>
-              <a:rPr lang="en-US" sz="2800" dirty="0" smtClean="0">
-                <a:solidFill>
-                  <a:srgbClr val="3F7F4F"/>
-                </a:solidFill>
-              </a:rPr>
-              <a:t>r-forge.r-project.org/forum</a:t>
-            </a:r>
-            <a:r>
-              <a:rPr lang="en-US" sz="2800" dirty="0">
-                <a:solidFill>
-                  <a:srgbClr val="3F7F4F"/>
-                </a:solidFill>
-              </a:rPr>
-              <a:t>/?</a:t>
-            </a:r>
-            <a:r>
-              <a:rPr lang="en-US" sz="2800" dirty="0" err="1" smtClean="0">
-                <a:solidFill>
-                  <a:srgbClr val="3F7F4F"/>
-                </a:solidFill>
-              </a:rPr>
-              <a:t>group_id</a:t>
-            </a:r>
-            <a:r>
-              <a:rPr lang="en-US" sz="2800" dirty="0" smtClean="0">
-                <a:solidFill>
-                  <a:srgbClr val="3F7F4F"/>
-                </a:solidFill>
-              </a:rPr>
-              <a:t>=1330</a:t>
-            </a:r>
-          </a:p>
-          <a:p>
-            <a:pPr lvl="1"/>
-            <a:r>
-              <a:rPr lang="en-US" dirty="0" smtClean="0">
-                <a:solidFill>
-                  <a:srgbClr val="3F7F4F"/>
-                </a:solidFill>
-              </a:rPr>
-              <a:t>Specific </a:t>
-            </a:r>
-            <a:r>
-              <a:rPr lang="en-US" dirty="0" err="1" smtClean="0">
-                <a:solidFill>
-                  <a:srgbClr val="3F7F4F"/>
-                </a:solidFill>
-              </a:rPr>
-              <a:t>NlsyLinks</a:t>
-            </a:r>
-            <a:r>
-              <a:rPr lang="en-US" dirty="0">
-                <a:solidFill>
-                  <a:srgbClr val="3F7F4F"/>
-                </a:solidFill>
-              </a:rPr>
-              <a:t> issues </a:t>
-            </a:r>
-            <a:endParaRPr lang="en-US" dirty="0" smtClean="0">
-              <a:solidFill>
-                <a:srgbClr val="3F7F4F"/>
-              </a:solidFill>
-            </a:endParaRPr>
-          </a:p>
-          <a:p>
-            <a:pPr lvl="1"/>
-            <a:r>
-              <a:rPr lang="en-US" dirty="0" smtClean="0">
-                <a:solidFill>
-                  <a:srgbClr val="3F7F4F"/>
-                </a:solidFill>
-              </a:rPr>
-              <a:t>General BG issues</a:t>
-            </a:r>
-          </a:p>
-          <a:p>
-            <a:pPr lvl="1"/>
-            <a:r>
-              <a:rPr lang="en-US" dirty="0" err="1" smtClean="0">
-                <a:solidFill>
-                  <a:srgbClr val="3F7F4F"/>
-                </a:solidFill>
-              </a:rPr>
-              <a:t>OpenMx</a:t>
-            </a:r>
-            <a:r>
-              <a:rPr lang="en-US" dirty="0" smtClean="0">
-                <a:solidFill>
-                  <a:srgbClr val="3F7F4F"/>
-                </a:solidFill>
-              </a:rPr>
-              <a:t>, </a:t>
-            </a:r>
-            <a:r>
-              <a:rPr lang="en-US" dirty="0" err="1" smtClean="0">
-                <a:solidFill>
-                  <a:srgbClr val="3F7F4F"/>
-                </a:solidFill>
-              </a:rPr>
-              <a:t>lavaan</a:t>
-            </a:r>
-            <a:r>
-              <a:rPr lang="en-US" dirty="0" smtClean="0">
-                <a:solidFill>
-                  <a:srgbClr val="3F7F4F"/>
-                </a:solidFill>
-              </a:rPr>
-              <a:t>, SAS, </a:t>
-            </a:r>
-            <a:r>
-              <a:rPr lang="en-US" dirty="0" err="1" smtClean="0">
-                <a:solidFill>
-                  <a:srgbClr val="3F7F4F"/>
-                </a:solidFill>
-              </a:rPr>
-              <a:t>M</a:t>
-            </a:r>
-            <a:r>
-              <a:rPr lang="en-US" i="1" dirty="0" err="1" smtClean="0">
-                <a:solidFill>
-                  <a:srgbClr val="3F7F4F"/>
-                </a:solidFill>
-              </a:rPr>
-              <a:t>plus</a:t>
-            </a:r>
-            <a:endParaRPr lang="en-US" i="1" dirty="0" smtClean="0">
-              <a:solidFill>
-                <a:srgbClr val="3F7F4F"/>
-              </a:solidFill>
-            </a:endParaRPr>
-          </a:p>
-          <a:p>
-            <a:pPr marL="457200" lvl="1" indent="0">
-              <a:buNone/>
-            </a:pPr>
-            <a:endParaRPr lang="en-US" i="1" dirty="0"/>
-          </a:p>
-          <a:p>
-            <a:pPr marL="457200" indent="-457200">
-              <a:buNone/>
-            </a:pPr>
-            <a:r>
-              <a:rPr lang="en-US" b="1" dirty="0" smtClean="0"/>
-              <a:t>CRAN</a:t>
-            </a:r>
-            <a:r>
-              <a:rPr lang="en-US" dirty="0" smtClean="0"/>
-              <a:t/>
-            </a:r>
-            <a:br>
-              <a:rPr lang="en-US" dirty="0" smtClean="0"/>
-            </a:br>
-            <a:r>
-              <a:rPr lang="en-US" sz="2800" dirty="0" smtClean="0">
-                <a:solidFill>
-                  <a:srgbClr val="3F7F4F"/>
-                </a:solidFill>
-              </a:rPr>
-              <a:t>cran.r-project.org/web/packages/</a:t>
-            </a:r>
-            <a:r>
-              <a:rPr lang="en-US" sz="2800" dirty="0" err="1" smtClean="0">
-                <a:solidFill>
-                  <a:srgbClr val="3F7F4F"/>
-                </a:solidFill>
-              </a:rPr>
-              <a:t>NlsyLinks</a:t>
-            </a:r>
-            <a:endParaRPr lang="en-US" sz="2800" dirty="0">
-              <a:solidFill>
-                <a:srgbClr val="3F7F4F"/>
-              </a:solidFill>
-            </a:endParaRPr>
-          </a:p>
-          <a:p>
-            <a:pPr marL="457200" indent="-457200">
-              <a:buNone/>
-            </a:pPr>
-            <a:r>
-              <a:rPr lang="en-US" b="1" dirty="0" smtClean="0"/>
-              <a:t>Help </a:t>
-            </a:r>
-            <a:r>
-              <a:rPr lang="en-US" b="1" dirty="0" smtClean="0"/>
-              <a:t>over email</a:t>
-            </a:r>
-            <a:r>
-              <a:rPr lang="en-US" dirty="0" smtClean="0"/>
-              <a:t/>
-            </a:r>
-            <a:br>
-              <a:rPr lang="en-US" dirty="0" smtClean="0"/>
-            </a:br>
-            <a:r>
-              <a:rPr lang="en-US" sz="2400" dirty="0" smtClean="0">
-                <a:solidFill>
-                  <a:srgbClr val="3F7F4F"/>
-                </a:solidFill>
-              </a:rPr>
-              <a:t>Joe Rodgers (jrodgers@ou.edu</a:t>
-            </a:r>
-            <a:r>
-              <a:rPr lang="en-US" sz="2400" dirty="0" smtClean="0">
-                <a:solidFill>
-                  <a:srgbClr val="3F7F4F"/>
-                </a:solidFill>
-              </a:rPr>
-              <a:t>)</a:t>
-            </a:r>
-            <a:r>
-              <a:rPr lang="en-US" sz="2400" dirty="0">
-                <a:solidFill>
-                  <a:srgbClr val="3F7F4F"/>
-                </a:solidFill>
-              </a:rPr>
-              <a:t> </a:t>
-            </a:r>
-            <a:br>
-              <a:rPr lang="en-US" sz="2400" dirty="0">
-                <a:solidFill>
-                  <a:srgbClr val="3F7F4F"/>
-                </a:solidFill>
-              </a:rPr>
-            </a:br>
-            <a:r>
-              <a:rPr lang="en-US" sz="2400" dirty="0">
-                <a:solidFill>
-                  <a:srgbClr val="3F7F4F"/>
-                </a:solidFill>
-              </a:rPr>
-              <a:t>Will Beasley (whb4@ou.edu</a:t>
-            </a:r>
-            <a:r>
-              <a:rPr lang="en-US" sz="2400" dirty="0" smtClean="0">
-                <a:solidFill>
-                  <a:srgbClr val="3F7F4F"/>
-                </a:solidFill>
-              </a:rPr>
-              <a:t>)</a:t>
-            </a:r>
-            <a:r>
-              <a:rPr lang="en-US" sz="2400" dirty="0">
-                <a:solidFill>
-                  <a:srgbClr val="3F7F4F"/>
-                </a:solidFill>
-              </a:rPr>
-              <a:t> </a:t>
-            </a:r>
-            <a:br>
-              <a:rPr lang="en-US" sz="2400" dirty="0">
-                <a:solidFill>
-                  <a:srgbClr val="3F7F4F"/>
-                </a:solidFill>
-              </a:rPr>
-            </a:br>
-            <a:r>
-              <a:rPr lang="en-US" sz="2400" dirty="0" smtClean="0">
-                <a:solidFill>
-                  <a:srgbClr val="3F7F4F"/>
-                </a:solidFill>
-              </a:rPr>
-              <a:t>Mike Hunter (mhunter@ou.edu)</a:t>
-            </a:r>
-            <a:endParaRPr lang="en-US" sz="2400" dirty="0">
-              <a:solidFill>
-                <a:srgbClr val="3F7F4F"/>
-              </a:solidFill>
-            </a:endParaRPr>
-          </a:p>
-        </p:txBody>
-      </p:sp>
-    </p:spTree>
-    <p:extLst>
-      <p:ext uri="{BB962C8B-B14F-4D97-AF65-F5344CB8AC3E}">
-        <p14:creationId xmlns:p14="http://schemas.microsoft.com/office/powerpoint/2010/main" val="377114581"/>
       </p:ext>
     </p:extLst>
   </p:cSld>
@@ -20558,11 +20383,13 @@
         <p:spPr>
           <a:xfrm>
             <a:off x="457200" y="0"/>
-            <a:ext cx="8229600" cy="990600"/>
+            <a:ext cx="8229600" cy="609600"/>
           </a:xfrm>
         </p:spPr>
         <p:txBody>
-          <a:bodyPr/>
+          <a:bodyPr>
+            <a:normAutofit fontScale="90000"/>
+          </a:bodyPr>
           <a:lstStyle/>
           <a:p>
             <a:r>
@@ -20573,7 +20400,7 @@
                   </a:schemeClr>
                 </a:solidFill>
               </a:rPr>
-              <a:t>Applicability</a:t>
+              <a:t>Support Staff</a:t>
             </a:r>
             <a:endParaRPr lang="en-US" dirty="0">
               <a:solidFill>
@@ -20597,29 +20424,405 @@
         </p:nvSpPr>
         <p:spPr>
           <a:xfrm>
-            <a:off x="228600" y="1600200"/>
-            <a:ext cx="8458200" cy="5105400"/>
+            <a:off x="152400" y="762000"/>
+            <a:ext cx="8991600" cy="6019800"/>
+          </a:xfrm>
+        </p:spPr>
+        <p:txBody>
+          <a:bodyPr>
+            <a:normAutofit/>
+          </a:bodyPr>
+          <a:lstStyle/>
+          <a:p>
+            <a:pPr marL="457200" indent="-457200">
+              <a:buNone/>
+            </a:pPr>
+            <a:r>
+              <a:rPr lang="en-US" b="1" dirty="0" smtClean="0"/>
+              <a:t>User forums on R-Forge</a:t>
+            </a:r>
+            <a:r>
+              <a:rPr lang="en-US" dirty="0" smtClean="0"/>
+              <a:t/>
+            </a:r>
+            <a:br>
+              <a:rPr lang="en-US" dirty="0" smtClean="0"/>
+            </a:br>
+            <a:r>
+              <a:rPr lang="en-US" sz="2800" dirty="0" smtClean="0">
+                <a:solidFill>
+                  <a:srgbClr val="3F7F4F"/>
+                </a:solidFill>
+              </a:rPr>
+              <a:t>r-forge.r-project.org/forum</a:t>
+            </a:r>
+            <a:r>
+              <a:rPr lang="en-US" sz="2800" dirty="0">
+                <a:solidFill>
+                  <a:srgbClr val="3F7F4F"/>
+                </a:solidFill>
+              </a:rPr>
+              <a:t>/?</a:t>
+            </a:r>
+            <a:r>
+              <a:rPr lang="en-US" sz="2800" dirty="0" err="1" smtClean="0">
+                <a:solidFill>
+                  <a:srgbClr val="3F7F4F"/>
+                </a:solidFill>
+              </a:rPr>
+              <a:t>group_id</a:t>
+            </a:r>
+            <a:r>
+              <a:rPr lang="en-US" sz="2800" dirty="0" smtClean="0">
+                <a:solidFill>
+                  <a:srgbClr val="3F7F4F"/>
+                </a:solidFill>
+              </a:rPr>
+              <a:t>=1330</a:t>
+            </a:r>
+          </a:p>
+          <a:p>
+            <a:pPr lvl="1"/>
+            <a:r>
+              <a:rPr lang="en-US" dirty="0" smtClean="0">
+                <a:solidFill>
+                  <a:srgbClr val="3F7F4F"/>
+                </a:solidFill>
+              </a:rPr>
+              <a:t>Specific </a:t>
+            </a:r>
+            <a:r>
+              <a:rPr lang="en-US" dirty="0" err="1" smtClean="0">
+                <a:solidFill>
+                  <a:srgbClr val="3F7F4F"/>
+                </a:solidFill>
+              </a:rPr>
+              <a:t>NlsyLinks</a:t>
+            </a:r>
+            <a:r>
+              <a:rPr lang="en-US" dirty="0">
+                <a:solidFill>
+                  <a:srgbClr val="3F7F4F"/>
+                </a:solidFill>
+              </a:rPr>
+              <a:t> issues </a:t>
+            </a:r>
+            <a:endParaRPr lang="en-US" dirty="0" smtClean="0">
+              <a:solidFill>
+                <a:srgbClr val="3F7F4F"/>
+              </a:solidFill>
+            </a:endParaRPr>
+          </a:p>
+          <a:p>
+            <a:pPr lvl="1"/>
+            <a:r>
+              <a:rPr lang="en-US" dirty="0" smtClean="0">
+                <a:solidFill>
+                  <a:srgbClr val="3F7F4F"/>
+                </a:solidFill>
+              </a:rPr>
+              <a:t>General BG issues</a:t>
+            </a:r>
+          </a:p>
+          <a:p>
+            <a:pPr lvl="1"/>
+            <a:r>
+              <a:rPr lang="en-US" dirty="0" err="1" smtClean="0">
+                <a:solidFill>
+                  <a:srgbClr val="3F7F4F"/>
+                </a:solidFill>
+              </a:rPr>
+              <a:t>OpenMx</a:t>
+            </a:r>
+            <a:r>
+              <a:rPr lang="en-US" dirty="0" smtClean="0">
+                <a:solidFill>
+                  <a:srgbClr val="3F7F4F"/>
+                </a:solidFill>
+              </a:rPr>
+              <a:t>, </a:t>
+            </a:r>
+            <a:r>
+              <a:rPr lang="en-US" dirty="0" err="1" smtClean="0">
+                <a:solidFill>
+                  <a:srgbClr val="3F7F4F"/>
+                </a:solidFill>
+              </a:rPr>
+              <a:t>lavaan</a:t>
+            </a:r>
+            <a:r>
+              <a:rPr lang="en-US" dirty="0" smtClean="0">
+                <a:solidFill>
+                  <a:srgbClr val="3F7F4F"/>
+                </a:solidFill>
+              </a:rPr>
+              <a:t>, SAS, </a:t>
+            </a:r>
+            <a:r>
+              <a:rPr lang="en-US" dirty="0" err="1" smtClean="0">
+                <a:solidFill>
+                  <a:srgbClr val="3F7F4F"/>
+                </a:solidFill>
+              </a:rPr>
+              <a:t>M</a:t>
+            </a:r>
+            <a:r>
+              <a:rPr lang="en-US" i="1" dirty="0" err="1" smtClean="0">
+                <a:solidFill>
+                  <a:srgbClr val="3F7F4F"/>
+                </a:solidFill>
+              </a:rPr>
+              <a:t>plus</a:t>
+            </a:r>
+            <a:endParaRPr lang="en-US" i="1" dirty="0" smtClean="0">
+              <a:solidFill>
+                <a:srgbClr val="3F7F4F"/>
+              </a:solidFill>
+            </a:endParaRPr>
+          </a:p>
+          <a:p>
+            <a:pPr marL="457200" lvl="1" indent="0">
+              <a:buNone/>
+            </a:pPr>
+            <a:endParaRPr lang="en-US" i="1" dirty="0"/>
+          </a:p>
+          <a:p>
+            <a:pPr marL="457200" indent="-457200">
+              <a:buNone/>
+            </a:pPr>
+            <a:r>
+              <a:rPr lang="en-US" b="1" dirty="0" smtClean="0"/>
+              <a:t>CRAN</a:t>
+            </a:r>
+            <a:r>
+              <a:rPr lang="en-US" dirty="0" smtClean="0"/>
+              <a:t/>
+            </a:r>
+            <a:br>
+              <a:rPr lang="en-US" dirty="0" smtClean="0"/>
+            </a:br>
+            <a:r>
+              <a:rPr lang="en-US" sz="2800" dirty="0" smtClean="0">
+                <a:solidFill>
+                  <a:srgbClr val="3F7F4F"/>
+                </a:solidFill>
+              </a:rPr>
+              <a:t>cran.r-project.org/web/packages/</a:t>
+            </a:r>
+            <a:r>
+              <a:rPr lang="en-US" sz="2800" dirty="0" err="1" smtClean="0">
+                <a:solidFill>
+                  <a:srgbClr val="3F7F4F"/>
+                </a:solidFill>
+              </a:rPr>
+              <a:t>NlsyLinks</a:t>
+            </a:r>
+            <a:endParaRPr lang="en-US" sz="2800" dirty="0">
+              <a:solidFill>
+                <a:srgbClr val="3F7F4F"/>
+              </a:solidFill>
+            </a:endParaRPr>
+          </a:p>
+          <a:p>
+            <a:pPr marL="457200" indent="-457200">
+              <a:buNone/>
+            </a:pPr>
+            <a:r>
+              <a:rPr lang="en-US" b="1" dirty="0" smtClean="0"/>
+              <a:t>Help over email</a:t>
+            </a:r>
+            <a:r>
+              <a:rPr lang="en-US" dirty="0" smtClean="0"/>
+              <a:t/>
+            </a:r>
+            <a:br>
+              <a:rPr lang="en-US" dirty="0" smtClean="0"/>
+            </a:br>
+            <a:r>
+              <a:rPr lang="en-US" sz="2400" dirty="0" smtClean="0">
+                <a:solidFill>
+                  <a:srgbClr val="3F7F4F"/>
+                </a:solidFill>
+              </a:rPr>
+              <a:t>Joe Rodgers (jrodgers@ou.edu)</a:t>
+            </a:r>
+            <a:r>
+              <a:rPr lang="en-US" sz="2400" dirty="0">
+                <a:solidFill>
+                  <a:srgbClr val="3F7F4F"/>
+                </a:solidFill>
+              </a:rPr>
+              <a:t> </a:t>
+            </a:r>
+            <a:br>
+              <a:rPr lang="en-US" sz="2400" dirty="0">
+                <a:solidFill>
+                  <a:srgbClr val="3F7F4F"/>
+                </a:solidFill>
+              </a:rPr>
+            </a:br>
+            <a:r>
+              <a:rPr lang="en-US" sz="2400" dirty="0">
+                <a:solidFill>
+                  <a:srgbClr val="3F7F4F"/>
+                </a:solidFill>
+              </a:rPr>
+              <a:t>Will Beasley (whb4@ou.edu</a:t>
+            </a:r>
+            <a:r>
+              <a:rPr lang="en-US" sz="2400" dirty="0" smtClean="0">
+                <a:solidFill>
+                  <a:srgbClr val="3F7F4F"/>
+                </a:solidFill>
+              </a:rPr>
+              <a:t>)</a:t>
+            </a:r>
+            <a:r>
+              <a:rPr lang="en-US" sz="2400" dirty="0">
+                <a:solidFill>
+                  <a:srgbClr val="3F7F4F"/>
+                </a:solidFill>
+              </a:rPr>
+              <a:t> </a:t>
+            </a:r>
+            <a:br>
+              <a:rPr lang="en-US" sz="2400" dirty="0">
+                <a:solidFill>
+                  <a:srgbClr val="3F7F4F"/>
+                </a:solidFill>
+              </a:rPr>
+            </a:br>
+            <a:r>
+              <a:rPr lang="en-US" sz="2400" dirty="0" smtClean="0">
+                <a:solidFill>
+                  <a:srgbClr val="3F7F4F"/>
+                </a:solidFill>
+              </a:rPr>
+              <a:t>Mike Hunter (mhunter@ou.edu)</a:t>
+            </a:r>
+            <a:endParaRPr lang="en-US" sz="2400" dirty="0">
+              <a:solidFill>
+                <a:srgbClr val="3F7F4F"/>
+              </a:solidFill>
+            </a:endParaRPr>
+          </a:p>
+        </p:txBody>
+      </p:sp>
+    </p:spTree>
+    <p:extLst>
+      <p:ext uri="{BB962C8B-B14F-4D97-AF65-F5344CB8AC3E}">
+        <p14:creationId xmlns:p14="http://schemas.microsoft.com/office/powerpoint/2010/main" val="377114581"/>
+      </p:ext>
+    </p:extLst>
+  </p:cSld>
+  <p:clrMapOvr>
+    <a:masterClrMapping/>
+  </p:clrMapOvr>
+  <p:timing>
+    <p:tnLst>
+      <p:par>
+        <p:cTn id="1" dur="indefinite" restart="never" nodeType="tmRoot"/>
+      </p:par>
+    </p:tnLst>
+  </p:timing>
+</p:sld>
+</file>
+
+<file path=ppt/slides/slide25.xml><?xml version="1.0" encoding="utf-8"?>
+<p:sld xmlns:a="http://schemas.openxmlformats.org/drawingml/2006/main" xmlns:r="http://schemas.openxmlformats.org/officeDocument/2006/relationships" xmlns:p="http://schemas.openxmlformats.org/presentationml/2006/main">
+  <p:cSld>
+    <p:spTree>
+      <p:nvGrpSpPr>
+        <p:cNvPr id="1" name=""/>
+        <p:cNvGrpSpPr/>
+        <p:nvPr/>
+      </p:nvGrpSpPr>
+      <p:grpSpPr>
+        <a:xfrm>
+          <a:off x="0" y="0"/>
+          <a:ext cx="0" cy="0"/>
+          <a:chOff x="0" y="0"/>
+          <a:chExt cx="0" cy="0"/>
+        </a:xfrm>
+      </p:grpSpPr>
+      <p:sp>
+        <p:nvSpPr>
+          <p:cNvPr id="2" name="Title 1"/>
+          <p:cNvSpPr>
+            <a:spLocks noGrp="1"/>
+          </p:cNvSpPr>
+          <p:nvPr>
+            <p:ph type="title"/>
+          </p:nvPr>
+        </p:nvSpPr>
+        <p:spPr>
+          <a:xfrm>
+            <a:off x="457200" y="0"/>
+            <a:ext cx="8229600" cy="990600"/>
           </a:xfrm>
         </p:spPr>
         <p:txBody>
           <a:bodyPr/>
           <a:lstStyle/>
           <a:p>
+            <a:r>
+              <a:rPr lang="en-US" dirty="0" smtClean="0">
+                <a:solidFill>
+                  <a:schemeClr val="bg1">
+                    <a:lumMod val="50000"/>
+                  </a:schemeClr>
+                </a:solidFill>
+              </a:rPr>
+              <a:t>Applicability</a:t>
+            </a:r>
+            <a:endParaRPr lang="en-US" dirty="0">
+              <a:solidFill>
+                <a:schemeClr val="bg1">
+                  <a:lumMod val="50000"/>
+                </a:schemeClr>
+              </a:solidFill>
+            </a:endParaRPr>
+          </a:p>
+        </p:txBody>
+      </p:sp>
+      <p:sp>
+        <p:nvSpPr>
+          <p:cNvPr id="3" name="Content Placeholder 2"/>
+          <p:cNvSpPr>
+            <a:spLocks noGrp="1"/>
+          </p:cNvSpPr>
+          <p:nvPr>
+            <p:ph idx="1"/>
+          </p:nvPr>
+        </p:nvSpPr>
+        <p:spPr>
+          <a:xfrm>
+            <a:off x="228600" y="914400"/>
+            <a:ext cx="8458200" cy="5791200"/>
+          </a:xfrm>
+        </p:spPr>
+        <p:txBody>
+          <a:bodyPr>
+            <a:normAutofit lnSpcReduction="10000"/>
+          </a:bodyPr>
+          <a:lstStyle/>
+          <a:p>
             <a:pPr marL="0" indent="0">
               <a:buNone/>
             </a:pPr>
             <a:r>
               <a:rPr lang="en-US" b="1" dirty="0" smtClean="0"/>
-              <a:t>Kinship links are </a:t>
-            </a:r>
-            <a:r>
-              <a:rPr lang="en-US" b="1" i="1" dirty="0"/>
-              <a:t>not</a:t>
-            </a:r>
-            <a:r>
-              <a:rPr lang="en-US" b="1" dirty="0"/>
-              <a:t> restricted to </a:t>
-            </a:r>
+              <a:t>The kinship </a:t>
+            </a:r>
+            <a:r>
+              <a:rPr lang="en-US" b="1" dirty="0" smtClean="0"/>
+              <a:t>links </a:t>
+            </a:r>
+            <a:r>
+              <a:rPr lang="en-US" b="1" dirty="0" smtClean="0"/>
+              <a:t>can be used</a:t>
+            </a:r>
+            <a:endParaRPr lang="en-US" b="1" dirty="0"/>
           </a:p>
           <a:p>
             <a:pPr lvl="1"/>
@@ -20629,18 +20832,23 @@
                   <a:srgbClr val="3F7F4F"/>
                 </a:solidFill>
               </a:rPr>
-              <a:t>R</a:t>
-            </a:r>
+              <a:t>anywhere in R –not just with NlsyLinks</a:t>
+            </a:r>
+            <a:endParaRPr lang="en-US" dirty="0" smtClean="0">
+              <a:solidFill>
+                <a:srgbClr val="3F7F4F"/>
+              </a:solidFill>
+            </a:endParaRPr>
           </a:p>
           <a:p>
             <a:pPr lvl="1"/>
             <a:r>
-              <a:rPr lang="en-US" dirty="0" err="1" smtClean="0">
+              <a:rPr lang="en-US" dirty="0" smtClean="0">
                 <a:solidFill>
                   <a:srgbClr val="3F7F4F"/>
                 </a:solidFill>
               </a:rPr>
-              <a:t>NlsyLinks</a:t>
+              <a:t>with any statistical software that reads CSVs</a:t>
             </a:r>
             <a:endParaRPr lang="en-US" dirty="0" smtClean="0">
               <a:solidFill>
@@ -20657,21 +20865,10 @@
               <a:buNone/>
             </a:pPr>
             <a:r>
-              <a:rPr lang="en-US" b="1" dirty="0" err="1"/>
-              <a:t>NlsyLinks</a:t>
-            </a:r>
-            <a:r>
-              <a:rPr lang="en-US" b="1" dirty="0"/>
-              <a:t> is </a:t>
-            </a:r>
-            <a:r>
-              <a:rPr lang="en-US" b="1" i="1" dirty="0"/>
-              <a:t>not</a:t>
-            </a:r>
-            <a:r>
-              <a:rPr lang="en-US" b="1" dirty="0"/>
-              <a:t> restricted to </a:t>
-            </a:r>
+              <a:rPr lang="en-US" b="1" dirty="0" smtClean="0"/>
+              <a:t>The NlsyLinks package can be used beyond</a:t>
+            </a:r>
+            <a:endParaRPr lang="en-US" b="1" dirty="0"/>
           </a:p>
           <a:p>
             <a:pPr lvl="1"/>
@@ -20693,6 +20890,47 @@
                 </a:solidFill>
               </a:rPr>
               <a:t>NLSY</a:t>
+            </a:r>
+          </a:p>
+          <a:p>
+            <a:pPr lvl="1"/>
+            <a:endParaRPr lang="en-US" dirty="0"/>
+          </a:p>
+          <a:p>
+            <a:pPr marL="0" indent="0">
+              <a:buNone/>
+            </a:pPr>
+            <a:r>
+              <a:rPr lang="en-US" b="1" dirty="0" smtClean="0"/>
+              <a:t>All relevant code is public &amp; open source</a:t>
+            </a:r>
+            <a:endParaRPr lang="en-US" b="1" dirty="0"/>
+          </a:p>
+          <a:p>
+            <a:pPr lvl="1"/>
+            <a:r>
+              <a:rPr lang="en-US" dirty="0" smtClean="0">
+                <a:solidFill>
+                  <a:srgbClr val="3F7F4F"/>
+                </a:solidFill>
+              </a:rPr>
+              <a:t>Code for the package is on R-Forge</a:t>
+            </a:r>
+            <a:endParaRPr lang="en-US" dirty="0">
+              <a:solidFill>
+                <a:srgbClr val="3F7F4F"/>
+              </a:solidFill>
+            </a:endParaRPr>
+          </a:p>
+          <a:p>
+            <a:pPr lvl="1"/>
+            <a:r>
+              <a:rPr lang="en-US" dirty="0" smtClean="0">
+                <a:solidFill>
+                  <a:srgbClr val="3F7F4F"/>
+                </a:solidFill>
+              </a:rPr>
+              <a:t>Code for determining the links is on GitHub</a:t>
             </a:r>
             <a:endParaRPr lang="en-US" dirty="0">
               <a:solidFill>
@@ -20722,7 +20960,7 @@
 </p:sld>
 </file>
 
-<file path=ppt/slides/slide25.xml><?xml version="1.0" encoding="utf-8"?>
+<file path=ppt/slides/slide26.xml><?xml version="1.0" encoding="utf-8"?>
 <p:sld xmlns:a="http://schemas.openxmlformats.org/drawingml/2006/main" xmlns:r="http://schemas.openxmlformats.org/officeDocument/2006/relationships" xmlns:p="http://schemas.openxmlformats.org/presentationml/2006/main">
   <p:cSld>
     <p:spTree>

</xml_diff>

<commit_message>
Working on BGA presentation
</commit_message>
<xml_diff>
--- a/Publications/2013France/BeasleyBga2013-NlsyLinks.pptx
+++ b/Publications/2013France/BeasleyBga2013-NlsyLinks.pptx
@@ -649,7 +649,15 @@
             </a:pPr>
             <a:r>
               <a:rPr lang="en-US" dirty="0" smtClean="0"/>
-              <a:t>Here are the 10 links by restricting yourself to only the 2</a:t>
+              <a:t>Here are the 10 links remaining after</a:t>
+            </a:r>
+            <a:r>
+              <a:rPr lang="en-US" baseline="0" dirty="0" smtClean="0"/>
+              <a:t> </a:t>
+            </a:r>
+            <a:r>
+              <a:rPr lang="en-US" dirty="0" smtClean="0"/>
+              <a:t>restricting yourself to only the 2</a:t>
             </a:r>
             <a:r>
               <a:rPr lang="en-US" baseline="30000" dirty="0" smtClean="0"/>
@@ -665,7 +673,7 @@
             </a:r>
             <a:r>
               <a:rPr lang="en-US" dirty="0" smtClean="0"/>
-              <a:t>(siblings as cousins).</a:t>
+              <a:t>(siblings and cousins).</a:t>
             </a:r>
           </a:p>
         </p:txBody>
@@ -936,7 +944,7 @@
             </a:r>
             <a:r>
               <a:rPr lang="en-US" baseline="0" dirty="0" smtClean="0"/>
-              <a:t> here’s the 28 links that are potentially available if your model accommodates everyone’s possible relationship.  Our linking dataset provides this, and it’s your choice which subjects and/or relationships you choose to exclude.</a:t>
+              <a:t> here are the 28 links that are potentially available if your model accommodates everyone’s possible relationship.  Our linking dataset provides this (all 28), and it’s your choice which subjects and/or relationships you choose to exclude.</a:t>
             </a:r>
             <a:endParaRPr lang="en-US" dirty="0"/>
           </a:p>
@@ -1028,7 +1036,7 @@
             </a:r>
             <a:r>
               <a:rPr lang="en-US" baseline="0" dirty="0" smtClean="0"/>
-              <a:t> in the Nlsy79.  If there’s a research question that is appropriate to consider all biological links in an extended family, you can get an enormous jump in sample size.</a:t>
+              <a:t> in the Nlsy79.  If there’s a research question where it is appropriate to consider all biological links in an extended family, you can get an enormous jump in sample size.</a:t>
             </a:r>
           </a:p>
           <a:p>
@@ -1037,7 +1045,7 @@
           <a:p>
             <a:r>
               <a:rPr lang="en-US" baseline="0" dirty="0" smtClean="0"/>
-              <a:t>There are two types of jumps in sample size.  The first is the absolute number of pairs, which is easily seen from the middle row of the table.  The second is the amount of information </a:t>
+              <a:t>There are two types of jumps in sample size.  The first is the absolute number of pairs, which is easily seen from the white row of the table.  The second type is the amount of information </a:t>
             </a:r>
             <a:r>
               <a:rPr lang="en-US" i="1" baseline="0" dirty="0" smtClean="0"/>
@@ -1066,7 +1074,7 @@
           <a:p>
             <a:r>
               <a:rPr lang="en-US" baseline="0" dirty="0" smtClean="0"/>
-              <a:t>And regardless of sample size, there may be some research questions that are approachable only if you use both two generations.</a:t>
+              <a:t>And regardless of sample size, there may be some research questions that are approachable only by incorporating both two generations.</a:t>
             </a:r>
             <a:endParaRPr lang="en-US" dirty="0" smtClean="0"/>
           </a:p>
@@ -1166,7 +1174,7 @@
             </a:r>
             <a:r>
               <a:rPr lang="en-US" dirty="0" smtClean="0"/>
-              <a:t>.  You don’t need to replicate this.</a:t>
+              <a:t>.  You don’t need to replicate this.  But I’ll mention a few issues anyway.</a:t>
             </a:r>
           </a:p>
           <a:p>
@@ -1267,11 +1275,15 @@
           <a:p>
             <a:r>
               <a:rPr lang="en-US" dirty="0" smtClean="0"/>
-              <a:t>This revised</a:t>
+              <a:t>This </a:t>
+            </a:r>
+            <a:r>
+              <a:rPr lang="en-US" dirty="0" smtClean="0"/>
+              <a:t>revisited </a:t>
             </a:r>
             <a:r>
               <a:rPr lang="en-US" baseline="0" dirty="0" smtClean="0"/>
-              <a:t> diagram </a:t>
+              <a:t>diagram </a:t>
             </a:r>
             <a:r>
               <a:rPr lang="en-US" dirty="0" smtClean="0"/>
@@ -1279,7 +1291,11 @@
             </a:r>
             <a:r>
               <a:rPr lang="en-US" baseline="0" dirty="0" smtClean="0"/>
-              <a:t> of the implicit items.  The </a:t>
+              <a:t> of the implicit items.  </a:t>
+            </a:r>
+            <a:r>
+              <a:rPr lang="en-US" baseline="0" dirty="0" smtClean="0"/>
+              <a:t>People were born here, and started the survey here.  The </a:t>
             </a:r>
             <a:r>
               <a:rPr lang="en-US" baseline="0" dirty="0" err="1" smtClean="0"/>
@@ -1287,11 +1303,19 @@
             </a:r>
             <a:r>
               <a:rPr lang="en-US" baseline="0" dirty="0" smtClean="0"/>
-              <a:t> weren’t asked until 2006, and based on lags in the subject ages, </a:t>
+              <a:t> weren’t asked until </a:t>
             </a:r>
             <a:r>
               <a:rPr lang="en-US" baseline="0" dirty="0" smtClean="0"/>
-              <a:t>many families cannot be completed solely without using implicit items until around 2022.</a:t>
+              <a:t>2006,  [[[CUT: and </a:t>
+            </a:r>
+            <a:r>
+              <a:rPr lang="en-US" baseline="0" dirty="0" smtClean="0"/>
+              <a:t>based on lags in the subject ages, </a:t>
+            </a:r>
+            <a:r>
+              <a:rPr lang="en-US" baseline="0" dirty="0" smtClean="0"/>
+              <a:t>many families cannot be completed without using implicit items until around 2022.]]]</a:t>
             </a:r>
           </a:p>
           <a:p>
@@ -1308,7 +1332,15 @@
             </a:r>
             <a:r>
               <a:rPr lang="en-US" baseline="0" dirty="0" smtClean="0"/>
-              <a:t>been decades of attrition and death.  Implicit items (which have been asked since 1979) are the best way to get to the families before they’re unreachable.  Getting to Gen1 subjects is especially important, because you could be interested in their responses when the were young.  And because linking two Gen1 Housemates opens up cousin links and aunt/niece links.</a:t>
+              <a:t>been decades of attrition and death.  Implicit items (which have been asked since </a:t>
+            </a:r>
+            <a:r>
+              <a:rPr lang="en-US" baseline="0" dirty="0" smtClean="0"/>
+              <a:t>the beginning) </a:t>
+            </a:r>
+            <a:r>
+              <a:rPr lang="en-US" baseline="0" dirty="0" smtClean="0"/>
+              <a:t>are the best way to get to the families before they’re unreachable.  Getting to Gen1 subjects is especially important, because you could be interested in their responses when the were young.  And because linking two Gen1 Housemates opens up cousin links and aunt/niece links.</a:t>
             </a:r>
             <a:endParaRPr lang="en-US" dirty="0"/>
           </a:p>
@@ -1408,7 +1440,7 @@
             </a:r>
             <a:r>
               <a:rPr lang="en-US" baseline="0" dirty="0" smtClean="0"/>
-              <a:t>, and monitored their progress during the algorithm’s development.  Each number is the algorithm’s version, ranging from 1 to 60 something.  If you’re familiar with Response Operating Characteristic Curves, you want to be in the top left corner.  This is the corner where there’s high true positives, and low false positives.</a:t>
+              <a:t>, and monitored their agreement during the algorithm’s development.  Each number in the graph is the algorithm’s version, ranging from 1 to 60 something.  If you’re familiar with Receiver Operating Characteristic Curves, you want to be in the top left corner.  This is the corner where there’s high true positives, and low false positives.</a:t>
             </a:r>
           </a:p>
           <a:p>
@@ -1417,7 +1449,7 @@
           <a:p>
             <a:r>
               <a:rPr lang="en-US" baseline="0" dirty="0" smtClean="0"/>
-              <a:t>This graph is zoomed it.</a:t>
+              <a:t>This graph is zoomed in on the movement.</a:t>
             </a:r>
             <a:endParaRPr lang="en-US" dirty="0"/>
           </a:p>
@@ -1521,7 +1553,11 @@
             </a:r>
             <a:r>
               <a:rPr lang="en-US" dirty="0" smtClean="0"/>
-              <a:t>1 ratio.  We were happy with this.</a:t>
+              <a:t>1 ratio of agreement to disagreement.  I’m pretty happy</a:t>
+            </a:r>
+            <a:r>
+              <a:rPr lang="en-US" baseline="0" dirty="0" smtClean="0"/>
+              <a:t> with this graph.</a:t>
             </a:r>
             <a:endParaRPr lang="en-US" dirty="0"/>
           </a:p>
@@ -1609,15 +1645,15 @@
           <a:p>
             <a:r>
               <a:rPr lang="en-US" dirty="0" smtClean="0"/>
-              <a:t>For those of you who have used previous version of our links, here’s the agreement between those</a:t>
+              <a:t>For those of you who have used previous versions of our links, here’s the agreement between those</a:t>
             </a:r>
             <a:r>
               <a:rPr lang="en-US" baseline="0" dirty="0" smtClean="0"/>
-              <a:t> and the versions we’ve released in the past year.  There’s a </a:t>
+              <a:t> old ones, and the versions we’ve released in the past year.  There’s a </a:t>
             </a:r>
             <a:r>
               <a:rPr lang="en-US" dirty="0" smtClean="0"/>
-              <a:t>22.7 </a:t>
+              <a:t>23 </a:t>
             </a:r>
             <a:r>
               <a:rPr lang="en-US" dirty="0" smtClean="0"/>
@@ -1625,7 +1661,7 @@
             </a:r>
             <a:r>
               <a:rPr lang="en-US" dirty="0" smtClean="0"/>
-              <a:t>1 ratio for agreement to disagreement.</a:t>
+              <a:t>1 ratio.</a:t>
             </a:r>
           </a:p>
           <a:p>
@@ -1638,7 +1674,7 @@
             </a:r>
             <a:r>
               <a:rPr lang="en-US" baseline="0" dirty="0" smtClean="0"/>
-              <a:t> I was coding the current version, I never looked at the code used for the older links.  And we used fairly different development approaches.  We’re pretty happy with this graph.</a:t>
+              <a:t> I was coding the current version, I never looked at the code used for the older links.  And we used fairly different software development approaches.  The developers of the previous versions are even happier with this graph.</a:t>
             </a:r>
             <a:endParaRPr lang="en-US" dirty="0"/>
           </a:p>
@@ -1738,7 +1774,7 @@
             </a:r>
             <a:r>
               <a:rPr lang="en-US" baseline="0" dirty="0" smtClean="0"/>
-              <a:t>and across.  Then I’ll mention a few points about how the interpersonal relationships were constructed.  And finally about how </a:t>
+              <a:t>and across cohorts.  Then I’ll mention a few points about how the interpersonal relationships were constructed.  And finally about how </a:t>
             </a:r>
             <a:r>
               <a:rPr lang="en-US" baseline="0" dirty="0" smtClean="0"/>
@@ -1934,7 +1970,7 @@
           <a:p>
             <a:r>
               <a:rPr lang="en-US" dirty="0" smtClean="0"/>
-              <a:t>And of course, agreement and sample size are</a:t>
+              <a:t>And of course, agreement and sample size aren’t</a:t>
             </a:r>
             <a:r>
               <a:rPr lang="en-US" baseline="0" dirty="0" smtClean="0"/>
@@ -2030,7 +2066,7 @@
             </a:r>
             <a:r>
               <a:rPr lang="en-US" baseline="0" dirty="0" smtClean="0"/>
-              <a:t>the two generations of the Nlsy79 is just one connecting.  Because the Nlsy97 shares many design and demographic characteristics with 79, we’re beginning to identify ways to incorporate all three cohorts.</a:t>
+              <a:t>the two generations of the Nlsy79 is just one connection.  Because the Nlsy97 shares many design and demographic characteristics with 79, we’re beginning to identify ways to incorporate all three cohorts.</a:t>
             </a:r>
             <a:endParaRPr lang="en-US" dirty="0"/>
           </a:p>
@@ -2122,7 +2158,7 @@
             </a:r>
             <a:r>
               <a:rPr lang="en-US" baseline="0" dirty="0" smtClean="0"/>
-              <a:t> how you can use these links today in your own research. In addition to the linking file (which specifies the R values for links), our R package contains many supplemental functions and material to decrease the time spent on plumbing and data manipulation, so you can concentrate on the issues specific to your research question.</a:t>
+              <a:t> how you can use these links today in your own research. In addition to the linking file (which specifies the R values for pairs), our software package contains many supplemental functions and materials that decrease the time spent on plumbing and data manipulation, so you can concentrate on the issues specific to your research question.</a:t>
             </a:r>
             <a:endParaRPr lang="en-US" dirty="0"/>
           </a:p>
@@ -2210,15 +2246,15 @@
           <a:p>
             <a:r>
               <a:rPr lang="en-US" dirty="0" smtClean="0"/>
-              <a:t>If you have</a:t>
+              <a:t>If you already have</a:t>
             </a:r>
             <a:r>
               <a:rPr lang="en-US" baseline="0" dirty="0" smtClean="0"/>
-              <a:t> a single value per subject, you can go from</a:t>
+              <a:t> a single value per subject, you can </a:t>
             </a:r>
             <a:r>
               <a:rPr lang="en-US" dirty="0" smtClean="0"/>
-              <a:t> run an entire univariate ACE model with less than 14 lines of code.</a:t>
+              <a:t>run an entire univariate ACE model with less than 14 lines of code.</a:t>
             </a:r>
             <a:endParaRPr lang="en-US" dirty="0" smtClean="0"/>
           </a:p>
@@ -2411,7 +2447,7 @@
           <a:lstStyle/>
           <a:p>
             <a:r>
-              <a:rPr lang="en-US" smtClean="0"/>
+              <a:rPr lang="en-US" dirty="0" smtClean="0"/>
               <a:t>The </a:t>
             </a:r>
             <a:r>
@@ -2420,7 +2456,15 @@
             </a:r>
             <a:r>
               <a:rPr lang="en-US" baseline="0" dirty="0" smtClean="0"/>
-              <a:t> if your not using our package or R</a:t>
+              <a:t> if your not using our package </a:t>
+            </a:r>
+            <a:r>
+              <a:rPr lang="en-US" baseline="0" dirty="0" smtClean="0"/>
+              <a:t>or even using </a:t>
+            </a:r>
+            <a:r>
+              <a:rPr lang="en-US" baseline="0" dirty="0" smtClean="0"/>
+              <a:t>R</a:t>
             </a:r>
           </a:p>
           <a:p>
@@ -2529,7 +2573,7 @@
             </a:r>
             <a:r>
               <a:rPr lang="en-US" baseline="0" dirty="0" smtClean="0"/>
-              <a:t>in the first cohort have been surveyed as the 2</a:t>
+              <a:t>of the first cohort …  became the 2</a:t>
             </a:r>
             <a:r>
               <a:rPr lang="en-US" baseline="30000" dirty="0" smtClean="0"/>
@@ -2537,7 +2581,7 @@
             </a:r>
             <a:r>
               <a:rPr lang="en-US" baseline="0" dirty="0" smtClean="0"/>
-              <a:t> cohort for the past 27 years.  Finally a third cohort started 16 years ago, and was designed to be a replication of the first cohort –although they are not genetically related to any subjects in the first two cohorts.</a:t>
+              <a:t> cohort.  They have been surveyed for the past 27 years.  Finally a third cohort started 16 years ago, and was designed to be a replication of the first cohort –although they are not genetically related to any subjects in 79</a:t>
             </a:r>
             <a:endParaRPr lang="en-US" dirty="0" smtClean="0"/>
           </a:p>
@@ -2547,11 +2591,11 @@
           <a:p>
             <a:r>
               <a:rPr lang="en-US" dirty="0" smtClean="0"/>
-              <a:t>The second cohort might be the most used by researchers</a:t>
+              <a:t>Of the three cohorts, the second might be the most used by researchers</a:t>
             </a:r>
             <a:r>
               <a:rPr lang="en-US" baseline="0" dirty="0" smtClean="0"/>
-              <a:t> in this room.  It </a:t>
+              <a:t> in this room.  It’s the ‘children’. It </a:t>
             </a:r>
             <a:r>
               <a:rPr lang="en-US" dirty="0" smtClean="0"/>
@@ -2566,12 +2610,16 @@
               <a:t> or the </a:t>
             </a:r>
             <a:r>
-              <a:rPr lang="en-US" u="sng" dirty="0" smtClean="0"/>
+              <a:rPr lang="en-US" u="sng" dirty="0" err="1" smtClean="0"/>
               <a:t>C</a:t>
             </a:r>
             <a:r>
+              <a:rPr lang="en-US" dirty="0" err="1" smtClean="0"/>
+              <a:t>Nlsy</a:t>
+            </a:r>
+            <a:r>
               <a:rPr lang="en-US" dirty="0" smtClean="0"/>
-              <a:t>Nlsy79.</a:t>
+              <a:t>.</a:t>
             </a:r>
             <a:r>
               <a:rPr lang="en-US" baseline="0" dirty="0" smtClean="0"/>
@@ -2583,7 +2631,7 @@
             </a:r>
             <a:r>
               <a:rPr lang="en-US" baseline="0" dirty="0" smtClean="0"/>
-              <a:t> team, we’ve mostly stopped using these terms because we’ve started conceptualizing it as one big sample containing two related generations.  It many senses, the responses collected from the second generation can be viewed as outcomes of the first generation.  Likewise, the parents in the first generation provide many responses that can be viewed as explanatory variables for the 2</a:t>
+              <a:t> team, we’ve mostly stopped using these terms because we conceptualize it as one big sample containing two related generations.  It many senses, the responses collected from the second generation can be viewed as outcomes of the first generation.  Likewise, the parents in the first generation provide many responses that can be viewed as explanatory variables for the 2</a:t>
             </a:r>
             <a:r>
               <a:rPr lang="en-US" baseline="30000" dirty="0" smtClean="0"/>
@@ -2591,7 +2639,16 @@
             </a:r>
             <a:r>
               <a:rPr lang="en-US" baseline="0" dirty="0" smtClean="0"/>
-              <a:t> generation.  Depending on your research, there can be big advantages using one cohort to augment the other.  There are also survey items that provide information about the 3</a:t>
+              <a:t> generation.  Depending on your research, there can be big advantages of using one cohort to augment the other.  </a:t>
+            </a:r>
+          </a:p>
+          <a:p>
+            <a:endParaRPr lang="en-US" baseline="0" dirty="0" smtClean="0"/>
+          </a:p>
+          <a:p>
+            <a:r>
+              <a:rPr lang="en-US" baseline="0" dirty="0" smtClean="0"/>
+              <a:t>There are also survey items that provide information about the 3</a:t>
             </a:r>
             <a:r>
               <a:rPr lang="en-US" baseline="30000" dirty="0" smtClean="0"/>
@@ -2847,7 +2904,15 @@
             </a:r>
             <a:r>
               <a:rPr lang="en-US" baseline="0" dirty="0" smtClean="0"/>
-              <a:t> row is the second generation of the </a:t>
+              <a:t> row </a:t>
+            </a:r>
+            <a:r>
+              <a:rPr lang="en-US" baseline="0" dirty="0" smtClean="0"/>
+              <a:t>up is </a:t>
+            </a:r>
+            <a:r>
+              <a:rPr lang="en-US" baseline="0" dirty="0" smtClean="0"/>
+              <a:t>the second generation of the </a:t>
             </a:r>
             <a:r>
               <a:rPr lang="en-US" baseline="0" dirty="0" smtClean="0"/>
@@ -2984,7 +3049,7 @@
           <a:p>
             <a:r>
               <a:rPr lang="en-US" baseline="0" dirty="0" smtClean="0"/>
-              <a:t>As the arrows indicate, the surveys for all three cohorts are still being collected.  Likewise the fertility of the two younger cohorts is still in progress.  While the fertility of the oldest cohort is virtually complete.</a:t>
+              <a:t>As the arrows indicate, the surveys for all three cohorts are still being collected.  Likewise the fertility of the two younger cohorts is still in progress.  However, the fertility of the oldest cohort is virtually complete.  This closure can be a benefit to researchers of life cycles.</a:t>
             </a:r>
             <a:endParaRPr lang="en-US" dirty="0"/>
           </a:p>
@@ -3076,7 +3141,7 @@
             </a:r>
             <a:r>
               <a:rPr lang="en-US" baseline="0" dirty="0" smtClean="0"/>
-              <a:t> demonstrate some of the statistical benefits of combining both 79 generations.  Here’s an example family with three siblings in the first generation.  And then the two sisters later have some kids.</a:t>
+              <a:t> demonstrate some of the statistical benefits of combining both 79 generations.  Here’s an example pedigree with three siblings in the first generation.  And then the two sisters later have some kids.</a:t>
             </a:r>
           </a:p>
           <a:p>
@@ -3093,7 +3158,7 @@
             </a:r>
             <a:r>
               <a:rPr lang="en-US" baseline="0" dirty="0" smtClean="0"/>
-              <a:t> generation, you have three unique links (because 3-choose-2 is 3). If you consider only the 2</a:t>
+              <a:t> generation, you have only three unique links (because 3-choose-2 is 3). If you consider only the 2</a:t>
             </a:r>
             <a:r>
               <a:rPr lang="en-US" baseline="30000" dirty="0" smtClean="0"/>
@@ -3101,7 +3166,7 @@
             </a:r>
             <a:r>
               <a:rPr lang="en-US" baseline="0" dirty="0" smtClean="0"/>
-              <a:t> generation, you get 4 links (1 from this pair and 3 from these sibs).  If you take these same 4 subjects, but now consider the cousin links as well as sibling, your count is now 250% the size (from 4 to 10).  Likewise, when you include all the intra and intergenerational links, you jump from 7 to 28 links.</a:t>
+              <a:t> generation nuclear families, you get 4 links (1 from this pair and 3 from these sibs).  If you take these same 5 subjects, but now consider the cousin links as well as sibling, your count is now 250% the size (jumps from 4 to 10).  Likewise, when you include all the intra and intergenerational relationships, you jump from 7 to 28 links.</a:t>
             </a:r>
           </a:p>
           <a:p>
@@ -3110,7 +3175,7 @@
           <a:p>
             <a:r>
               <a:rPr lang="en-US" baseline="0" dirty="0" smtClean="0"/>
-              <a:t>Clearly there can be a statistical advantage with this example pedigree, but there’s also a real advantage in the NLSY sample, as seen in the bottom row.</a:t>
+              <a:t>Clearly there can be a statistical advantage with this example pedigree, but there’s also a real advantage in the NLSY sample, as seen in the bottom row.  These are the counts of the unique links, depending on what information you include and exclude.</a:t>
             </a:r>
             <a:endParaRPr lang="en-US" dirty="0"/>
           </a:p>
@@ -3290,7 +3355,7 @@
           <a:p>
             <a:r>
               <a:rPr lang="en-US" dirty="0" smtClean="0"/>
-              <a:t>Here are the 7 links by restricting yourself to only nuclear families</a:t>
+              <a:t>Here are the 7 links remaining after restricting yourself to only nuclear families</a:t>
             </a:r>
             <a:endParaRPr lang="en-US" dirty="0"/>
           </a:p>

</xml_diff>

<commit_message>
France presentation after 2nd BG meeting
</commit_message>
<xml_diff>
--- a/Publications/2013France/BeasleyBga2013-NlsyLinks.pptx
+++ b/Publications/2013France/BeasleyBga2013-NlsyLinks.pptx
@@ -32,8 +32,8 @@
     <p:sldId id="279" r:id="rId23"/>
     <p:sldId id="280" r:id="rId24"/>
     <p:sldId id="281" r:id="rId25"/>
-    <p:sldId id="285" r:id="rId26"/>
-    <p:sldId id="284" r:id="rId27"/>
+    <p:sldId id="284" r:id="rId26"/>
+    <p:sldId id="285" r:id="rId27"/>
     <p:sldId id="282" r:id="rId28"/>
   </p:sldIdLst>
   <p:sldSz cx="9144000" cy="6858000" type="screen4x3"/>
@@ -133,6 +133,22 @@
       </a:defRPr>
     </a:lvl9pPr>
   </p:defaultTextStyle>
+  <p:extLst>
+    <p:ext uri="{EFAFB233-063F-42B5-8137-9DF3F51BA10A}">
+      <p15:sldGuideLst xmlns:p15="http://schemas.microsoft.com/office/powerpoint/2012/main">
+        <p15:guide id="1" orient="horz" pos="2160">
+          <p15:clr>
+            <a:srgbClr val="A4A3A4"/>
+          </p15:clr>
+        </p15:guide>
+        <p15:guide id="2" pos="2880">
+          <p15:clr>
+            <a:srgbClr val="A4A3A4"/>
+          </p15:clr>
+        </p15:guide>
+      </p15:sldGuideLst>
+    </p:ext>
+  </p:extLst>
 </p:presentation>
 </file>
 
@@ -218,7 +234,7 @@
           <a:p>
             <a:fld id="{6BE767AE-DD8E-4EA5-A843-143952EC906E}" type="datetimeFigureOut">
               <a:rPr lang="en-US" smtClean="0"/>
-              <a:t>6/19/2013</a:t>
+              <a:t>6/20/2013</a:t>
             </a:fld>
             <a:endParaRPr lang="en-US"/>
           </a:p>
@@ -1032,7 +1048,15 @@
           <a:p>
             <a:r>
               <a:rPr lang="en-US" dirty="0" smtClean="0"/>
-              <a:t>Let’s return to the bottom row showing the number of pairs</a:t>
+              <a:t>Let’s return to the </a:t>
+            </a:r>
+            <a:r>
+              <a:rPr lang="en-US" dirty="0" smtClean="0"/>
+              <a:t>white row </a:t>
+            </a:r>
+            <a:r>
+              <a:rPr lang="en-US" dirty="0" smtClean="0"/>
+              <a:t>showing the number of pairs</a:t>
             </a:r>
             <a:r>
               <a:rPr lang="en-US" baseline="0" dirty="0" smtClean="0"/>
@@ -1162,7 +1186,15 @@
           <a:p>
             <a:r>
               <a:rPr lang="en-US" dirty="0" smtClean="0"/>
-              <a:t>The NIH has paid us to construct and distribute the links.  You don’t need to replicate this.  But I’ll mention a few issues anyway.</a:t>
+              <a:t>The NIH has </a:t>
+            </a:r>
+            <a:r>
+              <a:rPr lang="en-US" dirty="0" smtClean="0"/>
+              <a:t>funded us </a:t>
+            </a:r>
+            <a:r>
+              <a:rPr lang="en-US" dirty="0" smtClean="0"/>
+              <a:t>to construct and distribute the links.  You don’t need to replicate this.  But I’ll mention a few issues anyway.</a:t>
             </a:r>
           </a:p>
           <a:p>
@@ -1802,7 +1834,20 @@
             </a:r>
             <a:r>
               <a:rPr lang="en-US" baseline="0" dirty="0" smtClean="0"/>
-              <a:t>  Gen1 has about 10% of what it used to have.  Gen2 is around 20%.</a:t>
+              <a:t>  Gen1 has about 10% of what it used to have.  Gen2 is around 20</a:t>
+            </a:r>
+            <a:r>
+              <a:rPr lang="en-US" baseline="0" dirty="0" smtClean="0"/>
+              <a:t>%.</a:t>
+            </a:r>
+          </a:p>
+          <a:p>
+            <a:endParaRPr lang="en-US" baseline="0" dirty="0" smtClean="0"/>
+          </a:p>
+          <a:p>
+            <a:r>
+              <a:rPr lang="en-US" baseline="0" dirty="0" smtClean="0"/>
+              <a:t>Increased statistical power is nice.  But in our opinion, the big advantage is the number of families exclude becomes almost negligible.  We’ve always been a little concerned that the families who were difficult to classify could be fundamentally different than the families who were easy to classify.</a:t>
             </a:r>
             <a:endParaRPr lang="en-US" dirty="0"/>
           </a:p>
@@ -1894,7 +1939,19 @@
             </a:r>
             <a:r>
               <a:rPr lang="en-US" baseline="0" dirty="0" smtClean="0"/>
-              <a:t> useful if the biometric properties aren’t good.  So we monitored the ACE estimates of several variables after every stage of the algorithm’s development.</a:t>
+              <a:t> useful if the biometric properties aren’t good.  So we monitored the ACE estimates of several variables after every stage of the algorithm’s development</a:t>
+            </a:r>
+            <a:r>
+              <a:rPr lang="en-US" baseline="0" dirty="0" smtClean="0"/>
+              <a:t>.  The example on the screen </a:t>
+            </a:r>
+            <a:r>
+              <a:rPr lang="en-US" baseline="0" smtClean="0"/>
+              <a:t>is adult height </a:t>
+            </a:r>
+            <a:r>
+              <a:rPr lang="en-US" baseline="0" dirty="0" smtClean="0"/>
+              <a:t>of the first cohort.</a:t>
             </a:r>
             <a:endParaRPr lang="en-US" dirty="0"/>
           </a:p>
@@ -2275,13 +2332,22 @@
           <a:p>
             <a:r>
               <a:rPr lang="en-US" dirty="0" smtClean="0"/>
-              <a:t>Finally, we have online forums intended</a:t>
+              <a:t>The kinship links will work in any software, even</a:t>
             </a:r>
             <a:r>
               <a:rPr lang="en-US" baseline="0" dirty="0" smtClean="0"/>
-              <a:t> for kinship users, regardless if you use R.</a:t>
-            </a:r>
-            <a:endParaRPr lang="en-US" dirty="0" smtClean="0"/>
+              <a:t> if your not using our package or even using R</a:t>
+            </a:r>
+          </a:p>
+          <a:p>
+            <a:endParaRPr lang="en-US" baseline="0" dirty="0" smtClean="0"/>
+          </a:p>
+          <a:p>
+            <a:r>
+              <a:rPr lang="en-US" baseline="0" dirty="0" smtClean="0"/>
+              <a:t>And our package has features that should help beyond BG and the NLSY.</a:t>
+            </a:r>
+            <a:endParaRPr lang="en-US" dirty="0"/>
           </a:p>
         </p:txBody>
       </p:sp>
@@ -2311,7 +2377,7 @@
     </p:spTree>
     <p:extLst>
       <p:ext uri="{BB962C8B-B14F-4D97-AF65-F5344CB8AC3E}">
-        <p14:creationId xmlns:p14="http://schemas.microsoft.com/office/powerpoint/2010/main" val="60804661"/>
+        <p14:creationId xmlns:p14="http://schemas.microsoft.com/office/powerpoint/2010/main" val="1106347731"/>
       </p:ext>
     </p:extLst>
   </p:cSld>
@@ -2367,22 +2433,25 @@
           <a:p>
             <a:r>
               <a:rPr lang="en-US" dirty="0" smtClean="0"/>
-              <a:t>The kinship links will work in any software, even</a:t>
+              <a:t>Finally, we have online forums intended</a:t>
             </a:r>
             <a:r>
               <a:rPr lang="en-US" baseline="0" dirty="0" smtClean="0"/>
-              <a:t> if your not using our package or even using R</a:t>
-            </a:r>
-          </a:p>
-          <a:p>
-            <a:endParaRPr lang="en-US" baseline="0" dirty="0" smtClean="0"/>
-          </a:p>
-          <a:p>
+              <a:t> for kinship users, regardless if you use R</a:t>
+            </a:r>
             <a:r>
               <a:rPr lang="en-US" baseline="0" dirty="0" smtClean="0"/>
-              <a:t>And our package has features that should help beyond BG and the NLSY.</a:t>
-            </a:r>
-            <a:endParaRPr lang="en-US" dirty="0"/>
+              <a:t>.  And you can always email us, or Google “</a:t>
+            </a:r>
+            <a:r>
+              <a:rPr lang="en-US" baseline="0" dirty="0" err="1" smtClean="0"/>
+              <a:t>NlsyLinks</a:t>
+            </a:r>
+            <a:r>
+              <a:rPr lang="en-US" baseline="0" dirty="0" smtClean="0"/>
+              <a:t>”</a:t>
+            </a:r>
+            <a:endParaRPr lang="en-US" dirty="0" smtClean="0"/>
           </a:p>
         </p:txBody>
       </p:sp>
@@ -2412,7 +2481,7 @@
     </p:spTree>
     <p:extLst>
       <p:ext uri="{BB962C8B-B14F-4D97-AF65-F5344CB8AC3E}">
-        <p14:creationId xmlns:p14="http://schemas.microsoft.com/office/powerpoint/2010/main" val="1106347731"/>
+        <p14:creationId xmlns:p14="http://schemas.microsoft.com/office/powerpoint/2010/main" val="60804661"/>
       </p:ext>
     </p:extLst>
   </p:cSld>
@@ -2872,7 +2941,11 @@
           <a:p>
             <a:r>
               <a:rPr lang="en-US" baseline="0" dirty="0" smtClean="0"/>
-              <a:t>As the arrows indicate, the surveys for all three cohorts are still being collected.  Likewise the fertility of the two younger cohorts is still in progress.  However, the fertility of the oldest cohort is virtually complete.  This closure can be a benefit to researchers of life cycles.</a:t>
+              <a:t>As the arrows indicate, the surveys for all three cohorts are still being collected.  Likewise the fertility of the two younger cohorts is still in progress.  However, the fertility of the oldest cohort is virtually complete.  This closure can be a benefit to </a:t>
+            </a:r>
+            <a:r>
+              <a:rPr lang="en-US" baseline="0" dirty="0" smtClean="0"/>
+              <a:t>life course researchers</a:t>
             </a:r>
             <a:endParaRPr lang="en-US" dirty="0"/>
           </a:p>
@@ -3402,7 +3475,7 @@
             <a:fld id="{1D8BD707-D9CF-40AE-B4C6-C98DA3205C09}" type="datetimeFigureOut">
               <a:rPr lang="en-US" smtClean="0"/>
               <a:pPr/>
-              <a:t>6/19/2013</a:t>
+              <a:t>6/20/2013</a:t>
             </a:fld>
             <a:endParaRPr lang="en-US"/>
           </a:p>
@@ -3569,7 +3642,7 @@
             <a:fld id="{1D8BD707-D9CF-40AE-B4C6-C98DA3205C09}" type="datetimeFigureOut">
               <a:rPr lang="en-US" smtClean="0"/>
               <a:pPr/>
-              <a:t>6/19/2013</a:t>
+              <a:t>6/20/2013</a:t>
             </a:fld>
             <a:endParaRPr lang="en-US"/>
           </a:p>
@@ -3746,7 +3819,7 @@
             <a:fld id="{1D8BD707-D9CF-40AE-B4C6-C98DA3205C09}" type="datetimeFigureOut">
               <a:rPr lang="en-US" smtClean="0"/>
               <a:pPr/>
-              <a:t>6/19/2013</a:t>
+              <a:t>6/20/2013</a:t>
             </a:fld>
             <a:endParaRPr lang="en-US"/>
           </a:p>
@@ -3913,7 +3986,7 @@
             <a:fld id="{1D8BD707-D9CF-40AE-B4C6-C98DA3205C09}" type="datetimeFigureOut">
               <a:rPr lang="en-US" smtClean="0"/>
               <a:pPr/>
-              <a:t>6/19/2013</a:t>
+              <a:t>6/20/2013</a:t>
             </a:fld>
             <a:endParaRPr lang="en-US"/>
           </a:p>
@@ -4156,7 +4229,7 @@
             <a:fld id="{1D8BD707-D9CF-40AE-B4C6-C98DA3205C09}" type="datetimeFigureOut">
               <a:rPr lang="en-US" smtClean="0"/>
               <a:pPr/>
-              <a:t>6/19/2013</a:t>
+              <a:t>6/20/2013</a:t>
             </a:fld>
             <a:endParaRPr lang="en-US"/>
           </a:p>
@@ -4441,7 +4514,7 @@
             <a:fld id="{1D8BD707-D9CF-40AE-B4C6-C98DA3205C09}" type="datetimeFigureOut">
               <a:rPr lang="en-US" smtClean="0"/>
               <a:pPr/>
-              <a:t>6/19/2013</a:t>
+              <a:t>6/20/2013</a:t>
             </a:fld>
             <a:endParaRPr lang="en-US"/>
           </a:p>
@@ -4860,7 +4933,7 @@
             <a:fld id="{1D8BD707-D9CF-40AE-B4C6-C98DA3205C09}" type="datetimeFigureOut">
               <a:rPr lang="en-US" smtClean="0"/>
               <a:pPr/>
-              <a:t>6/19/2013</a:t>
+              <a:t>6/20/2013</a:t>
             </a:fld>
             <a:endParaRPr lang="en-US"/>
           </a:p>
@@ -4975,7 +5048,7 @@
             <a:fld id="{1D8BD707-D9CF-40AE-B4C6-C98DA3205C09}" type="datetimeFigureOut">
               <a:rPr lang="en-US" smtClean="0"/>
               <a:pPr/>
-              <a:t>6/19/2013</a:t>
+              <a:t>6/20/2013</a:t>
             </a:fld>
             <a:endParaRPr lang="en-US"/>
           </a:p>
@@ -5067,7 +5140,7 @@
             <a:fld id="{1D8BD707-D9CF-40AE-B4C6-C98DA3205C09}" type="datetimeFigureOut">
               <a:rPr lang="en-US" smtClean="0"/>
               <a:pPr/>
-              <a:t>6/19/2013</a:t>
+              <a:t>6/20/2013</a:t>
             </a:fld>
             <a:endParaRPr lang="en-US"/>
           </a:p>
@@ -5341,7 +5414,7 @@
             <a:fld id="{1D8BD707-D9CF-40AE-B4C6-C98DA3205C09}" type="datetimeFigureOut">
               <a:rPr lang="en-US" smtClean="0"/>
               <a:pPr/>
-              <a:t>6/19/2013</a:t>
+              <a:t>6/20/2013</a:t>
             </a:fld>
             <a:endParaRPr lang="en-US"/>
           </a:p>
@@ -5591,7 +5664,7 @@
             <a:fld id="{1D8BD707-D9CF-40AE-B4C6-C98DA3205C09}" type="datetimeFigureOut">
               <a:rPr lang="en-US" smtClean="0"/>
               <a:pPr/>
-              <a:t>6/19/2013</a:t>
+              <a:t>6/20/2013</a:t>
             </a:fld>
             <a:endParaRPr lang="en-US"/>
           </a:p>
@@ -5801,7 +5874,7 @@
             <a:fld id="{1D8BD707-D9CF-40AE-B4C6-C98DA3205C09}" type="datetimeFigureOut">
               <a:rPr lang="en-US" smtClean="0"/>
               <a:pPr/>
-              <a:t>6/19/2013</a:t>
+              <a:t>6/20/2013</a:t>
             </a:fld>
             <a:endParaRPr lang="en-US"/>
           </a:p>
@@ -9041,7 +9114,7 @@
       </p:sp>
       <p:pic>
         <p:nvPicPr>
-          <p:cNvPr id="5" name="Picture 3"/>
+          <p:cNvPr id="6" name="Picture 3"/>
           <p:cNvPicPr>
             <a:picLocks noChangeAspect="1" noChangeArrowheads="1"/>
           </p:cNvPicPr>
@@ -9062,45 +9135,22 @@
         </p:blipFill>
         <p:spPr bwMode="auto">
           <a:xfrm>
-            <a:off x="1143000" y="5077354"/>
-            <a:ext cx="2819400" cy="1669124"/>
+            <a:off x="1103895" y="4381765"/>
+            <a:ext cx="3925305" cy="2323835"/>
           </a:xfrm>
           <a:prstGeom prst="rect">
             <a:avLst/>
           </a:prstGeom>
-          <a:noFill/>
+          <a:solidFill>
+            <a:srgbClr val="FFFFFF">
+              <a:alpha val="80000"/>
+            </a:srgbClr>
+          </a:solidFill>
           <a:ln>
             <a:noFill/>
           </a:ln>
           <a:effectLst/>
-          <a:extLst>
-            <a:ext uri="{909E8E84-426E-40DD-AFC4-6F175D3DCCD1}">
-              <a14:hiddenFill xmlns:a14="http://schemas.microsoft.com/office/drawing/2010/main">
-                <a:solidFill>
-                  <a:schemeClr val="accent1"/>
-                </a:solidFill>
-              </a14:hiddenFill>
-            </a:ext>
-            <a:ext uri="{91240B29-F687-4F45-9708-019B960494DF}">
-              <a14:hiddenLine xmlns:a14="http://schemas.microsoft.com/office/drawing/2010/main" w="9525">
-                <a:solidFill>
-                  <a:schemeClr val="tx1"/>
-                </a:solidFill>
-                <a:miter lim="800000"/>
-                <a:headEnd/>
-                <a:tailEnd/>
-              </a14:hiddenLine>
-            </a:ext>
-            <a:ext uri="{AF507438-7753-43E0-B8FC-AC1667EBCBE1}">
-              <a14:hiddenEffects xmlns:a14="http://schemas.microsoft.com/office/drawing/2010/main">
-                <a:effectLst>
-                  <a:outerShdw dist="35921" dir="2700000" algn="ctr" rotWithShape="0">
-                    <a:schemeClr val="bg2"/>
-                  </a:outerShdw>
-                </a:effectLst>
-              </a14:hiddenEffects>
-            </a:ext>
-          </a:extLst>
+          <a:extLst/>
         </p:spPr>
       </p:pic>
     </p:spTree>
@@ -11843,7 +11893,7 @@
       </p:sp>
       <p:pic>
         <p:nvPicPr>
-          <p:cNvPr id="5" name="Picture 3"/>
+          <p:cNvPr id="6" name="Picture 3"/>
           <p:cNvPicPr>
             <a:picLocks noChangeAspect="1" noChangeArrowheads="1"/>
           </p:cNvPicPr>
@@ -11864,45 +11914,22 @@
         </p:blipFill>
         <p:spPr bwMode="auto">
           <a:xfrm>
-            <a:off x="1143000" y="5077354"/>
-            <a:ext cx="2819400" cy="1669124"/>
+            <a:off x="1103895" y="4381765"/>
+            <a:ext cx="3925305" cy="2323835"/>
           </a:xfrm>
           <a:prstGeom prst="rect">
             <a:avLst/>
           </a:prstGeom>
-          <a:noFill/>
+          <a:solidFill>
+            <a:srgbClr val="FFFFFF">
+              <a:alpha val="80000"/>
+            </a:srgbClr>
+          </a:solidFill>
           <a:ln>
             <a:noFill/>
           </a:ln>
           <a:effectLst/>
-          <a:extLst>
-            <a:ext uri="{909E8E84-426E-40DD-AFC4-6F175D3DCCD1}">
-              <a14:hiddenFill xmlns:a14="http://schemas.microsoft.com/office/drawing/2010/main">
-                <a:solidFill>
-                  <a:schemeClr val="accent1"/>
-                </a:solidFill>
-              </a14:hiddenFill>
-            </a:ext>
-            <a:ext uri="{91240B29-F687-4F45-9708-019B960494DF}">
-              <a14:hiddenLine xmlns:a14="http://schemas.microsoft.com/office/drawing/2010/main" w="9525">
-                <a:solidFill>
-                  <a:schemeClr val="tx1"/>
-                </a:solidFill>
-                <a:miter lim="800000"/>
-                <a:headEnd/>
-                <a:tailEnd/>
-              </a14:hiddenLine>
-            </a:ext>
-            <a:ext uri="{AF507438-7753-43E0-B8FC-AC1667EBCBE1}">
-              <a14:hiddenEffects xmlns:a14="http://schemas.microsoft.com/office/drawing/2010/main">
-                <a:effectLst>
-                  <a:outerShdw dist="35921" dir="2700000" algn="ctr" rotWithShape="0">
-                    <a:schemeClr val="bg2"/>
-                  </a:outerShdw>
-                </a:effectLst>
-              </a14:hiddenEffects>
-            </a:ext>
-          </a:extLst>
+          <a:extLst/>
         </p:spPr>
       </p:pic>
     </p:spTree>
@@ -14649,7 +14676,7 @@
       </p:sp>
       <p:pic>
         <p:nvPicPr>
-          <p:cNvPr id="5" name="Picture 3"/>
+          <p:cNvPr id="6" name="Picture 3"/>
           <p:cNvPicPr>
             <a:picLocks noChangeAspect="1" noChangeArrowheads="1"/>
           </p:cNvPicPr>
@@ -14670,45 +14697,22 @@
         </p:blipFill>
         <p:spPr bwMode="auto">
           <a:xfrm>
-            <a:off x="1143000" y="5077354"/>
-            <a:ext cx="2819400" cy="1669124"/>
+            <a:off x="1103895" y="4381765"/>
+            <a:ext cx="3925305" cy="2323835"/>
           </a:xfrm>
           <a:prstGeom prst="rect">
             <a:avLst/>
           </a:prstGeom>
-          <a:noFill/>
+          <a:solidFill>
+            <a:srgbClr val="FFFFFF">
+              <a:alpha val="80000"/>
+            </a:srgbClr>
+          </a:solidFill>
           <a:ln>
             <a:noFill/>
           </a:ln>
           <a:effectLst/>
-          <a:extLst>
-            <a:ext uri="{909E8E84-426E-40DD-AFC4-6F175D3DCCD1}">
-              <a14:hiddenFill xmlns:a14="http://schemas.microsoft.com/office/drawing/2010/main">
-                <a:solidFill>
-                  <a:schemeClr val="accent1"/>
-                </a:solidFill>
-              </a14:hiddenFill>
-            </a:ext>
-            <a:ext uri="{91240B29-F687-4F45-9708-019B960494DF}">
-              <a14:hiddenLine xmlns:a14="http://schemas.microsoft.com/office/drawing/2010/main" w="9525">
-                <a:solidFill>
-                  <a:schemeClr val="tx1"/>
-                </a:solidFill>
-                <a:miter lim="800000"/>
-                <a:headEnd/>
-                <a:tailEnd/>
-              </a14:hiddenLine>
-            </a:ext>
-            <a:ext uri="{AF507438-7753-43E0-B8FC-AC1667EBCBE1}">
-              <a14:hiddenEffects xmlns:a14="http://schemas.microsoft.com/office/drawing/2010/main">
-                <a:effectLst>
-                  <a:outerShdw dist="35921" dir="2700000" algn="ctr" rotWithShape="0">
-                    <a:schemeClr val="bg2"/>
-                  </a:outerShdw>
-                </a:effectLst>
-              </a14:hiddenEffects>
-            </a:ext>
-          </a:extLst>
+          <a:extLst/>
         </p:spPr>
       </p:pic>
     </p:spTree>
@@ -17518,7 +17522,7 @@
       </p:graphicFrame>
       <p:pic>
         <p:nvPicPr>
-          <p:cNvPr id="5" name="Picture 3"/>
+          <p:cNvPr id="6" name="Picture 3"/>
           <p:cNvPicPr>
             <a:picLocks noChangeAspect="1" noChangeArrowheads="1"/>
           </p:cNvPicPr>
@@ -17539,45 +17543,22 @@
         </p:blipFill>
         <p:spPr bwMode="auto">
           <a:xfrm>
-            <a:off x="1143000" y="5077354"/>
-            <a:ext cx="2819400" cy="1669124"/>
+            <a:off x="1103895" y="4381765"/>
+            <a:ext cx="3925305" cy="2323835"/>
           </a:xfrm>
           <a:prstGeom prst="rect">
             <a:avLst/>
           </a:prstGeom>
-          <a:noFill/>
+          <a:solidFill>
+            <a:srgbClr val="FFFFFF">
+              <a:alpha val="80000"/>
+            </a:srgbClr>
+          </a:solidFill>
           <a:ln>
             <a:noFill/>
           </a:ln>
           <a:effectLst/>
-          <a:extLst>
-            <a:ext uri="{909E8E84-426E-40DD-AFC4-6F175D3DCCD1}">
-              <a14:hiddenFill xmlns:a14="http://schemas.microsoft.com/office/drawing/2010/main">
-                <a:solidFill>
-                  <a:schemeClr val="accent1"/>
-                </a:solidFill>
-              </a14:hiddenFill>
-            </a:ext>
-            <a:ext uri="{91240B29-F687-4F45-9708-019B960494DF}">
-              <a14:hiddenLine xmlns:a14="http://schemas.microsoft.com/office/drawing/2010/main" w="9525">
-                <a:solidFill>
-                  <a:schemeClr val="tx1"/>
-                </a:solidFill>
-                <a:miter lim="800000"/>
-                <a:headEnd/>
-                <a:tailEnd/>
-              </a14:hiddenLine>
-            </a:ext>
-            <a:ext uri="{AF507438-7753-43E0-B8FC-AC1667EBCBE1}">
-              <a14:hiddenEffects xmlns:a14="http://schemas.microsoft.com/office/drawing/2010/main">
-                <a:effectLst>
-                  <a:outerShdw dist="35921" dir="2700000" algn="ctr" rotWithShape="0">
-                    <a:schemeClr val="bg2"/>
-                  </a:outerShdw>
-                </a:effectLst>
-              </a14:hiddenEffects>
-            </a:ext>
-          </a:extLst>
+          <a:extLst/>
         </p:spPr>
       </p:pic>
     </p:spTree>
@@ -17677,14 +17658,14 @@
           <p:nvPr>
             <p:extLst>
               <p:ext uri="{D42A27DB-BD31-4B8C-83A1-F6EECF244321}">
-                <p14:modId xmlns:p14="http://schemas.microsoft.com/office/powerpoint/2010/main" val="1398453620"/>
+                <p14:modId xmlns:p14="http://schemas.microsoft.com/office/powerpoint/2010/main" val="1745301555"/>
               </p:ext>
             </p:extLst>
           </p:nvPr>
         </p:nvGraphicFramePr>
         <p:xfrm>
-          <a:off x="0" y="3429000"/>
-          <a:ext cx="9060082" cy="3383280"/>
+          <a:off x="7718" y="3764280"/>
+          <a:ext cx="9060082" cy="3017520"/>
         </p:xfrm>
         <a:graphic>
           <a:graphicData uri="http://schemas.openxmlformats.org/drawingml/2006/table">
@@ -17918,13 +17899,6 @@
                     <a:lstStyle/>
                     <a:p>
                       <a:pPr algn="ctr"/>
-                      <a:r>
-                        <a:rPr lang="en-US" sz="2400" dirty="0" smtClean="0"/>
-                        <a:t/>
-                      </a:r>
-                      <a:br>
-                        <a:rPr lang="en-US" sz="2400" dirty="0" smtClean="0"/>
-                      </a:br>
                       <a:endParaRPr lang="en-US" sz="2400" dirty="0"/>
                     </a:p>
                   </a:txBody>
@@ -18605,66 +18579,32 @@
       </p:sp>
       <p:pic>
         <p:nvPicPr>
-          <p:cNvPr id="5127" name="Picture 7"/>
+          <p:cNvPr id="3" name="Picture 2"/>
           <p:cNvPicPr>
-            <a:picLocks noChangeAspect="1" noChangeArrowheads="1"/>
+            <a:picLocks noChangeAspect="1"/>
           </p:cNvPicPr>
           <p:nvPr/>
         </p:nvPicPr>
         <p:blipFill>
-          <a:blip r:embed="rId3">
+          <a:blip r:embed="rId3" cstate="print">
             <a:extLst>
               <a:ext uri="{28A0092B-C50C-407E-A947-70E740481C1C}">
                 <a14:useLocalDpi xmlns:a14="http://schemas.microsoft.com/office/drawing/2010/main" val="0"/>
               </a:ext>
             </a:extLst>
           </a:blip>
-          <a:srcRect/>
           <a:stretch>
             <a:fillRect/>
           </a:stretch>
         </p:blipFill>
-        <p:spPr bwMode="auto">
+        <p:spPr>
           <a:xfrm>
-            <a:off x="0" y="2927784"/>
-            <a:ext cx="9144000" cy="3930216"/>
+            <a:off x="0" y="1143000"/>
+            <a:ext cx="9144000" cy="5486400"/>
           </a:xfrm>
           <a:prstGeom prst="rect">
             <a:avLst/>
           </a:prstGeom>
-          <a:noFill/>
-          <a:ln>
-            <a:noFill/>
-          </a:ln>
-          <a:effectLst/>
-          <a:extLst>
-            <a:ext uri="{909E8E84-426E-40DD-AFC4-6F175D3DCCD1}">
-              <a14:hiddenFill xmlns:a14="http://schemas.microsoft.com/office/drawing/2010/main">
-                <a:solidFill>
-                  <a:schemeClr val="accent1"/>
-                </a:solidFill>
-              </a14:hiddenFill>
-            </a:ext>
-            <a:ext uri="{91240B29-F687-4F45-9708-019B960494DF}">
-              <a14:hiddenLine xmlns:a14="http://schemas.microsoft.com/office/drawing/2010/main" w="9525">
-                <a:solidFill>
-                  <a:schemeClr val="tx1"/>
-                </a:solidFill>
-                <a:miter lim="800000"/>
-                <a:headEnd/>
-                <a:tailEnd/>
-              </a14:hiddenLine>
-            </a:ext>
-            <a:ext uri="{AF507438-7753-43E0-B8FC-AC1667EBCBE1}">
-              <a14:hiddenEffects xmlns:a14="http://schemas.microsoft.com/office/drawing/2010/main">
-                <a:effectLst>
-                  <a:outerShdw dist="35921" dir="2700000" algn="ctr" rotWithShape="0">
-                    <a:schemeClr val="bg2"/>
-                  </a:outerShdw>
-                </a:effectLst>
-              </a14:hiddenEffects>
-            </a:ext>
-          </a:extLst>
         </p:spPr>
       </p:pic>
     </p:spTree>
@@ -18768,7 +18708,7 @@
         </p:blipFill>
         <p:spPr bwMode="auto">
           <a:xfrm>
-            <a:off x="1191204" y="762000"/>
+            <a:off x="609600" y="762000"/>
             <a:ext cx="7952796" cy="6096000"/>
           </a:xfrm>
           <a:prstGeom prst="rect">
@@ -18909,7 +18849,7 @@
         </p:blipFill>
         <p:spPr bwMode="auto">
           <a:xfrm>
-            <a:off x="1191204" y="762000"/>
+            <a:off x="609600" y="762000"/>
             <a:ext cx="7952796" cy="6096000"/>
           </a:xfrm>
           <a:prstGeom prst="rect">
@@ -21078,8 +21018,8 @@
         </p:nvSpPr>
         <p:spPr>
           <a:xfrm>
-            <a:off x="76200" y="3886200"/>
-            <a:ext cx="4191000" cy="609600"/>
+            <a:off x="76200" y="3962400"/>
+            <a:ext cx="4191000" cy="533400"/>
           </a:xfrm>
           <a:prstGeom prst="flowChartAlternateProcess">
             <a:avLst/>
@@ -24261,48 +24201,6 @@
       </p:grpSpPr>
       <p:sp>
         <p:nvSpPr>
-          <p:cNvPr id="2" name="Title 1"/>
-          <p:cNvSpPr>
-            <a:spLocks noGrp="1"/>
-          </p:cNvSpPr>
-          <p:nvPr>
-            <p:ph type="title"/>
-          </p:nvPr>
-        </p:nvSpPr>
-        <p:spPr>
-          <a:xfrm>
-            <a:off x="457200" y="0"/>
-            <a:ext cx="8229600" cy="609600"/>
-          </a:xfrm>
-        </p:spPr>
-        <p:txBody>
-          <a:bodyPr>
-            <a:normAutofit fontScale="90000"/>
-          </a:bodyPr>
-          <a:lstStyle/>
-          <a:p>
-            <a:r>
-              <a:rPr lang="en-US" dirty="0" smtClean="0">
-                <a:solidFill>
-                  <a:schemeClr val="bg1">
-                    <a:lumMod val="50000"/>
-                  </a:schemeClr>
-                </a:solidFill>
-              </a:rPr>
-              <a:t>Support Staff</a:t>
-            </a:r>
-            <a:endParaRPr lang="en-US" dirty="0">
-              <a:solidFill>
-                <a:schemeClr val="bg1">
-                  <a:lumMod val="50000"/>
-                </a:schemeClr>
-              </a:solidFill>
-            </a:endParaRPr>
-          </a:p>
-        </p:txBody>
-      </p:sp>
-      <p:sp>
-        <p:nvSpPr>
           <p:cNvPr id="3" name="Content Placeholder 2"/>
           <p:cNvSpPr>
             <a:spLocks noGrp="1"/>
@@ -24313,24 +24211,108 @@
         </p:nvSpPr>
         <p:spPr>
           <a:xfrm>
-            <a:off x="152400" y="762000"/>
-            <a:ext cx="8991600" cy="6019800"/>
+            <a:off x="228600" y="914400"/>
+            <a:ext cx="8458200" cy="5791200"/>
           </a:xfrm>
         </p:spPr>
         <p:txBody>
           <a:bodyPr>
-            <a:normAutofit/>
+            <a:normAutofit lnSpcReduction="10000"/>
           </a:bodyPr>
           <a:lstStyle/>
           <a:p>
-            <a:pPr marL="457200" indent="-457200">
+            <a:pPr marL="0" indent="0">
               <a:buNone/>
             </a:pPr>
             <a:r>
               <a:rPr lang="en-US" b="1" dirty="0" smtClean="0"/>
-              <a:t>User forums on R-Forge</a:t>
-            </a:r>
-            <a:endParaRPr lang="en-US" sz="2800" dirty="0" smtClean="0">
+              <a:t>The kinship links can be used</a:t>
+            </a:r>
+            <a:endParaRPr lang="en-US" b="1" dirty="0"/>
+          </a:p>
+          <a:p>
+            <a:pPr lvl="1"/>
+            <a:r>
+              <a:rPr lang="en-US" dirty="0" smtClean="0">
+                <a:solidFill>
+                  <a:srgbClr val="3F7F4F"/>
+                </a:solidFill>
+              </a:rPr>
+              <a:t>anywhere in R; it’s not just with NlsyLinks</a:t>
+            </a:r>
+          </a:p>
+          <a:p>
+            <a:pPr lvl="1"/>
+            <a:r>
+              <a:rPr lang="en-US" dirty="0" smtClean="0">
+                <a:solidFill>
+                  <a:srgbClr val="3F7F4F"/>
+                </a:solidFill>
+              </a:rPr>
+              <a:t>with any statistical software that reads CSVs</a:t>
+            </a:r>
+          </a:p>
+          <a:p>
+            <a:pPr lvl="1"/>
+            <a:endParaRPr lang="en-US" dirty="0"/>
+          </a:p>
+          <a:p>
+            <a:pPr marL="0" indent="0">
+              <a:buNone/>
+            </a:pPr>
+            <a:r>
+              <a:rPr lang="en-US" b="1" dirty="0" smtClean="0"/>
+              <a:t>The NlsyLinks package can be used beyond</a:t>
+            </a:r>
+            <a:endParaRPr lang="en-US" b="1" dirty="0"/>
+          </a:p>
+          <a:p>
+            <a:pPr lvl="1"/>
+            <a:r>
+              <a:rPr lang="en-US" dirty="0">
+                <a:solidFill>
+                  <a:srgbClr val="3F7F4F"/>
+                </a:solidFill>
+              </a:rPr>
+              <a:t>Traditional BG research</a:t>
+            </a:r>
+          </a:p>
+          <a:p>
+            <a:pPr lvl="1"/>
+            <a:r>
+              <a:rPr lang="en-US" dirty="0" smtClean="0">
+                <a:solidFill>
+                  <a:srgbClr val="3F7F4F"/>
+                </a:solidFill>
+              </a:rPr>
+              <a:t>NLSY</a:t>
+            </a:r>
+          </a:p>
+          <a:p>
+            <a:pPr lvl="1"/>
+            <a:endParaRPr lang="en-US" dirty="0"/>
+          </a:p>
+          <a:p>
+            <a:pPr marL="0" indent="0">
+              <a:buNone/>
+            </a:pPr>
+            <a:r>
+              <a:rPr lang="en-US" b="1" dirty="0" smtClean="0"/>
+              <a:t>All relevant code is public &amp; open source</a:t>
+            </a:r>
+            <a:endParaRPr lang="en-US" b="1" dirty="0"/>
+          </a:p>
+          <a:p>
+            <a:pPr lvl="1"/>
+            <a:r>
+              <a:rPr lang="en-US" dirty="0" smtClean="0">
+                <a:solidFill>
+                  <a:srgbClr val="3F7F4F"/>
+                </a:solidFill>
+              </a:rPr>
+              <a:t>Code for the package is on R-Forge</a:t>
+            </a:r>
+            <a:endParaRPr lang="en-US" dirty="0">
               <a:solidFill>
                 <a:srgbClr val="3F7F4F"/>
               </a:solidFill>
@@ -24344,224 +24326,9 @@
                   <a:srgbClr val="3F7F4F"/>
                 </a:solidFill>
               </a:rPr>
-              <a:t>r-forge.r-project.org/forum/?</a:t>
-            </a:r>
-            <a:r>
-              <a:rPr lang="en-US" dirty="0" err="1" smtClean="0">
-                <a:solidFill>
-                  <a:srgbClr val="3F7F4F"/>
-                </a:solidFill>
-              </a:rPr>
-              <a:t>group_id</a:t>
-            </a:r>
-            <a:r>
-              <a:rPr lang="en-US" dirty="0" smtClean="0">
-                <a:solidFill>
-                  <a:srgbClr val="3F7F4F"/>
-                </a:solidFill>
-              </a:rPr>
-              <a:t>=1330 </a:t>
-            </a:r>
-          </a:p>
-          <a:p>
-            <a:pPr lvl="1"/>
-            <a:r>
-              <a:rPr lang="en-US" dirty="0" smtClean="0">
-                <a:solidFill>
-                  <a:srgbClr val="3F7F4F"/>
-                </a:solidFill>
-              </a:rPr>
-              <a:t>Specific NlsyLinks issues </a:t>
-            </a:r>
-          </a:p>
-          <a:p>
-            <a:pPr lvl="1"/>
-            <a:r>
-              <a:rPr lang="en-US" dirty="0" smtClean="0">
-                <a:solidFill>
-                  <a:srgbClr val="3F7F4F"/>
-                </a:solidFill>
-              </a:rPr>
-              <a:t>General BG issues</a:t>
-            </a:r>
-          </a:p>
-          <a:p>
-            <a:pPr lvl="1"/>
-            <a:r>
-              <a:rPr lang="en-US" dirty="0" err="1" smtClean="0">
-                <a:solidFill>
-                  <a:srgbClr val="3F7F4F"/>
-                </a:solidFill>
-              </a:rPr>
-              <a:t>OpenMx</a:t>
-            </a:r>
-            <a:r>
-              <a:rPr lang="en-US" dirty="0" smtClean="0">
-                <a:solidFill>
-                  <a:srgbClr val="3F7F4F"/>
-                </a:solidFill>
-              </a:rPr>
-              <a:t>, </a:t>
-            </a:r>
-            <a:r>
-              <a:rPr lang="en-US" dirty="0" err="1" smtClean="0">
-                <a:solidFill>
-                  <a:srgbClr val="3F7F4F"/>
-                </a:solidFill>
-              </a:rPr>
-              <a:t>lavaan</a:t>
-            </a:r>
-            <a:r>
-              <a:rPr lang="en-US" dirty="0" smtClean="0">
-                <a:solidFill>
-                  <a:srgbClr val="3F7F4F"/>
-                </a:solidFill>
-              </a:rPr>
-              <a:t>, SAS, </a:t>
-            </a:r>
-            <a:r>
-              <a:rPr lang="en-US" dirty="0" err="1" smtClean="0">
-                <a:solidFill>
-                  <a:srgbClr val="3F7F4F"/>
-                </a:solidFill>
-              </a:rPr>
-              <a:t>M</a:t>
-            </a:r>
-            <a:r>
-              <a:rPr lang="en-US" i="1" dirty="0" err="1" smtClean="0">
-                <a:solidFill>
-                  <a:srgbClr val="3F7F4F"/>
-                </a:solidFill>
-              </a:rPr>
-              <a:t>plus</a:t>
-            </a:r>
-            <a:endParaRPr lang="en-US" i="1" dirty="0" smtClean="0">
-              <a:solidFill>
-                <a:srgbClr val="3F7F4F"/>
-              </a:solidFill>
-            </a:endParaRPr>
-          </a:p>
-          <a:p>
-            <a:pPr marL="457200" lvl="1" indent="0">
-              <a:buNone/>
-            </a:pPr>
-            <a:endParaRPr lang="en-US" i="1" dirty="0"/>
-          </a:p>
-          <a:p>
-            <a:pPr marL="457200" indent="-457200">
-              <a:buNone/>
-            </a:pPr>
-            <a:r>
-              <a:rPr lang="en-US" b="1" dirty="0" smtClean="0"/>
-              <a:t>CRAN</a:t>
-            </a:r>
-            <a:r>
-              <a:rPr lang="en-US" dirty="0" smtClean="0"/>
-              <a:t/>
-            </a:r>
-            <a:br>
-              <a:rPr lang="en-US" dirty="0" smtClean="0"/>
-            </a:br>
-            <a:r>
-              <a:rPr lang="en-US" sz="2800" dirty="0" smtClean="0">
-                <a:solidFill>
-                  <a:srgbClr val="3F7F4F"/>
-                </a:solidFill>
-              </a:rPr>
-              <a:t>cran.r-project.org/web/packages/</a:t>
-            </a:r>
-            <a:r>
-              <a:rPr lang="en-US" sz="2800" dirty="0" err="1" smtClean="0">
-                <a:solidFill>
-                  <a:srgbClr val="3F7F4F"/>
-                </a:solidFill>
-              </a:rPr>
-              <a:t>NlsyLinks</a:t>
-            </a:r>
-            <a:endParaRPr lang="en-US" sz="2800" dirty="0">
-              <a:solidFill>
-                <a:srgbClr val="3F7F4F"/>
-              </a:solidFill>
-            </a:endParaRPr>
-          </a:p>
-          <a:p>
-            <a:pPr marL="457200" indent="-457200">
-              <a:buNone/>
-            </a:pPr>
-            <a:r>
-              <a:rPr lang="en-US" b="1" dirty="0" smtClean="0"/>
-              <a:t>Help over email</a:t>
-            </a:r>
-            <a:r>
-              <a:rPr lang="en-US" dirty="0" smtClean="0"/>
-              <a:t/>
-            </a:r>
-            <a:br>
-              <a:rPr lang="en-US" dirty="0" smtClean="0"/>
-            </a:br>
-            <a:r>
-              <a:rPr lang="en-US" sz="2400" dirty="0" smtClean="0">
-                <a:solidFill>
-                  <a:srgbClr val="3F7F4F"/>
-                </a:solidFill>
-              </a:rPr>
-              <a:t>Joe Rodgers (jrodgers@ou.edu)</a:t>
-            </a:r>
-            <a:r>
-              <a:rPr lang="en-US" sz="2400" dirty="0">
-                <a:solidFill>
-                  <a:srgbClr val="3F7F4F"/>
-                </a:solidFill>
-              </a:rPr>
-              <a:t> </a:t>
-            </a:r>
-            <a:br>
-              <a:rPr lang="en-US" sz="2400" dirty="0">
-                <a:solidFill>
-                  <a:srgbClr val="3F7F4F"/>
-                </a:solidFill>
-              </a:rPr>
-            </a:br>
-            <a:r>
-              <a:rPr lang="en-US" sz="2400" dirty="0">
-                <a:solidFill>
-                  <a:srgbClr val="3F7F4F"/>
-                </a:solidFill>
-              </a:rPr>
-              <a:t>Will Beasley (whb4@ou.edu</a:t>
-            </a:r>
-            <a:r>
-              <a:rPr lang="en-US" sz="2400" dirty="0" smtClean="0">
-                <a:solidFill>
-                  <a:srgbClr val="3F7F4F"/>
-                </a:solidFill>
-              </a:rPr>
-              <a:t>)</a:t>
-            </a:r>
-            <a:r>
-              <a:rPr lang="en-US" sz="2400" dirty="0">
-                <a:solidFill>
-                  <a:srgbClr val="3F7F4F"/>
-                </a:solidFill>
-              </a:rPr>
-              <a:t> </a:t>
-            </a:r>
-            <a:br>
-              <a:rPr lang="en-US" sz="2400" dirty="0">
-                <a:solidFill>
-                  <a:srgbClr val="3F7F4F"/>
-                </a:solidFill>
-              </a:rPr>
-            </a:br>
-            <a:r>
-              <a:rPr lang="en-US" sz="2400" dirty="0" smtClean="0">
-                <a:solidFill>
-                  <a:srgbClr val="3F7F4F"/>
-                </a:solidFill>
-              </a:rPr>
-              <a:t>Mike Hunter (mhunter@ou.edu)</a:t>
-            </a:r>
-            <a:endParaRPr lang="en-US" sz="2400" dirty="0">
+              <a:t>Code for determining the links is on GitHub</a:t>
+            </a:r>
+            <a:endParaRPr lang="en-US" dirty="0">
               <a:solidFill>
                 <a:srgbClr val="3F7F4F"/>
               </a:solidFill>
@@ -24569,10 +24336,60 @@
           </a:p>
         </p:txBody>
       </p:sp>
+      <p:sp>
+        <p:nvSpPr>
+          <p:cNvPr id="4" name="Title 1"/>
+          <p:cNvSpPr txBox="1">
+            <a:spLocks/>
+          </p:cNvSpPr>
+          <p:nvPr/>
+        </p:nvSpPr>
+        <p:spPr>
+          <a:xfrm>
+            <a:off x="76200" y="46038"/>
+            <a:ext cx="8991600" cy="715962"/>
+          </a:xfrm>
+          <a:prstGeom prst="rect">
+            <a:avLst/>
+          </a:prstGeom>
+          <a:solidFill>
+            <a:schemeClr val="bg1">
+              <a:lumMod val="75000"/>
+            </a:schemeClr>
+          </a:solidFill>
+        </p:spPr>
+        <p:txBody>
+          <a:bodyPr vert="horz" lIns="91440" tIns="45720" rIns="91440" bIns="45720" rtlCol="0" anchor="ctr">
+            <a:noAutofit/>
+          </a:bodyPr>
+          <a:lstStyle>
+            <a:lvl1pPr algn="ctr" defTabSz="914400" rtl="0" eaLnBrk="1" latinLnBrk="0" hangingPunct="1">
+              <a:spcBef>
+                <a:spcPct val="0"/>
+              </a:spcBef>
+              <a:buNone/>
+              <a:defRPr sz="4400" kern="1200">
+                <a:solidFill>
+                  <a:schemeClr val="tx1"/>
+                </a:solidFill>
+                <a:latin typeface="+mj-lt"/>
+                <a:ea typeface="+mj-ea"/>
+                <a:cs typeface="+mj-cs"/>
+              </a:defRPr>
+            </a:lvl1pPr>
+          </a:lstStyle>
+          <a:p>
+            <a:r>
+              <a:rPr lang="en-US" dirty="0"/>
+              <a:t>Applicability</a:t>
+            </a:r>
+          </a:p>
+        </p:txBody>
+      </p:sp>
     </p:spTree>
     <p:extLst>
       <p:ext uri="{BB962C8B-B14F-4D97-AF65-F5344CB8AC3E}">
-        <p14:creationId xmlns:p14="http://schemas.microsoft.com/office/powerpoint/2010/main" val="377114581"/>
+        <p14:creationId xmlns:p14="http://schemas.microsoft.com/office/powerpoint/2010/main" val="328083285"/>
       </p:ext>
     </p:extLst>
   </p:cSld>
@@ -24608,46 +24425,6 @@
       </p:grpSpPr>
       <p:sp>
         <p:nvSpPr>
-          <p:cNvPr id="2" name="Title 1"/>
-          <p:cNvSpPr>
-            <a:spLocks noGrp="1"/>
-          </p:cNvSpPr>
-          <p:nvPr>
-            <p:ph type="title"/>
-          </p:nvPr>
-        </p:nvSpPr>
-        <p:spPr>
-          <a:xfrm>
-            <a:off x="457200" y="0"/>
-            <a:ext cx="8229600" cy="990600"/>
-          </a:xfrm>
-        </p:spPr>
-        <p:txBody>
-          <a:bodyPr/>
-          <a:lstStyle/>
-          <a:p>
-            <a:r>
-              <a:rPr lang="en-US" dirty="0" smtClean="0">
-                <a:solidFill>
-                  <a:schemeClr val="bg1">
-                    <a:lumMod val="50000"/>
-                  </a:schemeClr>
-                </a:solidFill>
-              </a:rPr>
-              <a:t>Applicability</a:t>
-            </a:r>
-            <a:endParaRPr lang="en-US" dirty="0">
-              <a:solidFill>
-                <a:schemeClr val="bg1">
-                  <a:lumMod val="50000"/>
-                </a:schemeClr>
-              </a:solidFill>
-            </a:endParaRPr>
-          </a:p>
-        </p:txBody>
-      </p:sp>
-      <p:sp>
-        <p:nvSpPr>
           <p:cNvPr id="3" name="Content Placeholder 2"/>
           <p:cNvSpPr>
             <a:spLocks noGrp="1"/>
@@ -24658,108 +24435,24 @@
         </p:nvSpPr>
         <p:spPr>
           <a:xfrm>
-            <a:off x="228600" y="914400"/>
-            <a:ext cx="8458200" cy="5791200"/>
+            <a:off x="152400" y="762000"/>
+            <a:ext cx="8991600" cy="6019800"/>
           </a:xfrm>
         </p:spPr>
         <p:txBody>
           <a:bodyPr>
-            <a:normAutofit lnSpcReduction="10000"/>
+            <a:normAutofit/>
           </a:bodyPr>
           <a:lstStyle/>
           <a:p>
-            <a:pPr marL="0" indent="0">
+            <a:pPr marL="457200" indent="-457200">
               <a:buNone/>
             </a:pPr>
             <a:r>
               <a:rPr lang="en-US" b="1" dirty="0" smtClean="0"/>
-              <a:t>The kinship links can be used</a:t>
-            </a:r>
-            <a:endParaRPr lang="en-US" b="1" dirty="0"/>
-          </a:p>
-          <a:p>
-            <a:pPr lvl="1"/>
-            <a:r>
-              <a:rPr lang="en-US" dirty="0" smtClean="0">
-                <a:solidFill>
-                  <a:srgbClr val="3F7F4F"/>
-                </a:solidFill>
-              </a:rPr>
-              <a:t>anywhere in R; it’s not just with NlsyLinks</a:t>
-            </a:r>
-          </a:p>
-          <a:p>
-            <a:pPr lvl="1"/>
-            <a:r>
-              <a:rPr lang="en-US" dirty="0" smtClean="0">
-                <a:solidFill>
-                  <a:srgbClr val="3F7F4F"/>
-                </a:solidFill>
-              </a:rPr>
-              <a:t>with any statistical software that reads CSVs</a:t>
-            </a:r>
-          </a:p>
-          <a:p>
-            <a:pPr lvl="1"/>
-            <a:endParaRPr lang="en-US" dirty="0"/>
-          </a:p>
-          <a:p>
-            <a:pPr marL="0" indent="0">
-              <a:buNone/>
-            </a:pPr>
-            <a:r>
-              <a:rPr lang="en-US" b="1" dirty="0" smtClean="0"/>
-              <a:t>The NlsyLinks package can be used beyond</a:t>
-            </a:r>
-            <a:endParaRPr lang="en-US" b="1" dirty="0"/>
-          </a:p>
-          <a:p>
-            <a:pPr lvl="1"/>
-            <a:r>
-              <a:rPr lang="en-US" dirty="0">
-                <a:solidFill>
-                  <a:srgbClr val="3F7F4F"/>
-                </a:solidFill>
-              </a:rPr>
-              <a:t>Traditional BG research</a:t>
-            </a:r>
-          </a:p>
-          <a:p>
-            <a:pPr lvl="1"/>
-            <a:r>
-              <a:rPr lang="en-US" dirty="0" smtClean="0">
-                <a:solidFill>
-                  <a:srgbClr val="3F7F4F"/>
-                </a:solidFill>
-              </a:rPr>
-              <a:t>NLSY</a:t>
-            </a:r>
-          </a:p>
-          <a:p>
-            <a:pPr lvl="1"/>
-            <a:endParaRPr lang="en-US" dirty="0"/>
-          </a:p>
-          <a:p>
-            <a:pPr marL="0" indent="0">
-              <a:buNone/>
-            </a:pPr>
-            <a:r>
-              <a:rPr lang="en-US" b="1" dirty="0" smtClean="0"/>
-              <a:t>All relevant code is public &amp; open source</a:t>
-            </a:r>
-            <a:endParaRPr lang="en-US" b="1" dirty="0"/>
-          </a:p>
-          <a:p>
-            <a:pPr lvl="1"/>
-            <a:r>
-              <a:rPr lang="en-US" dirty="0" smtClean="0">
-                <a:solidFill>
-                  <a:srgbClr val="3F7F4F"/>
-                </a:solidFill>
-              </a:rPr>
-              <a:t>Code for the package is on R-Forge</a:t>
-            </a:r>
-            <a:endParaRPr lang="en-US" dirty="0">
+              <a:t>User forums on R-Forge</a:t>
+            </a:r>
+            <a:endParaRPr lang="en-US" sz="2800" dirty="0" smtClean="0">
               <a:solidFill>
                 <a:srgbClr val="3F7F4F"/>
               </a:solidFill>
@@ -24773,9 +24466,224 @@
                   <a:srgbClr val="3F7F4F"/>
                 </a:solidFill>
               </a:rPr>
-              <a:t>Code for determining the links is on GitHub</a:t>
-            </a:r>
-            <a:endParaRPr lang="en-US" dirty="0">
+              <a:t>r-forge.r-project.org/forum/?</a:t>
+            </a:r>
+            <a:r>
+              <a:rPr lang="en-US" dirty="0" err="1" smtClean="0">
+                <a:solidFill>
+                  <a:srgbClr val="3F7F4F"/>
+                </a:solidFill>
+              </a:rPr>
+              <a:t>group_id</a:t>
+            </a:r>
+            <a:r>
+              <a:rPr lang="en-US" dirty="0" smtClean="0">
+                <a:solidFill>
+                  <a:srgbClr val="3F7F4F"/>
+                </a:solidFill>
+              </a:rPr>
+              <a:t>=1330 </a:t>
+            </a:r>
+          </a:p>
+          <a:p>
+            <a:pPr lvl="1"/>
+            <a:r>
+              <a:rPr lang="en-US" dirty="0" smtClean="0">
+                <a:solidFill>
+                  <a:srgbClr val="3F7F4F"/>
+                </a:solidFill>
+              </a:rPr>
+              <a:t>Specific NlsyLinks issues </a:t>
+            </a:r>
+          </a:p>
+          <a:p>
+            <a:pPr lvl="1"/>
+            <a:r>
+              <a:rPr lang="en-US" dirty="0" smtClean="0">
+                <a:solidFill>
+                  <a:srgbClr val="3F7F4F"/>
+                </a:solidFill>
+              </a:rPr>
+              <a:t>General BG issues</a:t>
+            </a:r>
+          </a:p>
+          <a:p>
+            <a:pPr lvl="1"/>
+            <a:r>
+              <a:rPr lang="en-US" dirty="0" err="1" smtClean="0">
+                <a:solidFill>
+                  <a:srgbClr val="3F7F4F"/>
+                </a:solidFill>
+              </a:rPr>
+              <a:t>OpenMx</a:t>
+            </a:r>
+            <a:r>
+              <a:rPr lang="en-US" dirty="0" smtClean="0">
+                <a:solidFill>
+                  <a:srgbClr val="3F7F4F"/>
+                </a:solidFill>
+              </a:rPr>
+              <a:t>, </a:t>
+            </a:r>
+            <a:r>
+              <a:rPr lang="en-US" dirty="0" err="1" smtClean="0">
+                <a:solidFill>
+                  <a:srgbClr val="3F7F4F"/>
+                </a:solidFill>
+              </a:rPr>
+              <a:t>lavaan</a:t>
+            </a:r>
+            <a:r>
+              <a:rPr lang="en-US" dirty="0" smtClean="0">
+                <a:solidFill>
+                  <a:srgbClr val="3F7F4F"/>
+                </a:solidFill>
+              </a:rPr>
+              <a:t>, SAS, </a:t>
+            </a:r>
+            <a:r>
+              <a:rPr lang="en-US" dirty="0" err="1" smtClean="0">
+                <a:solidFill>
+                  <a:srgbClr val="3F7F4F"/>
+                </a:solidFill>
+              </a:rPr>
+              <a:t>M</a:t>
+            </a:r>
+            <a:r>
+              <a:rPr lang="en-US" i="1" dirty="0" err="1" smtClean="0">
+                <a:solidFill>
+                  <a:srgbClr val="3F7F4F"/>
+                </a:solidFill>
+              </a:rPr>
+              <a:t>plus</a:t>
+            </a:r>
+            <a:endParaRPr lang="en-US" i="1" dirty="0" smtClean="0">
+              <a:solidFill>
+                <a:srgbClr val="3F7F4F"/>
+              </a:solidFill>
+            </a:endParaRPr>
+          </a:p>
+          <a:p>
+            <a:pPr marL="457200" lvl="1" indent="0">
+              <a:buNone/>
+            </a:pPr>
+            <a:endParaRPr lang="en-US" i="1" dirty="0"/>
+          </a:p>
+          <a:p>
+            <a:pPr marL="457200" indent="-457200">
+              <a:buNone/>
+            </a:pPr>
+            <a:r>
+              <a:rPr lang="en-US" b="1" dirty="0" smtClean="0"/>
+              <a:t>CRAN</a:t>
+            </a:r>
+            <a:r>
+              <a:rPr lang="en-US" dirty="0" smtClean="0"/>
+              <a:t/>
+            </a:r>
+            <a:br>
+              <a:rPr lang="en-US" dirty="0" smtClean="0"/>
+            </a:br>
+            <a:r>
+              <a:rPr lang="en-US" sz="2800" dirty="0" smtClean="0">
+                <a:solidFill>
+                  <a:srgbClr val="3F7F4F"/>
+                </a:solidFill>
+              </a:rPr>
+              <a:t>cran.r-project.org/web/packages/</a:t>
+            </a:r>
+            <a:r>
+              <a:rPr lang="en-US" sz="2800" dirty="0" err="1" smtClean="0">
+                <a:solidFill>
+                  <a:srgbClr val="3F7F4F"/>
+                </a:solidFill>
+              </a:rPr>
+              <a:t>NlsyLinks</a:t>
+            </a:r>
+            <a:endParaRPr lang="en-US" sz="2800" dirty="0">
+              <a:solidFill>
+                <a:srgbClr val="3F7F4F"/>
+              </a:solidFill>
+            </a:endParaRPr>
+          </a:p>
+          <a:p>
+            <a:pPr marL="457200" indent="-457200">
+              <a:buNone/>
+            </a:pPr>
+            <a:r>
+              <a:rPr lang="en-US" b="1" dirty="0" smtClean="0"/>
+              <a:t>Help over email</a:t>
+            </a:r>
+            <a:r>
+              <a:rPr lang="en-US" dirty="0" smtClean="0"/>
+              <a:t/>
+            </a:r>
+            <a:br>
+              <a:rPr lang="en-US" dirty="0" smtClean="0"/>
+            </a:br>
+            <a:r>
+              <a:rPr lang="en-US" sz="2400" dirty="0" smtClean="0">
+                <a:solidFill>
+                  <a:srgbClr val="3F7F4F"/>
+                </a:solidFill>
+              </a:rPr>
+              <a:t>Joe Rodgers (jrodgers@ou.edu)</a:t>
+            </a:r>
+            <a:r>
+              <a:rPr lang="en-US" sz="2400" dirty="0">
+                <a:solidFill>
+                  <a:srgbClr val="3F7F4F"/>
+                </a:solidFill>
+              </a:rPr>
+              <a:t> </a:t>
+            </a:r>
+            <a:br>
+              <a:rPr lang="en-US" sz="2400" dirty="0">
+                <a:solidFill>
+                  <a:srgbClr val="3F7F4F"/>
+                </a:solidFill>
+              </a:rPr>
+            </a:br>
+            <a:r>
+              <a:rPr lang="en-US" sz="2400" dirty="0">
+                <a:solidFill>
+                  <a:srgbClr val="3F7F4F"/>
+                </a:solidFill>
+              </a:rPr>
+              <a:t>Will Beasley (whb4@ou.edu</a:t>
+            </a:r>
+            <a:r>
+              <a:rPr lang="en-US" sz="2400" dirty="0" smtClean="0">
+                <a:solidFill>
+                  <a:srgbClr val="3F7F4F"/>
+                </a:solidFill>
+              </a:rPr>
+              <a:t>)</a:t>
+            </a:r>
+            <a:r>
+              <a:rPr lang="en-US" sz="2400" dirty="0">
+                <a:solidFill>
+                  <a:srgbClr val="3F7F4F"/>
+                </a:solidFill>
+              </a:rPr>
+              <a:t> </a:t>
+            </a:r>
+            <a:br>
+              <a:rPr lang="en-US" sz="2400" dirty="0">
+                <a:solidFill>
+                  <a:srgbClr val="3F7F4F"/>
+                </a:solidFill>
+              </a:rPr>
+            </a:br>
+            <a:r>
+              <a:rPr lang="en-US" sz="2400" dirty="0" smtClean="0">
+                <a:solidFill>
+                  <a:srgbClr val="3F7F4F"/>
+                </a:solidFill>
+              </a:rPr>
+              <a:t>Mike Hunter (mhunter@ou.edu)</a:t>
+            </a:r>
+            <a:endParaRPr lang="en-US" sz="2400" dirty="0">
               <a:solidFill>
                 <a:srgbClr val="3F7F4F"/>
               </a:solidFill>
@@ -24783,10 +24691,60 @@
           </a:p>
         </p:txBody>
       </p:sp>
+      <p:sp>
+        <p:nvSpPr>
+          <p:cNvPr id="4" name="Title 1"/>
+          <p:cNvSpPr txBox="1">
+            <a:spLocks/>
+          </p:cNvSpPr>
+          <p:nvPr/>
+        </p:nvSpPr>
+        <p:spPr>
+          <a:xfrm>
+            <a:off x="76200" y="46038"/>
+            <a:ext cx="8991600" cy="715962"/>
+          </a:xfrm>
+          <a:prstGeom prst="rect">
+            <a:avLst/>
+          </a:prstGeom>
+          <a:solidFill>
+            <a:schemeClr val="bg1">
+              <a:lumMod val="75000"/>
+            </a:schemeClr>
+          </a:solidFill>
+        </p:spPr>
+        <p:txBody>
+          <a:bodyPr vert="horz" lIns="91440" tIns="45720" rIns="91440" bIns="45720" rtlCol="0" anchor="ctr">
+            <a:noAutofit/>
+          </a:bodyPr>
+          <a:lstStyle>
+            <a:lvl1pPr algn="ctr" defTabSz="914400" rtl="0" eaLnBrk="1" latinLnBrk="0" hangingPunct="1">
+              <a:spcBef>
+                <a:spcPct val="0"/>
+              </a:spcBef>
+              <a:buNone/>
+              <a:defRPr sz="4400" kern="1200">
+                <a:solidFill>
+                  <a:schemeClr val="tx1"/>
+                </a:solidFill>
+                <a:latin typeface="+mj-lt"/>
+                <a:ea typeface="+mj-ea"/>
+                <a:cs typeface="+mj-cs"/>
+              </a:defRPr>
+            </a:lvl1pPr>
+          </a:lstStyle>
+          <a:p>
+            <a:r>
+              <a:rPr lang="en-US" dirty="0"/>
+              <a:t>Support Staff</a:t>
+            </a:r>
+          </a:p>
+        </p:txBody>
+      </p:sp>
     </p:spTree>
     <p:extLst>
       <p:ext uri="{BB962C8B-B14F-4D97-AF65-F5344CB8AC3E}">
-        <p14:creationId xmlns:p14="http://schemas.microsoft.com/office/powerpoint/2010/main" val="328083285"/>
+        <p14:creationId xmlns:p14="http://schemas.microsoft.com/office/powerpoint/2010/main" val="377114581"/>
       </p:ext>
     </p:extLst>
   </p:cSld>
@@ -25377,66 +25335,32 @@
       </p:sp>
       <p:pic>
         <p:nvPicPr>
-          <p:cNvPr id="1034" name="Picture 10"/>
+          <p:cNvPr id="3" name="Picture 2"/>
           <p:cNvPicPr>
-            <a:picLocks noChangeAspect="1" noChangeArrowheads="1"/>
+            <a:picLocks noChangeAspect="1"/>
           </p:cNvPicPr>
           <p:nvPr/>
         </p:nvPicPr>
         <p:blipFill>
-          <a:blip r:embed="rId3">
+          <a:blip r:embed="rId3" cstate="print">
             <a:extLst>
               <a:ext uri="{28A0092B-C50C-407E-A947-70E740481C1C}">
                 <a14:useLocalDpi xmlns:a14="http://schemas.microsoft.com/office/drawing/2010/main" val="0"/>
               </a:ext>
             </a:extLst>
           </a:blip>
-          <a:srcRect/>
           <a:stretch>
             <a:fillRect/>
           </a:stretch>
         </p:blipFill>
-        <p:spPr bwMode="auto">
+        <p:spPr>
           <a:xfrm>
-            <a:off x="0" y="2667000"/>
-            <a:ext cx="9144000" cy="3930216"/>
+            <a:off x="0" y="1143000"/>
+            <a:ext cx="9144000" cy="5486400"/>
           </a:xfrm>
           <a:prstGeom prst="rect">
             <a:avLst/>
           </a:prstGeom>
-          <a:noFill/>
-          <a:ln>
-            <a:noFill/>
-          </a:ln>
-          <a:effectLst/>
-          <a:extLst>
-            <a:ext uri="{909E8E84-426E-40DD-AFC4-6F175D3DCCD1}">
-              <a14:hiddenFill xmlns:a14="http://schemas.microsoft.com/office/drawing/2010/main">
-                <a:solidFill>
-                  <a:schemeClr val="accent1"/>
-                </a:solidFill>
-              </a14:hiddenFill>
-            </a:ext>
-            <a:ext uri="{91240B29-F687-4F45-9708-019B960494DF}">
-              <a14:hiddenLine xmlns:a14="http://schemas.microsoft.com/office/drawing/2010/main" w="9525">
-                <a:solidFill>
-                  <a:schemeClr val="tx1"/>
-                </a:solidFill>
-                <a:miter lim="800000"/>
-                <a:headEnd/>
-                <a:tailEnd/>
-              </a14:hiddenLine>
-            </a:ext>
-            <a:ext uri="{AF507438-7753-43E0-B8FC-AC1667EBCBE1}">
-              <a14:hiddenEffects xmlns:a14="http://schemas.microsoft.com/office/drawing/2010/main">
-                <a:effectLst>
-                  <a:outerShdw dist="35921" dir="2700000" algn="ctr" rotWithShape="0">
-                    <a:schemeClr val="bg2"/>
-                  </a:outerShdw>
-                </a:effectLst>
-              </a14:hiddenEffects>
-            </a:ext>
-          </a:extLst>
         </p:spPr>
       </p:pic>
     </p:spTree>
@@ -25476,70 +25400,6 @@
           <a:chExt cx="0" cy="0"/>
         </a:xfrm>
       </p:grpSpPr>
-      <p:pic>
-        <p:nvPicPr>
-          <p:cNvPr id="2053" name="Picture 5"/>
-          <p:cNvPicPr>
-            <a:picLocks noChangeAspect="1" noChangeArrowheads="1"/>
-          </p:cNvPicPr>
-          <p:nvPr/>
-        </p:nvPicPr>
-        <p:blipFill>
-          <a:blip r:embed="rId3">
-            <a:extLst>
-              <a:ext uri="{28A0092B-C50C-407E-A947-70E740481C1C}">
-                <a14:useLocalDpi xmlns:a14="http://schemas.microsoft.com/office/drawing/2010/main" val="0"/>
-              </a:ext>
-            </a:extLst>
-          </a:blip>
-          <a:srcRect/>
-          <a:stretch>
-            <a:fillRect/>
-          </a:stretch>
-        </p:blipFill>
-        <p:spPr bwMode="auto">
-          <a:xfrm>
-            <a:off x="0" y="2667000"/>
-            <a:ext cx="9144000" cy="3930216"/>
-          </a:xfrm>
-          <a:prstGeom prst="rect">
-            <a:avLst/>
-          </a:prstGeom>
-          <a:noFill/>
-          <a:ln>
-            <a:noFill/>
-          </a:ln>
-          <a:effectLst/>
-          <a:extLst>
-            <a:ext uri="{909E8E84-426E-40DD-AFC4-6F175D3DCCD1}">
-              <a14:hiddenFill xmlns:a14="http://schemas.microsoft.com/office/drawing/2010/main">
-                <a:solidFill>
-                  <a:schemeClr val="accent1"/>
-                </a:solidFill>
-              </a14:hiddenFill>
-            </a:ext>
-            <a:ext uri="{91240B29-F687-4F45-9708-019B960494DF}">
-              <a14:hiddenLine xmlns:a14="http://schemas.microsoft.com/office/drawing/2010/main" w="9525">
-                <a:solidFill>
-                  <a:schemeClr val="tx1"/>
-                </a:solidFill>
-                <a:miter lim="800000"/>
-                <a:headEnd/>
-                <a:tailEnd/>
-              </a14:hiddenLine>
-            </a:ext>
-            <a:ext uri="{AF507438-7753-43E0-B8FC-AC1667EBCBE1}">
-              <a14:hiddenEffects xmlns:a14="http://schemas.microsoft.com/office/drawing/2010/main">
-                <a:effectLst>
-                  <a:outerShdw dist="35921" dir="2700000" algn="ctr" rotWithShape="0">
-                    <a:schemeClr val="bg2"/>
-                  </a:outerShdw>
-                </a:effectLst>
-              </a14:hiddenEffects>
-            </a:ext>
-          </a:extLst>
-        </p:spPr>
-      </p:pic>
       <p:sp>
         <p:nvSpPr>
           <p:cNvPr id="8" name="Title 1"/>
@@ -25589,6 +25449,36 @@
           </a:p>
         </p:txBody>
       </p:sp>
+      <p:pic>
+        <p:nvPicPr>
+          <p:cNvPr id="6" name="Picture 5"/>
+          <p:cNvPicPr>
+            <a:picLocks noChangeAspect="1"/>
+          </p:cNvPicPr>
+          <p:nvPr/>
+        </p:nvPicPr>
+        <p:blipFill>
+          <a:blip r:embed="rId3" cstate="print">
+            <a:extLst>
+              <a:ext uri="{28A0092B-C50C-407E-A947-70E740481C1C}">
+                <a14:useLocalDpi xmlns:a14="http://schemas.microsoft.com/office/drawing/2010/main" val="0"/>
+              </a:ext>
+            </a:extLst>
+          </a:blip>
+          <a:stretch>
+            <a:fillRect/>
+          </a:stretch>
+        </p:blipFill>
+        <p:spPr>
+          <a:xfrm>
+            <a:off x="0" y="1143000"/>
+            <a:ext cx="9144000" cy="5486400"/>
+          </a:xfrm>
+          <a:prstGeom prst="rect">
+            <a:avLst/>
+          </a:prstGeom>
+        </p:spPr>
+      </p:pic>
     </p:spTree>
     <p:extLst>
       <p:ext uri="{BB962C8B-B14F-4D97-AF65-F5344CB8AC3E}">
@@ -25626,70 +25516,6 @@
           <a:chExt cx="0" cy="0"/>
         </a:xfrm>
       </p:grpSpPr>
-      <p:pic>
-        <p:nvPicPr>
-          <p:cNvPr id="4099" name="Picture 3"/>
-          <p:cNvPicPr>
-            <a:picLocks noChangeAspect="1" noChangeArrowheads="1"/>
-          </p:cNvPicPr>
-          <p:nvPr/>
-        </p:nvPicPr>
-        <p:blipFill>
-          <a:blip r:embed="rId3">
-            <a:extLst>
-              <a:ext uri="{28A0092B-C50C-407E-A947-70E740481C1C}">
-                <a14:useLocalDpi xmlns:a14="http://schemas.microsoft.com/office/drawing/2010/main" val="0"/>
-              </a:ext>
-            </a:extLst>
-          </a:blip>
-          <a:srcRect/>
-          <a:stretch>
-            <a:fillRect/>
-          </a:stretch>
-        </p:blipFill>
-        <p:spPr bwMode="auto">
-          <a:xfrm>
-            <a:off x="0" y="2667000"/>
-            <a:ext cx="9144000" cy="3930216"/>
-          </a:xfrm>
-          <a:prstGeom prst="rect">
-            <a:avLst/>
-          </a:prstGeom>
-          <a:noFill/>
-          <a:ln>
-            <a:noFill/>
-          </a:ln>
-          <a:effectLst/>
-          <a:extLst>
-            <a:ext uri="{909E8E84-426E-40DD-AFC4-6F175D3DCCD1}">
-              <a14:hiddenFill xmlns:a14="http://schemas.microsoft.com/office/drawing/2010/main">
-                <a:solidFill>
-                  <a:schemeClr val="accent1"/>
-                </a:solidFill>
-              </a14:hiddenFill>
-            </a:ext>
-            <a:ext uri="{91240B29-F687-4F45-9708-019B960494DF}">
-              <a14:hiddenLine xmlns:a14="http://schemas.microsoft.com/office/drawing/2010/main" w="9525">
-                <a:solidFill>
-                  <a:schemeClr val="tx1"/>
-                </a:solidFill>
-                <a:miter lim="800000"/>
-                <a:headEnd/>
-                <a:tailEnd/>
-              </a14:hiddenLine>
-            </a:ext>
-            <a:ext uri="{AF507438-7753-43E0-B8FC-AC1667EBCBE1}">
-              <a14:hiddenEffects xmlns:a14="http://schemas.microsoft.com/office/drawing/2010/main">
-                <a:effectLst>
-                  <a:outerShdw dist="35921" dir="2700000" algn="ctr" rotWithShape="0">
-                    <a:schemeClr val="bg2"/>
-                  </a:outerShdw>
-                </a:effectLst>
-              </a14:hiddenEffects>
-            </a:ext>
-          </a:extLst>
-        </p:spPr>
-      </p:pic>
       <p:sp>
         <p:nvSpPr>
           <p:cNvPr id="6" name="Title 1"/>
@@ -25744,6 +25570,36 @@
           </a:p>
         </p:txBody>
       </p:sp>
+      <p:pic>
+        <p:nvPicPr>
+          <p:cNvPr id="10" name="Picture 9"/>
+          <p:cNvPicPr>
+            <a:picLocks noChangeAspect="1"/>
+          </p:cNvPicPr>
+          <p:nvPr/>
+        </p:nvPicPr>
+        <p:blipFill>
+          <a:blip r:embed="rId3" cstate="print">
+            <a:extLst>
+              <a:ext uri="{28A0092B-C50C-407E-A947-70E740481C1C}">
+                <a14:useLocalDpi xmlns:a14="http://schemas.microsoft.com/office/drawing/2010/main" val="0"/>
+              </a:ext>
+            </a:extLst>
+          </a:blip>
+          <a:stretch>
+            <a:fillRect/>
+          </a:stretch>
+        </p:blipFill>
+        <p:spPr>
+          <a:xfrm>
+            <a:off x="0" y="1143000"/>
+            <a:ext cx="9144000" cy="5486400"/>
+          </a:xfrm>
+          <a:prstGeom prst="rect">
+            <a:avLst/>
+          </a:prstGeom>
+        </p:spPr>
+      </p:pic>
     </p:spTree>
     <p:extLst>
       <p:ext uri="{BB962C8B-B14F-4D97-AF65-F5344CB8AC3E}">
@@ -29168,45 +29024,20 @@
         </p:blipFill>
         <p:spPr bwMode="auto">
           <a:xfrm>
-            <a:off x="1143000" y="5077354"/>
-            <a:ext cx="2819400" cy="1669124"/>
+            <a:off x="1103895" y="4381765"/>
+            <a:ext cx="3925305" cy="2323835"/>
           </a:xfrm>
           <a:prstGeom prst="rect">
             <a:avLst/>
           </a:prstGeom>
-          <a:noFill/>
+          <a:solidFill>
+            <a:schemeClr val="bg1"/>
+          </a:solidFill>
           <a:ln>
             <a:noFill/>
           </a:ln>
           <a:effectLst/>
-          <a:extLst>
-            <a:ext uri="{909E8E84-426E-40DD-AFC4-6F175D3DCCD1}">
-              <a14:hiddenFill xmlns:a14="http://schemas.microsoft.com/office/drawing/2010/main">
-                <a:solidFill>
-                  <a:schemeClr val="accent1"/>
-                </a:solidFill>
-              </a14:hiddenFill>
-            </a:ext>
-            <a:ext uri="{91240B29-F687-4F45-9708-019B960494DF}">
-              <a14:hiddenLine xmlns:a14="http://schemas.microsoft.com/office/drawing/2010/main" w="9525">
-                <a:solidFill>
-                  <a:schemeClr val="tx1"/>
-                </a:solidFill>
-                <a:miter lim="800000"/>
-                <a:headEnd/>
-                <a:tailEnd/>
-              </a14:hiddenLine>
-            </a:ext>
-            <a:ext uri="{AF507438-7753-43E0-B8FC-AC1667EBCBE1}">
-              <a14:hiddenEffects xmlns:a14="http://schemas.microsoft.com/office/drawing/2010/main">
-                <a:effectLst>
-                  <a:outerShdw dist="35921" dir="2700000" algn="ctr" rotWithShape="0">
-                    <a:schemeClr val="bg2"/>
-                  </a:outerShdw>
-                </a:effectLst>
-              </a14:hiddenEffects>
-            </a:ext>
-          </a:extLst>
+          <a:extLst/>
         </p:spPr>
       </p:pic>
     </p:spTree>
@@ -31965,7 +31796,7 @@
       </p:sp>
       <p:pic>
         <p:nvPicPr>
-          <p:cNvPr id="5" name="Picture 3"/>
+          <p:cNvPr id="6" name="Picture 3"/>
           <p:cNvPicPr>
             <a:picLocks noChangeAspect="1" noChangeArrowheads="1"/>
           </p:cNvPicPr>
@@ -31986,45 +31817,22 @@
         </p:blipFill>
         <p:spPr bwMode="auto">
           <a:xfrm>
-            <a:off x="1143000" y="5077354"/>
-            <a:ext cx="2819400" cy="1669124"/>
+            <a:off x="1103895" y="4381765"/>
+            <a:ext cx="3925305" cy="2323835"/>
           </a:xfrm>
           <a:prstGeom prst="rect">
             <a:avLst/>
           </a:prstGeom>
-          <a:noFill/>
+          <a:solidFill>
+            <a:srgbClr val="FFFFFF">
+              <a:alpha val="80000"/>
+            </a:srgbClr>
+          </a:solidFill>
           <a:ln>
             <a:noFill/>
           </a:ln>
           <a:effectLst/>
-          <a:extLst>
-            <a:ext uri="{909E8E84-426E-40DD-AFC4-6F175D3DCCD1}">
-              <a14:hiddenFill xmlns:a14="http://schemas.microsoft.com/office/drawing/2010/main">
-                <a:solidFill>
-                  <a:schemeClr val="accent1"/>
-                </a:solidFill>
-              </a14:hiddenFill>
-            </a:ext>
-            <a:ext uri="{91240B29-F687-4F45-9708-019B960494DF}">
-              <a14:hiddenLine xmlns:a14="http://schemas.microsoft.com/office/drawing/2010/main" w="9525">
-                <a:solidFill>
-                  <a:schemeClr val="tx1"/>
-                </a:solidFill>
-                <a:miter lim="800000"/>
-                <a:headEnd/>
-                <a:tailEnd/>
-              </a14:hiddenLine>
-            </a:ext>
-            <a:ext uri="{AF507438-7753-43E0-B8FC-AC1667EBCBE1}">
-              <a14:hiddenEffects xmlns:a14="http://schemas.microsoft.com/office/drawing/2010/main">
-                <a:effectLst>
-                  <a:outerShdw dist="35921" dir="2700000" algn="ctr" rotWithShape="0">
-                    <a:schemeClr val="bg2"/>
-                  </a:outerShdw>
-                </a:effectLst>
-              </a14:hiddenEffects>
-            </a:ext>
-          </a:extLst>
+          <a:extLst/>
         </p:spPr>
       </p:pic>
     </p:spTree>

</xml_diff>

<commit_message>
Last minute changes to Will's BGA presentation
</commit_message>
<xml_diff>
--- a/Publications/2013France/BeasleyBga2013-NlsyLinks.pptx
+++ b/Publications/2013France/BeasleyBga2013-NlsyLinks.pptx
@@ -5,7 +5,7 @@
     <p:sldMasterId id="2147483648" r:id="rId1"/>
   </p:sldMasterIdLst>
   <p:notesMasterIdLst>
-    <p:notesMasterId r:id="rId29"/>
+    <p:notesMasterId r:id="rId28"/>
   </p:notesMasterIdLst>
   <p:sldIdLst>
     <p:sldId id="256" r:id="rId2"/>
@@ -34,7 +34,6 @@
     <p:sldId id="281" r:id="rId25"/>
     <p:sldId id="284" r:id="rId26"/>
     <p:sldId id="285" r:id="rId27"/>
-    <p:sldId id="282" r:id="rId28"/>
   </p:sldIdLst>
   <p:sldSz cx="9144000" cy="6858000" type="screen4x3"/>
   <p:notesSz cx="6858000" cy="9144000"/>
@@ -234,7 +233,7 @@
           <a:p>
             <a:fld id="{6BE767AE-DD8E-4EA5-A843-143952EC906E}" type="datetimeFigureOut">
               <a:rPr lang="en-US" smtClean="0"/>
-              <a:t>6/20/2013</a:t>
+              <a:t>6/29/2013</a:t>
             </a:fld>
             <a:endParaRPr lang="en-US"/>
           </a:p>
@@ -548,7 +547,11 @@
           <a:p>
             <a:r>
               <a:rPr lang="en-US" dirty="0" smtClean="0"/>
-              <a:t>I’m Will, and I’ll be talking about BG research</a:t>
+              <a:t>Hi I’ll </a:t>
+            </a:r>
+            <a:r>
+              <a:rPr lang="en-US" dirty="0" smtClean="0"/>
+              <a:t>be talking about BG research</a:t>
             </a:r>
             <a:r>
               <a:rPr lang="en-US" baseline="0" dirty="0" smtClean="0"/>
@@ -1048,15 +1051,7 @@
           <a:p>
             <a:r>
               <a:rPr lang="en-US" dirty="0" smtClean="0"/>
-              <a:t>Let’s return to the </a:t>
-            </a:r>
-            <a:r>
-              <a:rPr lang="en-US" dirty="0" smtClean="0"/>
-              <a:t>white row </a:t>
-            </a:r>
-            <a:r>
-              <a:rPr lang="en-US" dirty="0" smtClean="0"/>
-              <a:t>showing the number of pairs</a:t>
+              <a:t>Let’s return to the white row showing the number of pairs</a:t>
             </a:r>
             <a:r>
               <a:rPr lang="en-US" baseline="0" dirty="0" smtClean="0"/>
@@ -1186,15 +1181,7 @@
           <a:p>
             <a:r>
               <a:rPr lang="en-US" dirty="0" smtClean="0"/>
-              <a:t>The NIH has </a:t>
-            </a:r>
-            <a:r>
-              <a:rPr lang="en-US" dirty="0" smtClean="0"/>
-              <a:t>funded us </a:t>
-            </a:r>
-            <a:r>
-              <a:rPr lang="en-US" dirty="0" smtClean="0"/>
-              <a:t>to construct and distribute the links.  You don’t need to replicate this.  But I’ll mention a few issues anyway.</a:t>
+              <a:t>The NIH has funded us to construct and distribute the links.  You don’t need to replicate this.  But I’ll mention a few issues anyway.</a:t>
             </a:r>
           </a:p>
           <a:p>
@@ -1529,11 +1516,23 @@
             </a:r>
             <a:r>
               <a:rPr lang="en-US" dirty="0" smtClean="0"/>
-              <a:t>21.1 to 1 ratio of agreement to disagreement.  I’m pretty happy</a:t>
+              <a:t>21.1 to 1 ratio of agreement to disagreement.  </a:t>
+            </a:r>
+            <a:r>
+              <a:rPr lang="en-US" dirty="0" smtClean="0"/>
+              <a:t>[[Cut: I’m </a:t>
+            </a:r>
+            <a:r>
+              <a:rPr lang="en-US" dirty="0" smtClean="0"/>
+              <a:t>pretty happy</a:t>
             </a:r>
             <a:r>
               <a:rPr lang="en-US" baseline="0" dirty="0" smtClean="0"/>
-              <a:t> with this graph.</a:t>
+              <a:t> with this graph</a:t>
+            </a:r>
+            <a:r>
+              <a:rPr lang="en-US" baseline="0" dirty="0" smtClean="0"/>
+              <a:t>.]]</a:t>
             </a:r>
             <a:endParaRPr lang="en-US" dirty="0"/>
           </a:p>
@@ -1642,7 +1641,19 @@
             </a:r>
             <a:r>
               <a:rPr lang="en-US" baseline="0" dirty="0" smtClean="0"/>
-              <a:t> I was coding the current version, I never looked at the code used for the older links.  And we used fairly different software development approaches.  The developers of the previous versions are even happier with this graph.</a:t>
+              <a:t> I was coding the current version, I never looked at the code used for the older links.  And we used fairly different software development approaches.  </a:t>
+            </a:r>
+            <a:r>
+              <a:rPr lang="en-US" baseline="0" dirty="0" smtClean="0"/>
+              <a:t>[[Cut: The </a:t>
+            </a:r>
+            <a:r>
+              <a:rPr lang="en-US" baseline="0" dirty="0" smtClean="0"/>
+              <a:t>developers of the previous versions are even happier with this graph</a:t>
+            </a:r>
+            <a:r>
+              <a:rPr lang="en-US" baseline="0" dirty="0" smtClean="0"/>
+              <a:t>.]]</a:t>
             </a:r>
             <a:endParaRPr lang="en-US" dirty="0"/>
           </a:p>
@@ -1834,11 +1845,7 @@
             </a:r>
             <a:r>
               <a:rPr lang="en-US" baseline="0" dirty="0" smtClean="0"/>
-              <a:t>  Gen1 has about 10% of what it used to have.  Gen2 is around 20</a:t>
-            </a:r>
-            <a:r>
-              <a:rPr lang="en-US" baseline="0" dirty="0" smtClean="0"/>
-              <a:t>%.</a:t>
+              <a:t>  Gen1 has about 10% of what it used to have.  Gen2 is around 20%.</a:t>
             </a:r>
           </a:p>
           <a:p>
@@ -1847,7 +1854,15 @@
           <a:p>
             <a:r>
               <a:rPr lang="en-US" baseline="0" dirty="0" smtClean="0"/>
-              <a:t>Increased statistical power is nice.  But in our opinion, the big advantage is the number of families exclude becomes almost negligible.  We’ve always been a little concerned that the families who were difficult to classify could be fundamentally different than the families who were easy to classify.</a:t>
+              <a:t>Increased statistical power is nice.  But in our opinion, the big advantage is the number of </a:t>
+            </a:r>
+            <a:r>
+              <a:rPr lang="en-US" baseline="0" dirty="0" smtClean="0"/>
+              <a:t>excluded families becomes </a:t>
+            </a:r>
+            <a:r>
+              <a:rPr lang="en-US" baseline="0" dirty="0" smtClean="0"/>
+              <a:t>almost negligible.  We’ve always been a little concerned that the families who were difficult to classify could be fundamentally different than the families who were easy to classify.</a:t>
             </a:r>
             <a:endParaRPr lang="en-US" dirty="0"/>
           </a:p>
@@ -1939,11 +1954,7 @@
             </a:r>
             <a:r>
               <a:rPr lang="en-US" baseline="0" dirty="0" smtClean="0"/>
-              <a:t> useful if the biometric properties aren’t good.  So we monitored the ACE estimates of several variables after every stage of the algorithm’s development</a:t>
-            </a:r>
-            <a:r>
-              <a:rPr lang="en-US" baseline="0" dirty="0" smtClean="0"/>
-              <a:t>.  The example on the screen </a:t>
+              <a:t> useful if the biometric properties aren’t good.  So we monitored the ACE estimates of several variables after every stage of the algorithm’s development.  The example on the screen </a:t>
             </a:r>
             <a:r>
               <a:rPr lang="en-US" baseline="0" smtClean="0"/>
@@ -2227,26 +2238,25 @@
             </a:r>
             <a:r>
               <a:rPr lang="en-US" baseline="0" dirty="0" smtClean="0"/>
-              <a:t> a single value per subject, you can </a:t>
+              <a:t> a single </a:t>
+            </a:r>
+            <a:r>
+              <a:rPr lang="en-US" baseline="0" dirty="0" smtClean="0"/>
+              <a:t>outcome value </a:t>
+            </a:r>
+            <a:r>
+              <a:rPr lang="en-US" baseline="0" dirty="0" smtClean="0"/>
+              <a:t>per subject, you can </a:t>
             </a:r>
             <a:r>
               <a:rPr lang="en-US" dirty="0" smtClean="0"/>
-              <a:t>run an entire univariate ACE model with less than 14 lines of code.</a:t>
-            </a:r>
-          </a:p>
-          <a:p>
+              <a:t>run an entire univariate ACE model with less than 14 lines of code</a:t>
+            </a:r>
+            <a:r>
+              <a:rPr lang="en-US" dirty="0" smtClean="0"/>
+              <a:t>.</a:t>
+            </a:r>
             <a:endParaRPr lang="en-US" dirty="0" smtClean="0"/>
-          </a:p>
-          <a:p>
-            <a:r>
-              <a:rPr lang="en-US" dirty="0" smtClean="0"/>
-              <a:t>Typically</a:t>
-            </a:r>
-            <a:r>
-              <a:rPr lang="en-US" baseline="0" dirty="0" smtClean="0"/>
-              <a:t> Step #6 requires more manipulation, but no more than if you weren’t using the package.</a:t>
-            </a:r>
-            <a:endParaRPr lang="en-US" dirty="0"/>
           </a:p>
         </p:txBody>
       </p:sp>
@@ -2437,11 +2447,7 @@
             </a:r>
             <a:r>
               <a:rPr lang="en-US" baseline="0" dirty="0" smtClean="0"/>
-              <a:t> for kinship users, regardless if you use R</a:t>
-            </a:r>
-            <a:r>
-              <a:rPr lang="en-US" baseline="0" dirty="0" smtClean="0"/>
-              <a:t>.  And you can always email us, or Google “</a:t>
+              <a:t> for kinship users, regardless if you use R.  And you can always email us, or Google “</a:t>
             </a:r>
             <a:r>
               <a:rPr lang="en-US" baseline="0" dirty="0" err="1" smtClean="0"/>
@@ -2732,7 +2738,39 @@
             </a:r>
             <a:r>
               <a:rPr lang="en-US" baseline="0" dirty="0" smtClean="0"/>
-              <a:t> cohort of the Nlsy79.  Their birth range is about ten years.  The females started having children at age 15, here in 1970.  The official survey began in 1979.  Yet we have data on this cohort that precedes 1979, because there are many retrospective questions asked of both the subjects, and their parents (the 0</a:t>
+              <a:t> cohort </a:t>
+            </a:r>
+            <a:r>
+              <a:rPr lang="en-US" baseline="0" dirty="0" smtClean="0"/>
+              <a:t>[[Cut: of </a:t>
+            </a:r>
+            <a:r>
+              <a:rPr lang="en-US" baseline="0" dirty="0" smtClean="0"/>
+              <a:t>the Nlsy79. </a:t>
+            </a:r>
+            <a:r>
+              <a:rPr lang="en-US" baseline="0" dirty="0" smtClean="0"/>
+              <a:t>Their </a:t>
+            </a:r>
+            <a:r>
+              <a:rPr lang="en-US" baseline="0" dirty="0" smtClean="0"/>
+              <a:t>birth range is about ten years.  The females started having children at age 15, here in 1970</a:t>
+            </a:r>
+            <a:r>
+              <a:rPr lang="en-US" baseline="0" dirty="0" smtClean="0"/>
+              <a:t>.]]  </a:t>
+            </a:r>
+            <a:r>
+              <a:rPr lang="en-US" baseline="0" dirty="0" smtClean="0"/>
+              <a:t>The official survey began in 1979.  Yet we have data </a:t>
+            </a:r>
+            <a:r>
+              <a:rPr lang="en-US" baseline="0" dirty="0" smtClean="0"/>
+              <a:t>preceding this, </a:t>
+            </a:r>
+            <a:r>
+              <a:rPr lang="en-US" baseline="0" dirty="0" smtClean="0"/>
+              <a:t>because there are many retrospective questions asked of both the subjects, and their parents (the 0</a:t>
             </a:r>
             <a:r>
               <a:rPr lang="en-US" baseline="30000" dirty="0" smtClean="0"/>
@@ -2941,11 +2979,7 @@
           <a:p>
             <a:r>
               <a:rPr lang="en-US" baseline="0" dirty="0" smtClean="0"/>
-              <a:t>As the arrows indicate, the surveys for all three cohorts are still being collected.  Likewise the fertility of the two younger cohorts is still in progress.  However, the fertility of the oldest cohort is virtually complete.  This closure can be a benefit to </a:t>
-            </a:r>
-            <a:r>
-              <a:rPr lang="en-US" baseline="0" dirty="0" smtClean="0"/>
-              <a:t>life course researchers</a:t>
+              <a:t>As the arrows indicate, the surveys for all three cohorts are still being collected.  Likewise the fertility of the two younger cohorts is still in progress.  However, the fertility of the oldest cohort is virtually complete.  This closure can be a benefit to life course researchers</a:t>
             </a:r>
             <a:endParaRPr lang="en-US" dirty="0"/>
           </a:p>
@@ -3062,7 +3096,23 @@
             </a:r>
             <a:r>
               <a:rPr lang="en-US" baseline="0" dirty="0" smtClean="0"/>
-              <a:t> generation nuclear families, you get 4 links (1 from this pair and 3 from these sibs).  If you take these same 5 subjects, but now consider the cousin links as well as sibling, your count is now 250% the size (jumps from 4 to 10).  Likewise, when you include all the intra and intergenerational relationships, you jump from 7 to 28 links.</a:t>
+              <a:t> generation nuclear families, you get 4 links (1 from this pair and 3 from these sibs).  If you take these same 5 subjects, but now consider </a:t>
+            </a:r>
+            <a:r>
+              <a:rPr lang="en-US" baseline="0" dirty="0" smtClean="0"/>
+              <a:t>the cousin </a:t>
+            </a:r>
+            <a:r>
+              <a:rPr lang="en-US" baseline="0" dirty="0" smtClean="0"/>
+              <a:t>links as well as </a:t>
+            </a:r>
+            <a:r>
+              <a:rPr lang="en-US" baseline="0" smtClean="0"/>
+              <a:t>sibling links, </a:t>
+            </a:r>
+            <a:r>
+              <a:rPr lang="en-US" baseline="0" dirty="0" smtClean="0"/>
+              <a:t>your count is now 250% the size (jumps from 4 to 10).  Likewise, when you include all the intra and intergenerational relationships, you jump from 7 to 28 links.</a:t>
             </a:r>
           </a:p>
           <a:p>
@@ -3475,7 +3525,7 @@
             <a:fld id="{1D8BD707-D9CF-40AE-B4C6-C98DA3205C09}" type="datetimeFigureOut">
               <a:rPr lang="en-US" smtClean="0"/>
               <a:pPr/>
-              <a:t>6/20/2013</a:t>
+              <a:t>6/29/2013</a:t>
             </a:fld>
             <a:endParaRPr lang="en-US"/>
           </a:p>
@@ -3642,7 +3692,7 @@
             <a:fld id="{1D8BD707-D9CF-40AE-B4C6-C98DA3205C09}" type="datetimeFigureOut">
               <a:rPr lang="en-US" smtClean="0"/>
               <a:pPr/>
-              <a:t>6/20/2013</a:t>
+              <a:t>6/29/2013</a:t>
             </a:fld>
             <a:endParaRPr lang="en-US"/>
           </a:p>
@@ -3819,7 +3869,7 @@
             <a:fld id="{1D8BD707-D9CF-40AE-B4C6-C98DA3205C09}" type="datetimeFigureOut">
               <a:rPr lang="en-US" smtClean="0"/>
               <a:pPr/>
-              <a:t>6/20/2013</a:t>
+              <a:t>6/29/2013</a:t>
             </a:fld>
             <a:endParaRPr lang="en-US"/>
           </a:p>
@@ -3986,7 +4036,7 @@
             <a:fld id="{1D8BD707-D9CF-40AE-B4C6-C98DA3205C09}" type="datetimeFigureOut">
               <a:rPr lang="en-US" smtClean="0"/>
               <a:pPr/>
-              <a:t>6/20/2013</a:t>
+              <a:t>6/29/2013</a:t>
             </a:fld>
             <a:endParaRPr lang="en-US"/>
           </a:p>
@@ -4229,7 +4279,7 @@
             <a:fld id="{1D8BD707-D9CF-40AE-B4C6-C98DA3205C09}" type="datetimeFigureOut">
               <a:rPr lang="en-US" smtClean="0"/>
               <a:pPr/>
-              <a:t>6/20/2013</a:t>
+              <a:t>6/29/2013</a:t>
             </a:fld>
             <a:endParaRPr lang="en-US"/>
           </a:p>
@@ -4514,7 +4564,7 @@
             <a:fld id="{1D8BD707-D9CF-40AE-B4C6-C98DA3205C09}" type="datetimeFigureOut">
               <a:rPr lang="en-US" smtClean="0"/>
               <a:pPr/>
-              <a:t>6/20/2013</a:t>
+              <a:t>6/29/2013</a:t>
             </a:fld>
             <a:endParaRPr lang="en-US"/>
           </a:p>
@@ -4933,7 +4983,7 @@
             <a:fld id="{1D8BD707-D9CF-40AE-B4C6-C98DA3205C09}" type="datetimeFigureOut">
               <a:rPr lang="en-US" smtClean="0"/>
               <a:pPr/>
-              <a:t>6/20/2013</a:t>
+              <a:t>6/29/2013</a:t>
             </a:fld>
             <a:endParaRPr lang="en-US"/>
           </a:p>
@@ -5048,7 +5098,7 @@
             <a:fld id="{1D8BD707-D9CF-40AE-B4C6-C98DA3205C09}" type="datetimeFigureOut">
               <a:rPr lang="en-US" smtClean="0"/>
               <a:pPr/>
-              <a:t>6/20/2013</a:t>
+              <a:t>6/29/2013</a:t>
             </a:fld>
             <a:endParaRPr lang="en-US"/>
           </a:p>
@@ -5140,7 +5190,7 @@
             <a:fld id="{1D8BD707-D9CF-40AE-B4C6-C98DA3205C09}" type="datetimeFigureOut">
               <a:rPr lang="en-US" smtClean="0"/>
               <a:pPr/>
-              <a:t>6/20/2013</a:t>
+              <a:t>6/29/2013</a:t>
             </a:fld>
             <a:endParaRPr lang="en-US"/>
           </a:p>
@@ -5414,7 +5464,7 @@
             <a:fld id="{1D8BD707-D9CF-40AE-B4C6-C98DA3205C09}" type="datetimeFigureOut">
               <a:rPr lang="en-US" smtClean="0"/>
               <a:pPr/>
-              <a:t>6/20/2013</a:t>
+              <a:t>6/29/2013</a:t>
             </a:fld>
             <a:endParaRPr lang="en-US"/>
           </a:p>
@@ -5664,7 +5714,7 @@
             <a:fld id="{1D8BD707-D9CF-40AE-B4C6-C98DA3205C09}" type="datetimeFigureOut">
               <a:rPr lang="en-US" smtClean="0"/>
               <a:pPr/>
-              <a:t>6/20/2013</a:t>
+              <a:t>6/29/2013</a:t>
             </a:fld>
             <a:endParaRPr lang="en-US"/>
           </a:p>
@@ -5874,7 +5924,7 @@
             <a:fld id="{1D8BD707-D9CF-40AE-B4C6-C98DA3205C09}" type="datetimeFigureOut">
               <a:rPr lang="en-US" smtClean="0"/>
               <a:pPr/>
-              <a:t>6/20/2013</a:t>
+              <a:t>6/29/2013</a:t>
             </a:fld>
             <a:endParaRPr lang="en-US"/>
           </a:p>
@@ -24745,107 +24795,6 @@
     <p:extLst>
       <p:ext uri="{BB962C8B-B14F-4D97-AF65-F5344CB8AC3E}">
         <p14:creationId xmlns:p14="http://schemas.microsoft.com/office/powerpoint/2010/main" val="377114581"/>
-      </p:ext>
-    </p:extLst>
-  </p:cSld>
-  <p:clrMapOvr>
-    <a:masterClrMapping/>
-  </p:clrMapOvr>
-  <p:timing>
-    <p:tnLst>
-      <p:par>
-        <p:cTn id="1" dur="indefinite" restart="never" nodeType="tmRoot"/>
-      </p:par>
-    </p:tnLst>
-  </p:timing>
-</p:sld>
-</file>
-
-<file path=ppt/slides/slide27.xml><?xml version="1.0" encoding="utf-8"?>
-<p:sld xmlns:a="http://schemas.openxmlformats.org/drawingml/2006/main" xmlns:r="http://schemas.openxmlformats.org/officeDocument/2006/relationships" xmlns:p="http://schemas.openxmlformats.org/presentationml/2006/main">
-  <p:cSld>
-    <p:spTree>
-      <p:nvGrpSpPr>
-        <p:cNvPr id="1" name=""/>
-        <p:cNvGrpSpPr/>
-        <p:nvPr/>
-      </p:nvGrpSpPr>
-      <p:grpSpPr>
-        <a:xfrm>
-          <a:off x="0" y="0"/>
-          <a:ext cx="0" cy="0"/>
-          <a:chOff x="0" y="0"/>
-          <a:chExt cx="0" cy="0"/>
-        </a:xfrm>
-      </p:grpSpPr>
-      <p:sp>
-        <p:nvSpPr>
-          <p:cNvPr id="2" name="Title 1"/>
-          <p:cNvSpPr>
-            <a:spLocks noGrp="1"/>
-          </p:cNvSpPr>
-          <p:nvPr>
-            <p:ph type="title"/>
-          </p:nvPr>
-        </p:nvSpPr>
-        <p:spPr>
-          <a:xfrm>
-            <a:off x="76200" y="46038"/>
-            <a:ext cx="8991600" cy="715962"/>
-          </a:xfrm>
-          <a:solidFill>
-            <a:schemeClr val="bg1">
-              <a:lumMod val="75000"/>
-            </a:schemeClr>
-          </a:solidFill>
-        </p:spPr>
-        <p:txBody>
-          <a:bodyPr>
-            <a:noAutofit/>
-          </a:bodyPr>
-          <a:lstStyle/>
-          <a:p>
-            <a:endParaRPr lang="en-US" dirty="0"/>
-          </a:p>
-        </p:txBody>
-      </p:sp>
-      <p:sp>
-        <p:nvSpPr>
-          <p:cNvPr id="3" name="Content Placeholder 2"/>
-          <p:cNvSpPr>
-            <a:spLocks noGrp="1"/>
-          </p:cNvSpPr>
-          <p:nvPr>
-            <p:ph idx="1"/>
-          </p:nvPr>
-        </p:nvSpPr>
-        <p:spPr>
-          <a:xfrm>
-            <a:off x="76200" y="762000"/>
-            <a:ext cx="8991600" cy="6096000"/>
-          </a:xfrm>
-        </p:spPr>
-        <p:txBody>
-          <a:bodyPr>
-            <a:normAutofit/>
-          </a:bodyPr>
-          <a:lstStyle/>
-          <a:p>
-            <a:endParaRPr lang="en-US" dirty="0">
-              <a:solidFill>
-                <a:schemeClr val="tx1">
-                  <a:lumMod val="50000"/>
-                  <a:lumOff val="50000"/>
-                </a:schemeClr>
-              </a:solidFill>
-            </a:endParaRPr>
-          </a:p>
-        </p:txBody>
-      </p:sp>
-    </p:spTree>
-    <p:extLst>
-      <p:ext uri="{BB962C8B-B14F-4D97-AF65-F5344CB8AC3E}">
-        <p14:creationId xmlns:p14="http://schemas.microsoft.com/office/powerpoint/2010/main" val="1695358921"/>
       </p:ext>
     </p:extLst>
   </p:cSld>

</xml_diff>